<commit_message>
updated ppt and graphs
</commit_message>
<xml_diff>
--- a/powerpoint/Data Science Salaries from 2022-2023 pt2.pptx
+++ b/powerpoint/Data Science Salaries from 2022-2023 pt2.pptx
@@ -5,7 +5,7 @@
     <p:sldMasterId id="2147483650" r:id="rId1"/>
   </p:sldMasterIdLst>
   <p:notesMasterIdLst>
-    <p:notesMasterId r:id="rId14"/>
+    <p:notesMasterId r:id="rId16"/>
   </p:notesMasterIdLst>
   <p:sldIdLst>
     <p:sldId id="278" r:id="rId2"/>
@@ -13,13 +13,15 @@
     <p:sldId id="280" r:id="rId4"/>
     <p:sldId id="281" r:id="rId5"/>
     <p:sldId id="282" r:id="rId6"/>
-    <p:sldId id="283" r:id="rId7"/>
-    <p:sldId id="284" r:id="rId8"/>
-    <p:sldId id="285" r:id="rId9"/>
-    <p:sldId id="289" r:id="rId10"/>
-    <p:sldId id="293" r:id="rId11"/>
-    <p:sldId id="290" r:id="rId12"/>
-    <p:sldId id="292" r:id="rId13"/>
+    <p:sldId id="297" r:id="rId7"/>
+    <p:sldId id="295" r:id="rId8"/>
+    <p:sldId id="296" r:id="rId9"/>
+    <p:sldId id="284" r:id="rId10"/>
+    <p:sldId id="283" r:id="rId11"/>
+    <p:sldId id="289" r:id="rId12"/>
+    <p:sldId id="293" r:id="rId13"/>
+    <p:sldId id="290" r:id="rId14"/>
+    <p:sldId id="292" r:id="rId15"/>
   </p:sldIdLst>
   <p:sldSz cx="12192000" cy="6858000"/>
   <p:notesSz cx="13716000" cy="24384000"/>
@@ -263,1162 +265,6 @@
 </p188:authorLst>
 </file>
 
-<file path=ppt/charts/chart1.xml><?xml version="1.0" encoding="utf-8"?>
-<c:chartSpace xmlns:c="http://schemas.openxmlformats.org/drawingml/2006/chart" xmlns:a="http://schemas.openxmlformats.org/drawingml/2006/main" xmlns:r="http://schemas.openxmlformats.org/officeDocument/2006/relationships" xmlns:c16r2="http://schemas.microsoft.com/office/drawing/2015/06/chart">
-  <c:date1904 val="0"/>
-  <c:lang val="en-US"/>
-  <c:roundedCorners val="0"/>
-  <mc:AlternateContent xmlns:mc="http://schemas.openxmlformats.org/markup-compatibility/2006">
-    <mc:Choice xmlns:c14="http://schemas.microsoft.com/office/drawing/2007/8/2/chart" Requires="c14">
-      <c14:style val="102"/>
-    </mc:Choice>
-    <mc:Fallback>
-      <c:style val="2"/>
-    </mc:Fallback>
-  </mc:AlternateContent>
-  <c:chart>
-    <c:autoTitleDeleted val="1"/>
-    <c:plotArea>
-      <c:layout>
-        <c:manualLayout>
-          <c:layoutTarget val="inner"/>
-          <c:xMode val="edge"/>
-          <c:yMode val="edge"/>
-          <c:x val="4.2825695417250349E-2"/>
-          <c:y val="3.4334763948497854E-2"/>
-          <c:w val="0.93716586935650903"/>
-          <c:h val="0.81879895914298262"/>
-        </c:manualLayout>
-      </c:layout>
-      <c:barChart>
-        <c:barDir val="bar"/>
-        <c:grouping val="clustered"/>
-        <c:varyColors val="0"/>
-        <c:ser>
-          <c:idx val="0"/>
-          <c:order val="0"/>
-          <c:tx>
-            <c:strRef>
-              <c:f>Sheet1!$B$1</c:f>
-              <c:strCache>
-                <c:ptCount val="1"/>
-                <c:pt idx="0">
-                  <c:v>Series 3</c:v>
-                </c:pt>
-              </c:strCache>
-            </c:strRef>
-          </c:tx>
-          <c:spPr>
-            <a:solidFill>
-              <a:schemeClr val="accent5"/>
-            </a:solidFill>
-            <a:ln>
-              <a:noFill/>
-            </a:ln>
-            <a:effectLst/>
-          </c:spPr>
-          <c:invertIfNegative val="0"/>
-          <c:dLbls>
-            <c:spPr>
-              <a:noFill/>
-              <a:ln>
-                <a:noFill/>
-              </a:ln>
-              <a:effectLst/>
-            </c:spPr>
-            <c:txPr>
-              <a:bodyPr rot="0" spcFirstLastPara="1" vertOverflow="ellipsis" vert="horz" wrap="square" lIns="38100" tIns="19050" rIns="38100" bIns="19050" anchor="ctr" anchorCtr="1">
-                <a:spAutoFit/>
-              </a:bodyPr>
-              <a:lstStyle/>
-              <a:p>
-                <a:pPr>
-                  <a:defRPr sz="1197" b="0" i="0" u="none" strike="noStrike" kern="1200" baseline="0">
-                    <a:solidFill>
-                      <a:schemeClr val="accent6"/>
-                    </a:solidFill>
-                    <a:latin typeface="Sabon Next LT" panose="02000500000000000000" pitchFamily="2" charset="0"/>
-                    <a:ea typeface="+mn-ea"/>
-                    <a:cs typeface="Sabon Next LT" panose="02000500000000000000" pitchFamily="2" charset="0"/>
-                  </a:defRPr>
-                </a:pPr>
-                <a:endParaRPr lang="en-US"/>
-              </a:p>
-            </c:txPr>
-            <c:dLblPos val="outEnd"/>
-            <c:showLegendKey val="0"/>
-            <c:showVal val="1"/>
-            <c:showCatName val="0"/>
-            <c:showSerName val="0"/>
-            <c:showPercent val="0"/>
-            <c:showBubbleSize val="0"/>
-            <c:showLeaderLines val="0"/>
-            <c:extLst>
-              <c:ext xmlns:c15="http://schemas.microsoft.com/office/drawing/2012/chart" uri="{CE6537A1-D6FC-4f65-9D91-7224C49458BB}">
-                <c15:showLeaderLines val="1"/>
-                <c15:leaderLines>
-                  <c:spPr>
-                    <a:ln w="9525" cap="flat" cmpd="sng" algn="ctr">
-                      <a:solidFill>
-                        <a:schemeClr val="tx1">
-                          <a:lumMod val="35000"/>
-                          <a:lumOff val="65000"/>
-                        </a:schemeClr>
-                      </a:solidFill>
-                      <a:round/>
-                    </a:ln>
-                    <a:effectLst/>
-                  </c:spPr>
-                </c15:leaderLines>
-              </c:ext>
-            </c:extLst>
-          </c:dLbls>
-          <c:cat>
-            <c:strRef>
-              <c:f>Sheet1!$A$2:$A$5</c:f>
-              <c:strCache>
-                <c:ptCount val="4"/>
-                <c:pt idx="0">
-                  <c:v>Q4</c:v>
-                </c:pt>
-                <c:pt idx="1">
-                  <c:v>Q3</c:v>
-                </c:pt>
-                <c:pt idx="2">
-                  <c:v>Q2</c:v>
-                </c:pt>
-                <c:pt idx="3">
-                  <c:v>Q1</c:v>
-                </c:pt>
-              </c:strCache>
-            </c:strRef>
-          </c:cat>
-          <c:val>
-            <c:numRef>
-              <c:f>Sheet1!$B$2:$B$5</c:f>
-              <c:numCache>
-                <c:formatCode>_(* #,##0.0_);_(* \(#,##0.0\);_(* "-"??_);_(@_)</c:formatCode>
-                <c:ptCount val="4"/>
-                <c:pt idx="0">
-                  <c:v>4.5</c:v>
-                </c:pt>
-                <c:pt idx="1">
-                  <c:v>3.5</c:v>
-                </c:pt>
-                <c:pt idx="2">
-                  <c:v>2.5</c:v>
-                </c:pt>
-                <c:pt idx="3">
-                  <c:v>4.3</c:v>
-                </c:pt>
-              </c:numCache>
-            </c:numRef>
-          </c:val>
-          <c:extLst>
-            <c:ext xmlns:c16="http://schemas.microsoft.com/office/drawing/2014/chart" uri="{C3380CC4-5D6E-409C-BE32-E72D297353CC}">
-              <c16:uniqueId val="{00000000-5DD3-4563-B6FC-B5FE9EFC1AB5}"/>
-            </c:ext>
-          </c:extLst>
-        </c:ser>
-        <c:ser>
-          <c:idx val="1"/>
-          <c:order val="1"/>
-          <c:tx>
-            <c:strRef>
-              <c:f>Sheet1!$C$1</c:f>
-              <c:strCache>
-                <c:ptCount val="1"/>
-                <c:pt idx="0">
-                  <c:v>Series 2</c:v>
-                </c:pt>
-              </c:strCache>
-            </c:strRef>
-          </c:tx>
-          <c:spPr>
-            <a:solidFill>
-              <a:schemeClr val="accent3"/>
-            </a:solidFill>
-            <a:ln>
-              <a:noFill/>
-            </a:ln>
-            <a:effectLst/>
-          </c:spPr>
-          <c:invertIfNegative val="0"/>
-          <c:dLbls>
-            <c:spPr>
-              <a:noFill/>
-              <a:ln>
-                <a:noFill/>
-              </a:ln>
-              <a:effectLst/>
-            </c:spPr>
-            <c:txPr>
-              <a:bodyPr rot="0" spcFirstLastPara="1" vertOverflow="ellipsis" vert="horz" wrap="square" lIns="38100" tIns="19050" rIns="38100" bIns="19050" anchor="ctr" anchorCtr="1">
-                <a:spAutoFit/>
-              </a:bodyPr>
-              <a:lstStyle/>
-              <a:p>
-                <a:pPr>
-                  <a:defRPr sz="1197" b="0" i="0" u="none" strike="noStrike" kern="1200" baseline="0">
-                    <a:solidFill>
-                      <a:schemeClr val="accent6"/>
-                    </a:solidFill>
-                    <a:latin typeface="Sabon Next LT" panose="02000500000000000000" pitchFamily="2" charset="0"/>
-                    <a:ea typeface="+mn-ea"/>
-                    <a:cs typeface="Sabon Next LT" panose="02000500000000000000" pitchFamily="2" charset="0"/>
-                  </a:defRPr>
-                </a:pPr>
-                <a:endParaRPr lang="en-US"/>
-              </a:p>
-            </c:txPr>
-            <c:dLblPos val="outEnd"/>
-            <c:showLegendKey val="0"/>
-            <c:showVal val="1"/>
-            <c:showCatName val="0"/>
-            <c:showSerName val="0"/>
-            <c:showPercent val="0"/>
-            <c:showBubbleSize val="0"/>
-            <c:showLeaderLines val="0"/>
-            <c:extLst>
-              <c:ext xmlns:c15="http://schemas.microsoft.com/office/drawing/2012/chart" uri="{CE6537A1-D6FC-4f65-9D91-7224C49458BB}">
-                <c15:showLeaderLines val="1"/>
-                <c15:leaderLines>
-                  <c:spPr>
-                    <a:ln w="9525" cap="flat" cmpd="sng" algn="ctr">
-                      <a:solidFill>
-                        <a:schemeClr val="tx1">
-                          <a:lumMod val="35000"/>
-                          <a:lumOff val="65000"/>
-                        </a:schemeClr>
-                      </a:solidFill>
-                      <a:round/>
-                    </a:ln>
-                    <a:effectLst/>
-                  </c:spPr>
-                </c15:leaderLines>
-              </c:ext>
-            </c:extLst>
-          </c:dLbls>
-          <c:cat>
-            <c:strRef>
-              <c:f>Sheet1!$A$2:$A$5</c:f>
-              <c:strCache>
-                <c:ptCount val="4"/>
-                <c:pt idx="0">
-                  <c:v>Q4</c:v>
-                </c:pt>
-                <c:pt idx="1">
-                  <c:v>Q3</c:v>
-                </c:pt>
-                <c:pt idx="2">
-                  <c:v>Q2</c:v>
-                </c:pt>
-                <c:pt idx="3">
-                  <c:v>Q1</c:v>
-                </c:pt>
-              </c:strCache>
-            </c:strRef>
-          </c:cat>
-          <c:val>
-            <c:numRef>
-              <c:f>Sheet1!$C$2:$C$5</c:f>
-              <c:numCache>
-                <c:formatCode>_(* #,##0.0_);_(* \(#,##0.0\);_(* "-"??_);_(@_)</c:formatCode>
-                <c:ptCount val="4"/>
-                <c:pt idx="0">
-                  <c:v>2.8</c:v>
-                </c:pt>
-                <c:pt idx="1">
-                  <c:v>1.8</c:v>
-                </c:pt>
-                <c:pt idx="2">
-                  <c:v>4.4000000000000004</c:v>
-                </c:pt>
-                <c:pt idx="3">
-                  <c:v>2.4</c:v>
-                </c:pt>
-              </c:numCache>
-            </c:numRef>
-          </c:val>
-          <c:extLst>
-            <c:ext xmlns:c16="http://schemas.microsoft.com/office/drawing/2014/chart" uri="{C3380CC4-5D6E-409C-BE32-E72D297353CC}">
-              <c16:uniqueId val="{00000001-5DD3-4563-B6FC-B5FE9EFC1AB5}"/>
-            </c:ext>
-          </c:extLst>
-        </c:ser>
-        <c:ser>
-          <c:idx val="2"/>
-          <c:order val="2"/>
-          <c:tx>
-            <c:strRef>
-              <c:f>Sheet1!$D$1</c:f>
-              <c:strCache>
-                <c:ptCount val="1"/>
-                <c:pt idx="0">
-                  <c:v>Series 1</c:v>
-                </c:pt>
-              </c:strCache>
-            </c:strRef>
-          </c:tx>
-          <c:spPr>
-            <a:solidFill>
-              <a:schemeClr val="accent1"/>
-            </a:solidFill>
-            <a:ln>
-              <a:noFill/>
-            </a:ln>
-            <a:effectLst/>
-          </c:spPr>
-          <c:invertIfNegative val="0"/>
-          <c:dPt>
-            <c:idx val="3"/>
-            <c:invertIfNegative val="0"/>
-            <c:bubble3D val="0"/>
-            <c:spPr>
-              <a:solidFill>
-                <a:schemeClr val="accent1"/>
-              </a:solidFill>
-              <a:ln>
-                <a:noFill/>
-              </a:ln>
-              <a:effectLst>
-                <a:softEdge rad="0"/>
-              </a:effectLst>
-            </c:spPr>
-            <c:extLst>
-              <c:ext xmlns:c16="http://schemas.microsoft.com/office/drawing/2014/chart" uri="{C3380CC4-5D6E-409C-BE32-E72D297353CC}">
-                <c16:uniqueId val="{00000003-5DD3-4563-B6FC-B5FE9EFC1AB5}"/>
-              </c:ext>
-            </c:extLst>
-          </c:dPt>
-          <c:dLbls>
-            <c:spPr>
-              <a:noFill/>
-              <a:ln>
-                <a:noFill/>
-              </a:ln>
-              <a:effectLst/>
-            </c:spPr>
-            <c:txPr>
-              <a:bodyPr rot="0" spcFirstLastPara="1" vertOverflow="ellipsis" vert="horz" wrap="square" lIns="38100" tIns="19050" rIns="38100" bIns="19050" anchor="ctr" anchorCtr="1">
-                <a:spAutoFit/>
-              </a:bodyPr>
-              <a:lstStyle/>
-              <a:p>
-                <a:pPr>
-                  <a:defRPr sz="1197" b="0" i="0" u="none" strike="noStrike" kern="1200" baseline="0">
-                    <a:solidFill>
-                      <a:schemeClr val="accent6"/>
-                    </a:solidFill>
-                    <a:latin typeface="Sabon Next LT" panose="02000500000000000000" pitchFamily="2" charset="0"/>
-                    <a:ea typeface="+mn-ea"/>
-                    <a:cs typeface="Sabon Next LT" panose="02000500000000000000" pitchFamily="2" charset="0"/>
-                  </a:defRPr>
-                </a:pPr>
-                <a:endParaRPr lang="en-US"/>
-              </a:p>
-            </c:txPr>
-            <c:dLblPos val="outEnd"/>
-            <c:showLegendKey val="0"/>
-            <c:showVal val="1"/>
-            <c:showCatName val="0"/>
-            <c:showSerName val="0"/>
-            <c:showPercent val="0"/>
-            <c:showBubbleSize val="0"/>
-            <c:showLeaderLines val="0"/>
-            <c:extLst>
-              <c:ext xmlns:c15="http://schemas.microsoft.com/office/drawing/2012/chart" uri="{CE6537A1-D6FC-4f65-9D91-7224C49458BB}">
-                <c15:showLeaderLines val="1"/>
-                <c15:leaderLines>
-                  <c:spPr>
-                    <a:ln w="9525" cap="flat" cmpd="sng" algn="ctr">
-                      <a:solidFill>
-                        <a:schemeClr val="tx1">
-                          <a:lumMod val="35000"/>
-                          <a:lumOff val="65000"/>
-                        </a:schemeClr>
-                      </a:solidFill>
-                      <a:round/>
-                    </a:ln>
-                    <a:effectLst/>
-                  </c:spPr>
-                </c15:leaderLines>
-              </c:ext>
-            </c:extLst>
-          </c:dLbls>
-          <c:cat>
-            <c:strRef>
-              <c:f>Sheet1!$A$2:$A$5</c:f>
-              <c:strCache>
-                <c:ptCount val="4"/>
-                <c:pt idx="0">
-                  <c:v>Q4</c:v>
-                </c:pt>
-                <c:pt idx="1">
-                  <c:v>Q3</c:v>
-                </c:pt>
-                <c:pt idx="2">
-                  <c:v>Q2</c:v>
-                </c:pt>
-                <c:pt idx="3">
-                  <c:v>Q1</c:v>
-                </c:pt>
-              </c:strCache>
-            </c:strRef>
-          </c:cat>
-          <c:val>
-            <c:numRef>
-              <c:f>Sheet1!$D$2:$D$5</c:f>
-              <c:numCache>
-                <c:formatCode>_(* #,##0.0_);_(* \(#,##0.0\);_(* "-"??_);_(@_)</c:formatCode>
-                <c:ptCount val="4"/>
-                <c:pt idx="0">
-                  <c:v>5</c:v>
-                </c:pt>
-                <c:pt idx="1">
-                  <c:v>3</c:v>
-                </c:pt>
-                <c:pt idx="2">
-                  <c:v>2</c:v>
-                </c:pt>
-                <c:pt idx="3">
-                  <c:v>2</c:v>
-                </c:pt>
-              </c:numCache>
-            </c:numRef>
-          </c:val>
-          <c:extLst>
-            <c:ext xmlns:c16="http://schemas.microsoft.com/office/drawing/2014/chart" uri="{C3380CC4-5D6E-409C-BE32-E72D297353CC}">
-              <c16:uniqueId val="{00000004-5DD3-4563-B6FC-B5FE9EFC1AB5}"/>
-            </c:ext>
-          </c:extLst>
-        </c:ser>
-        <c:dLbls>
-          <c:dLblPos val="outEnd"/>
-          <c:showLegendKey val="0"/>
-          <c:showVal val="1"/>
-          <c:showCatName val="0"/>
-          <c:showSerName val="0"/>
-          <c:showPercent val="0"/>
-          <c:showBubbleSize val="0"/>
-        </c:dLbls>
-        <c:gapWidth val="182"/>
-        <c:axId val="1111705064"/>
-        <c:axId val="1111706704"/>
-      </c:barChart>
-      <c:catAx>
-        <c:axId val="1111705064"/>
-        <c:scaling>
-          <c:orientation val="minMax"/>
-        </c:scaling>
-        <c:delete val="0"/>
-        <c:axPos val="l"/>
-        <c:numFmt formatCode="General" sourceLinked="1"/>
-        <c:majorTickMark val="none"/>
-        <c:minorTickMark val="none"/>
-        <c:tickLblPos val="nextTo"/>
-        <c:spPr>
-          <a:noFill/>
-          <a:ln w="9525" cap="flat" cmpd="sng" algn="ctr">
-            <a:solidFill>
-              <a:srgbClr val="202C8F"/>
-            </a:solidFill>
-            <a:round/>
-          </a:ln>
-          <a:effectLst/>
-        </c:spPr>
-        <c:txPr>
-          <a:bodyPr rot="-60000000" spcFirstLastPara="1" vertOverflow="ellipsis" vert="horz" wrap="square" anchor="ctr" anchorCtr="1"/>
-          <a:lstStyle/>
-          <a:p>
-            <a:pPr>
-              <a:defRPr sz="1197" b="0" i="0" u="none" strike="noStrike" kern="1200" baseline="0">
-                <a:solidFill>
-                  <a:schemeClr val="accent6"/>
-                </a:solidFill>
-                <a:latin typeface="Sabon Next LT" panose="02000500000000000000" pitchFamily="2" charset="0"/>
-                <a:ea typeface="+mn-ea"/>
-                <a:cs typeface="Sabon Next LT" panose="02000500000000000000" pitchFamily="2" charset="0"/>
-              </a:defRPr>
-            </a:pPr>
-            <a:endParaRPr lang="en-US"/>
-          </a:p>
-        </c:txPr>
-        <c:crossAx val="1111706704"/>
-        <c:crosses val="autoZero"/>
-        <c:auto val="1"/>
-        <c:lblAlgn val="ctr"/>
-        <c:lblOffset val="100"/>
-        <c:noMultiLvlLbl val="0"/>
-      </c:catAx>
-      <c:valAx>
-        <c:axId val="1111706704"/>
-        <c:scaling>
-          <c:orientation val="minMax"/>
-        </c:scaling>
-        <c:delete val="0"/>
-        <c:axPos val="b"/>
-        <c:majorGridlines>
-          <c:spPr>
-            <a:ln w="9525" cap="flat" cmpd="sng" algn="ctr">
-              <a:solidFill>
-                <a:schemeClr val="tx1">
-                  <a:lumMod val="15000"/>
-                  <a:lumOff val="85000"/>
-                </a:schemeClr>
-              </a:solidFill>
-              <a:round/>
-            </a:ln>
-            <a:effectLst/>
-          </c:spPr>
-        </c:majorGridlines>
-        <c:numFmt formatCode="_(* #,##0.0_);_(* \(#,##0.0\);_(* &quot;-&quot;??_);_(@_)" sourceLinked="1"/>
-        <c:majorTickMark val="none"/>
-        <c:minorTickMark val="none"/>
-        <c:tickLblPos val="nextTo"/>
-        <c:spPr>
-          <a:noFill/>
-          <a:ln>
-            <a:noFill/>
-          </a:ln>
-          <a:effectLst/>
-        </c:spPr>
-        <c:txPr>
-          <a:bodyPr rot="-60000000" spcFirstLastPara="1" vertOverflow="ellipsis" vert="horz" wrap="square" anchor="ctr" anchorCtr="1"/>
-          <a:lstStyle/>
-          <a:p>
-            <a:pPr>
-              <a:defRPr sz="1197" b="0" i="0" u="none" strike="noStrike" kern="1200" baseline="0">
-                <a:solidFill>
-                  <a:schemeClr val="accent6"/>
-                </a:solidFill>
-                <a:latin typeface="Sabon Next LT" panose="02000500000000000000" pitchFamily="2" charset="0"/>
-                <a:ea typeface="+mn-ea"/>
-                <a:cs typeface="Sabon Next LT" panose="02000500000000000000" pitchFamily="2" charset="0"/>
-              </a:defRPr>
-            </a:pPr>
-            <a:endParaRPr lang="en-US"/>
-          </a:p>
-        </c:txPr>
-        <c:crossAx val="1111705064"/>
-        <c:crosses val="autoZero"/>
-        <c:crossBetween val="between"/>
-      </c:valAx>
-      <c:spPr>
-        <a:noFill/>
-        <a:ln>
-          <a:noFill/>
-        </a:ln>
-        <a:effectLst/>
-      </c:spPr>
-    </c:plotArea>
-    <c:legend>
-      <c:legendPos val="b"/>
-      <c:overlay val="0"/>
-      <c:spPr>
-        <a:noFill/>
-        <a:ln>
-          <a:noFill/>
-        </a:ln>
-        <a:effectLst/>
-      </c:spPr>
-      <c:txPr>
-        <a:bodyPr rot="0" spcFirstLastPara="1" vertOverflow="ellipsis" vert="horz" wrap="square" anchor="ctr" anchorCtr="1"/>
-        <a:lstStyle/>
-        <a:p>
-          <a:pPr>
-            <a:defRPr sz="1197" b="0" i="0" u="none" strike="noStrike" kern="1200" baseline="0">
-              <a:solidFill>
-                <a:schemeClr val="accent6"/>
-              </a:solidFill>
-              <a:latin typeface="Sabon Next LT" panose="02000500000000000000" pitchFamily="2" charset="0"/>
-              <a:ea typeface="+mn-ea"/>
-              <a:cs typeface="Sabon Next LT" panose="02000500000000000000" pitchFamily="2" charset="0"/>
-            </a:defRPr>
-          </a:pPr>
-          <a:endParaRPr lang="en-US"/>
-        </a:p>
-      </c:txPr>
-    </c:legend>
-    <c:plotVisOnly val="1"/>
-    <c:dispBlanksAs val="gap"/>
-    <c:extLst>
-      <c:ext xmlns:c16r3="http://schemas.microsoft.com/office/drawing/2017/03/chart" uri="{56B9EC1D-385E-4148-901F-78D8002777C0}">
-        <c16r3:dataDisplayOptions16>
-          <c16r3:dispNaAsBlank val="1"/>
-        </c16r3:dataDisplayOptions16>
-      </c:ext>
-    </c:extLst>
-    <c:showDLblsOverMax val="0"/>
-  </c:chart>
-  <c:spPr>
-    <a:noFill/>
-    <a:ln>
-      <a:noFill/>
-    </a:ln>
-    <a:effectLst/>
-  </c:spPr>
-  <c:txPr>
-    <a:bodyPr/>
-    <a:lstStyle/>
-    <a:p>
-      <a:pPr>
-        <a:defRPr/>
-      </a:pPr>
-      <a:endParaRPr lang="en-US"/>
-    </a:p>
-  </c:txPr>
-  <c:externalData r:id="rId3">
-    <c:autoUpdate val="0"/>
-  </c:externalData>
-</c:chartSpace>
-</file>
-
-<file path=ppt/charts/colors1.xml><?xml version="1.0" encoding="utf-8"?>
-<cs:colorStyle xmlns:cs="http://schemas.microsoft.com/office/drawing/2012/chartStyle" xmlns:a="http://schemas.openxmlformats.org/drawingml/2006/main" meth="cycle" id="10">
-  <a:schemeClr val="accent1"/>
-  <a:schemeClr val="accent2"/>
-  <a:schemeClr val="accent3"/>
-  <a:schemeClr val="accent4"/>
-  <a:schemeClr val="accent5"/>
-  <a:schemeClr val="accent6"/>
-  <cs:variation/>
-  <cs:variation>
-    <a:lumMod val="60000"/>
-  </cs:variation>
-  <cs:variation>
-    <a:lumMod val="80000"/>
-    <a:lumOff val="20000"/>
-  </cs:variation>
-  <cs:variation>
-    <a:lumMod val="80000"/>
-  </cs:variation>
-  <cs:variation>
-    <a:lumMod val="60000"/>
-    <a:lumOff val="40000"/>
-  </cs:variation>
-  <cs:variation>
-    <a:lumMod val="50000"/>
-  </cs:variation>
-  <cs:variation>
-    <a:lumMod val="70000"/>
-    <a:lumOff val="30000"/>
-  </cs:variation>
-  <cs:variation>
-    <a:lumMod val="70000"/>
-  </cs:variation>
-  <cs:variation>
-    <a:lumMod val="50000"/>
-    <a:lumOff val="50000"/>
-  </cs:variation>
-</cs:colorStyle>
-</file>
-
-<file path=ppt/charts/style1.xml><?xml version="1.0" encoding="utf-8"?>
-<cs:chartStyle xmlns:cs="http://schemas.microsoft.com/office/drawing/2012/chartStyle" xmlns:a="http://schemas.openxmlformats.org/drawingml/2006/main" id="216">
-  <cs:axisTitle>
-    <cs:lnRef idx="0"/>
-    <cs:fillRef idx="0"/>
-    <cs:effectRef idx="0"/>
-    <cs:fontRef idx="minor">
-      <a:schemeClr val="tx1">
-        <a:lumMod val="65000"/>
-        <a:lumOff val="35000"/>
-      </a:schemeClr>
-    </cs:fontRef>
-    <cs:defRPr sz="1330" kern="1200"/>
-  </cs:axisTitle>
-  <cs:categoryAxis>
-    <cs:lnRef idx="0"/>
-    <cs:fillRef idx="0"/>
-    <cs:effectRef idx="0"/>
-    <cs:fontRef idx="minor">
-      <a:schemeClr val="tx1">
-        <a:lumMod val="65000"/>
-        <a:lumOff val="35000"/>
-      </a:schemeClr>
-    </cs:fontRef>
-    <cs:spPr>
-      <a:ln w="9525" cap="flat" cmpd="sng" algn="ctr">
-        <a:solidFill>
-          <a:schemeClr val="tx1">
-            <a:lumMod val="15000"/>
-            <a:lumOff val="85000"/>
-          </a:schemeClr>
-        </a:solidFill>
-        <a:round/>
-      </a:ln>
-    </cs:spPr>
-    <cs:defRPr sz="1197" kern="1200"/>
-  </cs:categoryAxis>
-  <cs:chartArea mods="allowNoFillOverride allowNoLineOverride">
-    <cs:lnRef idx="0"/>
-    <cs:fillRef idx="0"/>
-    <cs:effectRef idx="0"/>
-    <cs:fontRef idx="minor">
-      <a:schemeClr val="tx1"/>
-    </cs:fontRef>
-    <cs:spPr>
-      <a:solidFill>
-        <a:schemeClr val="bg1"/>
-      </a:solidFill>
-      <a:ln w="9525" cap="flat" cmpd="sng" algn="ctr">
-        <a:solidFill>
-          <a:schemeClr val="tx1">
-            <a:lumMod val="15000"/>
-            <a:lumOff val="85000"/>
-          </a:schemeClr>
-        </a:solidFill>
-        <a:round/>
-      </a:ln>
-    </cs:spPr>
-    <cs:defRPr sz="1330" kern="1200"/>
-  </cs:chartArea>
-  <cs:dataLabel>
-    <cs:lnRef idx="0"/>
-    <cs:fillRef idx="0"/>
-    <cs:effectRef idx="0"/>
-    <cs:fontRef idx="minor">
-      <a:schemeClr val="tx1">
-        <a:lumMod val="75000"/>
-        <a:lumOff val="25000"/>
-      </a:schemeClr>
-    </cs:fontRef>
-    <cs:defRPr sz="1197" kern="1200"/>
-  </cs:dataLabel>
-  <cs:dataLabelCallout>
-    <cs:lnRef idx="0"/>
-    <cs:fillRef idx="0"/>
-    <cs:effectRef idx="0"/>
-    <cs:fontRef idx="minor">
-      <a:schemeClr val="dk1">
-        <a:lumMod val="65000"/>
-        <a:lumOff val="35000"/>
-      </a:schemeClr>
-    </cs:fontRef>
-    <cs:spPr>
-      <a:solidFill>
-        <a:schemeClr val="lt1"/>
-      </a:solidFill>
-      <a:ln>
-        <a:solidFill>
-          <a:schemeClr val="dk1">
-            <a:lumMod val="25000"/>
-            <a:lumOff val="75000"/>
-          </a:schemeClr>
-        </a:solidFill>
-      </a:ln>
-    </cs:spPr>
-    <cs:defRPr sz="1197" kern="1200"/>
-    <cs:bodyPr rot="0" spcFirstLastPara="1" vertOverflow="clip" horzOverflow="clip" vert="horz" wrap="square" lIns="36576" tIns="18288" rIns="36576" bIns="18288" anchor="ctr" anchorCtr="1">
-      <a:spAutoFit/>
-    </cs:bodyPr>
-  </cs:dataLabelCallout>
-  <cs:dataPoint>
-    <cs:lnRef idx="0"/>
-    <cs:fillRef idx="1">
-      <cs:styleClr val="auto"/>
-    </cs:fillRef>
-    <cs:effectRef idx="0"/>
-    <cs:fontRef idx="minor">
-      <a:schemeClr val="tx1"/>
-    </cs:fontRef>
-  </cs:dataPoint>
-  <cs:dataPoint3D>
-    <cs:lnRef idx="0"/>
-    <cs:fillRef idx="1">
-      <cs:styleClr val="auto"/>
-    </cs:fillRef>
-    <cs:effectRef idx="0"/>
-    <cs:fontRef idx="minor">
-      <a:schemeClr val="tx1"/>
-    </cs:fontRef>
-  </cs:dataPoint3D>
-  <cs:dataPointLine>
-    <cs:lnRef idx="0">
-      <cs:styleClr val="auto"/>
-    </cs:lnRef>
-    <cs:fillRef idx="1"/>
-    <cs:effectRef idx="0"/>
-    <cs:fontRef idx="minor">
-      <a:schemeClr val="tx1"/>
-    </cs:fontRef>
-    <cs:spPr>
-      <a:ln w="28575" cap="rnd">
-        <a:solidFill>
-          <a:schemeClr val="phClr"/>
-        </a:solidFill>
-        <a:round/>
-      </a:ln>
-    </cs:spPr>
-  </cs:dataPointLine>
-  <cs:dataPointMarker>
-    <cs:lnRef idx="0">
-      <cs:styleClr val="auto"/>
-    </cs:lnRef>
-    <cs:fillRef idx="1">
-      <cs:styleClr val="auto"/>
-    </cs:fillRef>
-    <cs:effectRef idx="0"/>
-    <cs:fontRef idx="minor">
-      <a:schemeClr val="tx1"/>
-    </cs:fontRef>
-    <cs:spPr>
-      <a:ln w="9525">
-        <a:solidFill>
-          <a:schemeClr val="phClr"/>
-        </a:solidFill>
-      </a:ln>
-    </cs:spPr>
-  </cs:dataPointMarker>
-  <cs:dataPointMarkerLayout symbol="circle" size="5"/>
-  <cs:dataPointWireframe>
-    <cs:lnRef idx="0">
-      <cs:styleClr val="auto"/>
-    </cs:lnRef>
-    <cs:fillRef idx="1"/>
-    <cs:effectRef idx="0"/>
-    <cs:fontRef idx="minor">
-      <a:schemeClr val="tx1"/>
-    </cs:fontRef>
-    <cs:spPr>
-      <a:ln w="9525" cap="rnd">
-        <a:solidFill>
-          <a:schemeClr val="phClr"/>
-        </a:solidFill>
-        <a:round/>
-      </a:ln>
-    </cs:spPr>
-  </cs:dataPointWireframe>
-  <cs:dataTable>
-    <cs:lnRef idx="0"/>
-    <cs:fillRef idx="0"/>
-    <cs:effectRef idx="0"/>
-    <cs:fontRef idx="minor">
-      <a:schemeClr val="tx1">
-        <a:lumMod val="65000"/>
-        <a:lumOff val="35000"/>
-      </a:schemeClr>
-    </cs:fontRef>
-    <cs:spPr>
-      <a:noFill/>
-      <a:ln w="9525" cap="flat" cmpd="sng" algn="ctr">
-        <a:solidFill>
-          <a:schemeClr val="tx1">
-            <a:lumMod val="15000"/>
-            <a:lumOff val="85000"/>
-          </a:schemeClr>
-        </a:solidFill>
-        <a:round/>
-      </a:ln>
-    </cs:spPr>
-    <cs:defRPr sz="1197" kern="1200"/>
-  </cs:dataTable>
-  <cs:downBar>
-    <cs:lnRef idx="0"/>
-    <cs:fillRef idx="0"/>
-    <cs:effectRef idx="0"/>
-    <cs:fontRef idx="minor">
-      <a:schemeClr val="tx1"/>
-    </cs:fontRef>
-    <cs:spPr>
-      <a:solidFill>
-        <a:schemeClr val="dk1">
-          <a:lumMod val="75000"/>
-          <a:lumOff val="25000"/>
-        </a:schemeClr>
-      </a:solidFill>
-      <a:ln w="9525" cap="flat" cmpd="sng" algn="ctr">
-        <a:solidFill>
-          <a:schemeClr val="tx1">
-            <a:lumMod val="65000"/>
-            <a:lumOff val="35000"/>
-          </a:schemeClr>
-        </a:solidFill>
-        <a:round/>
-      </a:ln>
-    </cs:spPr>
-  </cs:downBar>
-  <cs:dropLine>
-    <cs:lnRef idx="0"/>
-    <cs:fillRef idx="0"/>
-    <cs:effectRef idx="0"/>
-    <cs:fontRef idx="minor">
-      <a:schemeClr val="tx1"/>
-    </cs:fontRef>
-    <cs:spPr>
-      <a:ln w="9525" cap="flat" cmpd="sng" algn="ctr">
-        <a:solidFill>
-          <a:schemeClr val="tx1">
-            <a:lumMod val="35000"/>
-            <a:lumOff val="65000"/>
-          </a:schemeClr>
-        </a:solidFill>
-        <a:round/>
-      </a:ln>
-    </cs:spPr>
-  </cs:dropLine>
-  <cs:errorBar>
-    <cs:lnRef idx="0"/>
-    <cs:fillRef idx="0"/>
-    <cs:effectRef idx="0"/>
-    <cs:fontRef idx="minor">
-      <a:schemeClr val="tx1"/>
-    </cs:fontRef>
-    <cs:spPr>
-      <a:ln w="9525" cap="flat" cmpd="sng" algn="ctr">
-        <a:solidFill>
-          <a:schemeClr val="tx1">
-            <a:lumMod val="65000"/>
-            <a:lumOff val="35000"/>
-          </a:schemeClr>
-        </a:solidFill>
-        <a:round/>
-      </a:ln>
-    </cs:spPr>
-  </cs:errorBar>
-  <cs:floor>
-    <cs:lnRef idx="0"/>
-    <cs:fillRef idx="0"/>
-    <cs:effectRef idx="0"/>
-    <cs:fontRef idx="minor">
-      <a:schemeClr val="tx1"/>
-    </cs:fontRef>
-    <cs:spPr>
-      <a:noFill/>
-      <a:ln>
-        <a:noFill/>
-      </a:ln>
-    </cs:spPr>
-  </cs:floor>
-  <cs:gridlineMajor>
-    <cs:lnRef idx="0"/>
-    <cs:fillRef idx="0"/>
-    <cs:effectRef idx="0"/>
-    <cs:fontRef idx="minor">
-      <a:schemeClr val="tx1"/>
-    </cs:fontRef>
-    <cs:spPr>
-      <a:ln w="9525" cap="flat" cmpd="sng" algn="ctr">
-        <a:solidFill>
-          <a:schemeClr val="tx1">
-            <a:lumMod val="15000"/>
-            <a:lumOff val="85000"/>
-          </a:schemeClr>
-        </a:solidFill>
-        <a:round/>
-      </a:ln>
-    </cs:spPr>
-  </cs:gridlineMajor>
-  <cs:gridlineMinor>
-    <cs:lnRef idx="0"/>
-    <cs:fillRef idx="0"/>
-    <cs:effectRef idx="0"/>
-    <cs:fontRef idx="minor">
-      <a:schemeClr val="tx1"/>
-    </cs:fontRef>
-    <cs:spPr>
-      <a:ln w="9525" cap="flat" cmpd="sng" algn="ctr">
-        <a:solidFill>
-          <a:schemeClr val="tx1">
-            <a:lumMod val="5000"/>
-            <a:lumOff val="95000"/>
-          </a:schemeClr>
-        </a:solidFill>
-        <a:round/>
-      </a:ln>
-    </cs:spPr>
-  </cs:gridlineMinor>
-  <cs:hiLoLine>
-    <cs:lnRef idx="0"/>
-    <cs:fillRef idx="0"/>
-    <cs:effectRef idx="0"/>
-    <cs:fontRef idx="minor">
-      <a:schemeClr val="tx1"/>
-    </cs:fontRef>
-    <cs:spPr>
-      <a:ln w="9525" cap="flat" cmpd="sng" algn="ctr">
-        <a:solidFill>
-          <a:schemeClr val="tx1">
-            <a:lumMod val="50000"/>
-            <a:lumOff val="50000"/>
-          </a:schemeClr>
-        </a:solidFill>
-        <a:round/>
-      </a:ln>
-    </cs:spPr>
-  </cs:hiLoLine>
-  <cs:leaderLine>
-    <cs:lnRef idx="0"/>
-    <cs:fillRef idx="0"/>
-    <cs:effectRef idx="0"/>
-    <cs:fontRef idx="minor">
-      <a:schemeClr val="tx1"/>
-    </cs:fontRef>
-    <cs:spPr>
-      <a:ln w="9525" cap="flat" cmpd="sng" algn="ctr">
-        <a:solidFill>
-          <a:schemeClr val="tx1">
-            <a:lumMod val="35000"/>
-            <a:lumOff val="65000"/>
-          </a:schemeClr>
-        </a:solidFill>
-        <a:round/>
-      </a:ln>
-    </cs:spPr>
-  </cs:leaderLine>
-  <cs:legend>
-    <cs:lnRef idx="0"/>
-    <cs:fillRef idx="0"/>
-    <cs:effectRef idx="0"/>
-    <cs:fontRef idx="minor">
-      <a:schemeClr val="tx1">
-        <a:lumMod val="65000"/>
-        <a:lumOff val="35000"/>
-      </a:schemeClr>
-    </cs:fontRef>
-    <cs:defRPr sz="1197" kern="1200"/>
-  </cs:legend>
-  <cs:plotArea mods="allowNoFillOverride allowNoLineOverride">
-    <cs:lnRef idx="0"/>
-    <cs:fillRef idx="0"/>
-    <cs:effectRef idx="0"/>
-    <cs:fontRef idx="minor">
-      <a:schemeClr val="tx1"/>
-    </cs:fontRef>
-  </cs:plotArea>
-  <cs:plotArea3D mods="allowNoFillOverride allowNoLineOverride">
-    <cs:lnRef idx="0"/>
-    <cs:fillRef idx="0"/>
-    <cs:effectRef idx="0"/>
-    <cs:fontRef idx="minor">
-      <a:schemeClr val="tx1"/>
-    </cs:fontRef>
-  </cs:plotArea3D>
-  <cs:seriesAxis>
-    <cs:lnRef idx="0"/>
-    <cs:fillRef idx="0"/>
-    <cs:effectRef idx="0"/>
-    <cs:fontRef idx="minor">
-      <a:schemeClr val="tx1">
-        <a:lumMod val="65000"/>
-        <a:lumOff val="35000"/>
-      </a:schemeClr>
-    </cs:fontRef>
-    <cs:defRPr sz="1197" kern="1200"/>
-  </cs:seriesAxis>
-  <cs:seriesLine>
-    <cs:lnRef idx="0"/>
-    <cs:fillRef idx="0"/>
-    <cs:effectRef idx="0"/>
-    <cs:fontRef idx="minor">
-      <a:schemeClr val="tx1"/>
-    </cs:fontRef>
-    <cs:spPr>
-      <a:ln w="9525" cap="flat" cmpd="sng" algn="ctr">
-        <a:solidFill>
-          <a:schemeClr val="tx1">
-            <a:lumMod val="35000"/>
-            <a:lumOff val="65000"/>
-          </a:schemeClr>
-        </a:solidFill>
-        <a:round/>
-      </a:ln>
-    </cs:spPr>
-  </cs:seriesLine>
-  <cs:title>
-    <cs:lnRef idx="0"/>
-    <cs:fillRef idx="0"/>
-    <cs:effectRef idx="0"/>
-    <cs:fontRef idx="minor">
-      <a:schemeClr val="tx1">
-        <a:lumMod val="65000"/>
-        <a:lumOff val="35000"/>
-      </a:schemeClr>
-    </cs:fontRef>
-    <cs:defRPr sz="1862" b="0" kern="1200" spc="0" baseline="0"/>
-  </cs:title>
-  <cs:trendline>
-    <cs:lnRef idx="0">
-      <cs:styleClr val="auto"/>
-    </cs:lnRef>
-    <cs:fillRef idx="0"/>
-    <cs:effectRef idx="0"/>
-    <cs:fontRef idx="minor">
-      <a:schemeClr val="tx1"/>
-    </cs:fontRef>
-    <cs:spPr>
-      <a:ln w="19050" cap="rnd">
-        <a:solidFill>
-          <a:schemeClr val="phClr"/>
-        </a:solidFill>
-        <a:prstDash val="sysDot"/>
-      </a:ln>
-    </cs:spPr>
-  </cs:trendline>
-  <cs:trendlineLabel>
-    <cs:lnRef idx="0"/>
-    <cs:fillRef idx="0"/>
-    <cs:effectRef idx="0"/>
-    <cs:fontRef idx="minor">
-      <a:schemeClr val="tx1">
-        <a:lumMod val="65000"/>
-        <a:lumOff val="35000"/>
-      </a:schemeClr>
-    </cs:fontRef>
-    <cs:defRPr sz="1197" kern="1200"/>
-  </cs:trendlineLabel>
-  <cs:upBar>
-    <cs:lnRef idx="0"/>
-    <cs:fillRef idx="0"/>
-    <cs:effectRef idx="0"/>
-    <cs:fontRef idx="minor">
-      <a:schemeClr val="tx1"/>
-    </cs:fontRef>
-    <cs:spPr>
-      <a:solidFill>
-        <a:schemeClr val="lt1"/>
-      </a:solidFill>
-      <a:ln w="9525" cap="flat" cmpd="sng" algn="ctr">
-        <a:solidFill>
-          <a:schemeClr val="tx1">
-            <a:lumMod val="65000"/>
-            <a:lumOff val="35000"/>
-          </a:schemeClr>
-        </a:solidFill>
-        <a:round/>
-      </a:ln>
-    </cs:spPr>
-  </cs:upBar>
-  <cs:valueAxis>
-    <cs:lnRef idx="0"/>
-    <cs:fillRef idx="0"/>
-    <cs:effectRef idx="0"/>
-    <cs:fontRef idx="minor">
-      <a:schemeClr val="tx1">
-        <a:lumMod val="65000"/>
-        <a:lumOff val="35000"/>
-      </a:schemeClr>
-    </cs:fontRef>
-    <cs:defRPr sz="1197" kern="1200"/>
-  </cs:valueAxis>
-  <cs:wall>
-    <cs:lnRef idx="0"/>
-    <cs:fillRef idx="0"/>
-    <cs:effectRef idx="0"/>
-    <cs:fontRef idx="minor">
-      <a:schemeClr val="tx1"/>
-    </cs:fontRef>
-    <cs:spPr>
-      <a:noFill/>
-      <a:ln>
-        <a:noFill/>
-      </a:ln>
-    </cs:spPr>
-  </cs:wall>
-</cs:chartStyle>
-</file>
-
 <file path=ppt/notesMasters/notesMaster1.xml><?xml version="1.0" encoding="utf-8"?>
 <p:notesMaster xmlns:a="http://schemas.openxmlformats.org/drawingml/2006/main" xmlns:r="http://schemas.openxmlformats.org/officeDocument/2006/relationships" xmlns:p="http://schemas.openxmlformats.org/presentationml/2006/main">
   <p:cSld>
@@ -1610,151 +456,6 @@
           <a:bodyPr/>
           <a:lstStyle/>
           <a:p>
-            <a:pPr marL="0" marR="0" lvl="0" indent="0" algn="l" defTabSz="914400" rtl="0" eaLnBrk="1" fontAlgn="auto" latinLnBrk="0" hangingPunct="1">
-              <a:lnSpc>
-                <a:spcPct val="100000"/>
-              </a:lnSpc>
-              <a:spcBef>
-                <a:spcPts val="0"/>
-              </a:spcBef>
-              <a:spcAft>
-                <a:spcPts val="0"/>
-              </a:spcAft>
-              <a:buClrTx/>
-              <a:buSzTx/>
-              <a:buFontTx/>
-              <a:buNone/>
-              <a:tabLst/>
-              <a:defRPr/>
-            </a:pPr>
-            <a:r>
-              <a:rPr lang="en-US" b="0" i="0" dirty="0">
-                <a:solidFill>
-                  <a:schemeClr val="tx1"/>
-                </a:solidFill>
-                <a:effectLst/>
-                <a:latin typeface="-apple-system"/>
-              </a:rPr>
-              <a:t>Understanding the threshold for fair compensation is super important. It allows employers to know what is a fair wage to offer to people. This information can </a:t>
-            </a:r>
-            <a:r>
-              <a:rPr lang="en-US" b="0" i="0" dirty="0">
-                <a:solidFill>
-                  <a:srgbClr val="BDB7AF"/>
-                </a:solidFill>
-                <a:effectLst/>
-                <a:latin typeface="Söhne"/>
-              </a:rPr>
-              <a:t>ensure they are being fairly compensated for their skills, experience, and contributions. </a:t>
-            </a:r>
-            <a:endParaRPr lang="en-US" b="0" i="0" dirty="0">
-              <a:solidFill>
-                <a:schemeClr val="tx1"/>
-              </a:solidFill>
-              <a:effectLst/>
-              <a:latin typeface="-apple-system"/>
-            </a:endParaRPr>
-          </a:p>
-          <a:p>
-            <a:pPr marL="0" marR="0" lvl="0" indent="0" algn="l" defTabSz="914400" rtl="0" eaLnBrk="1" fontAlgn="auto" latinLnBrk="0" hangingPunct="1">
-              <a:lnSpc>
-                <a:spcPct val="100000"/>
-              </a:lnSpc>
-              <a:spcBef>
-                <a:spcPts val="0"/>
-              </a:spcBef>
-              <a:spcAft>
-                <a:spcPts val="0"/>
-              </a:spcAft>
-              <a:buClrTx/>
-              <a:buSzTx/>
-              <a:buFontTx/>
-              <a:buNone/>
-              <a:tabLst/>
-              <a:defRPr/>
-            </a:pPr>
-            <a:r>
-              <a:rPr lang="en-US" b="0" i="0" dirty="0">
-                <a:solidFill>
-                  <a:schemeClr val="tx1"/>
-                </a:solidFill>
-                <a:effectLst/>
-                <a:latin typeface="-apple-system"/>
-              </a:rPr>
-              <a:t>Wage information also allows those in search of a job to know what to expect. </a:t>
-            </a:r>
-          </a:p>
-          <a:p>
-            <a:pPr marL="0" marR="0" lvl="0" indent="0" algn="l" defTabSz="914400" rtl="0" eaLnBrk="1" fontAlgn="auto" latinLnBrk="0" hangingPunct="1">
-              <a:lnSpc>
-                <a:spcPct val="100000"/>
-              </a:lnSpc>
-              <a:spcBef>
-                <a:spcPts val="0"/>
-              </a:spcBef>
-              <a:spcAft>
-                <a:spcPts val="0"/>
-              </a:spcAft>
-              <a:buClrTx/>
-              <a:buSzTx/>
-              <a:buFontTx/>
-              <a:buNone/>
-              <a:tabLst/>
-              <a:defRPr/>
-            </a:pPr>
-            <a:r>
-              <a:rPr lang="en-US" b="0" i="0" dirty="0">
-                <a:solidFill>
-                  <a:srgbClr val="BDB7AF"/>
-                </a:solidFill>
-                <a:effectLst/>
-                <a:latin typeface="Söhne"/>
-              </a:rPr>
-              <a:t>This data can help individuals make informed decisions about career paths, job changes, and skill development to maximize their earning potential.</a:t>
-            </a:r>
-            <a:endParaRPr lang="en-US" b="0" i="0" dirty="0">
-              <a:solidFill>
-                <a:schemeClr val="tx1"/>
-              </a:solidFill>
-              <a:effectLst/>
-              <a:latin typeface="-apple-system"/>
-            </a:endParaRPr>
-          </a:p>
-          <a:p>
-            <a:pPr marL="0" marR="0" lvl="0" indent="0" algn="l" defTabSz="914400" rtl="0" eaLnBrk="1" fontAlgn="auto" latinLnBrk="0" hangingPunct="1">
-              <a:lnSpc>
-                <a:spcPct val="100000"/>
-              </a:lnSpc>
-              <a:spcBef>
-                <a:spcPts val="0"/>
-              </a:spcBef>
-              <a:spcAft>
-                <a:spcPts val="0"/>
-              </a:spcAft>
-              <a:buClrTx/>
-              <a:buSzTx/>
-              <a:buFontTx/>
-              <a:buNone/>
-              <a:tabLst/>
-              <a:defRPr/>
-            </a:pPr>
-            <a:r>
-              <a:rPr lang="en-US" b="0" i="0" dirty="0">
-                <a:solidFill>
-                  <a:srgbClr val="BDB7AF"/>
-                </a:solidFill>
-                <a:effectLst/>
-                <a:latin typeface="Söhne"/>
-              </a:rPr>
-              <a:t>Access to salary information promotes transparency within organizations and across industries. </a:t>
-            </a:r>
-            <a:endParaRPr lang="en-US" dirty="0">
-              <a:solidFill>
-                <a:schemeClr val="tx1"/>
-              </a:solidFill>
-            </a:endParaRPr>
-          </a:p>
-          <a:p>
             <a:endParaRPr lang="en-US" dirty="0"/>
           </a:p>
         </p:txBody>
@@ -1762,7 +463,7 @@
     </p:spTree>
     <p:extLst>
       <p:ext uri="{BB962C8B-B14F-4D97-AF65-F5344CB8AC3E}">
-        <p14:creationId xmlns:p14="http://schemas.microsoft.com/office/powerpoint/2010/main" val="2932340435"/>
+        <p14:creationId xmlns:p14="http://schemas.microsoft.com/office/powerpoint/2010/main" val="4290754978"/>
       </p:ext>
     </p:extLst>
   </p:cSld>
@@ -1838,14 +539,159 @@
           <a:bodyPr/>
           <a:lstStyle/>
           <a:p>
-            <a:endParaRPr lang="en-US"/>
+            <a:pPr marL="0" marR="0" lvl="0" indent="0" algn="l" defTabSz="914400" rtl="0" eaLnBrk="1" fontAlgn="auto" latinLnBrk="0" hangingPunct="1">
+              <a:lnSpc>
+                <a:spcPct val="100000"/>
+              </a:lnSpc>
+              <a:spcBef>
+                <a:spcPts val="0"/>
+              </a:spcBef>
+              <a:spcAft>
+                <a:spcPts val="0"/>
+              </a:spcAft>
+              <a:buClrTx/>
+              <a:buSzTx/>
+              <a:buFontTx/>
+              <a:buNone/>
+              <a:tabLst/>
+              <a:defRPr/>
+            </a:pPr>
+            <a:r>
+              <a:rPr lang="en-US" b="0" i="0" dirty="0">
+                <a:solidFill>
+                  <a:schemeClr val="tx1"/>
+                </a:solidFill>
+                <a:effectLst/>
+                <a:latin typeface="-apple-system"/>
+              </a:rPr>
+              <a:t>Understanding the threshold for fair compensation is super important. It allows employers to know what is a fair wage to offer to people. This information can </a:t>
+            </a:r>
+            <a:r>
+              <a:rPr lang="en-US" b="0" i="0" dirty="0">
+                <a:solidFill>
+                  <a:srgbClr val="BDB7AF"/>
+                </a:solidFill>
+                <a:effectLst/>
+                <a:latin typeface="Söhne"/>
+              </a:rPr>
+              <a:t>ensure they are being fairly compensated for their skills, experience, and contributions. </a:t>
+            </a:r>
+            <a:endParaRPr lang="en-US" b="0" i="0" dirty="0">
+              <a:solidFill>
+                <a:schemeClr val="tx1"/>
+              </a:solidFill>
+              <a:effectLst/>
+              <a:latin typeface="-apple-system"/>
+            </a:endParaRPr>
+          </a:p>
+          <a:p>
+            <a:pPr marL="0" marR="0" lvl="0" indent="0" algn="l" defTabSz="914400" rtl="0" eaLnBrk="1" fontAlgn="auto" latinLnBrk="0" hangingPunct="1">
+              <a:lnSpc>
+                <a:spcPct val="100000"/>
+              </a:lnSpc>
+              <a:spcBef>
+                <a:spcPts val="0"/>
+              </a:spcBef>
+              <a:spcAft>
+                <a:spcPts val="0"/>
+              </a:spcAft>
+              <a:buClrTx/>
+              <a:buSzTx/>
+              <a:buFontTx/>
+              <a:buNone/>
+              <a:tabLst/>
+              <a:defRPr/>
+            </a:pPr>
+            <a:r>
+              <a:rPr lang="en-US" b="0" i="0" dirty="0">
+                <a:solidFill>
+                  <a:schemeClr val="tx1"/>
+                </a:solidFill>
+                <a:effectLst/>
+                <a:latin typeface="-apple-system"/>
+              </a:rPr>
+              <a:t>Wage information also allows those in search of a job to know what to expect. </a:t>
+            </a:r>
+          </a:p>
+          <a:p>
+            <a:pPr marL="0" marR="0" lvl="0" indent="0" algn="l" defTabSz="914400" rtl="0" eaLnBrk="1" fontAlgn="auto" latinLnBrk="0" hangingPunct="1">
+              <a:lnSpc>
+                <a:spcPct val="100000"/>
+              </a:lnSpc>
+              <a:spcBef>
+                <a:spcPts val="0"/>
+              </a:spcBef>
+              <a:spcAft>
+                <a:spcPts val="0"/>
+              </a:spcAft>
+              <a:buClrTx/>
+              <a:buSzTx/>
+              <a:buFontTx/>
+              <a:buNone/>
+              <a:tabLst/>
+              <a:defRPr/>
+            </a:pPr>
+            <a:r>
+              <a:rPr lang="en-US" b="0" i="0" dirty="0">
+                <a:solidFill>
+                  <a:srgbClr val="BDB7AF"/>
+                </a:solidFill>
+                <a:effectLst/>
+                <a:latin typeface="Söhne"/>
+              </a:rPr>
+              <a:t>This data can help individuals make informed decisions about career paths, job changes, and skill development to maximize their earning potential.</a:t>
+            </a:r>
+            <a:endParaRPr lang="en-US" b="0" i="0" dirty="0">
+              <a:solidFill>
+                <a:schemeClr val="tx1"/>
+              </a:solidFill>
+              <a:effectLst/>
+              <a:latin typeface="-apple-system"/>
+            </a:endParaRPr>
+          </a:p>
+          <a:p>
+            <a:pPr marL="0" marR="0" lvl="0" indent="0" algn="l" defTabSz="914400" rtl="0" eaLnBrk="1" fontAlgn="auto" latinLnBrk="0" hangingPunct="1">
+              <a:lnSpc>
+                <a:spcPct val="100000"/>
+              </a:lnSpc>
+              <a:spcBef>
+                <a:spcPts val="0"/>
+              </a:spcBef>
+              <a:spcAft>
+                <a:spcPts val="0"/>
+              </a:spcAft>
+              <a:buClrTx/>
+              <a:buSzTx/>
+              <a:buFontTx/>
+              <a:buNone/>
+              <a:tabLst/>
+              <a:defRPr/>
+            </a:pPr>
+            <a:r>
+              <a:rPr lang="en-US" b="0" i="0" dirty="0">
+                <a:solidFill>
+                  <a:srgbClr val="BDB7AF"/>
+                </a:solidFill>
+                <a:effectLst/>
+                <a:latin typeface="Söhne"/>
+              </a:rPr>
+              <a:t>Access to salary information promotes transparency within organizations and across industries. </a:t>
+            </a:r>
+            <a:endParaRPr lang="en-US" dirty="0">
+              <a:solidFill>
+                <a:schemeClr val="tx1"/>
+              </a:solidFill>
+            </a:endParaRPr>
+          </a:p>
+          <a:p>
+            <a:endParaRPr lang="en-US" dirty="0"/>
           </a:p>
         </p:txBody>
       </p:sp>
     </p:spTree>
     <p:extLst>
       <p:ext uri="{BB962C8B-B14F-4D97-AF65-F5344CB8AC3E}">
-        <p14:creationId xmlns:p14="http://schemas.microsoft.com/office/powerpoint/2010/main" val="1738597292"/>
+        <p14:creationId xmlns:p14="http://schemas.microsoft.com/office/powerpoint/2010/main" val="2932340435"/>
       </p:ext>
     </p:extLst>
   </p:cSld>
@@ -1921,6 +767,89 @@
           <a:bodyPr/>
           <a:lstStyle/>
           <a:p>
+            <a:endParaRPr lang="en-US"/>
+          </a:p>
+        </p:txBody>
+      </p:sp>
+    </p:spTree>
+    <p:extLst>
+      <p:ext uri="{BB962C8B-B14F-4D97-AF65-F5344CB8AC3E}">
+        <p14:creationId xmlns:p14="http://schemas.microsoft.com/office/powerpoint/2010/main" val="1738597292"/>
+      </p:ext>
+    </p:extLst>
+  </p:cSld>
+  <p:clrMapOvr>
+    <a:masterClrMapping/>
+  </p:clrMapOvr>
+</p:notes>
+</file>
+
+<file path=ppt/notesSlides/notesSlide4.xml><?xml version="1.0" encoding="utf-8"?>
+<p:notes xmlns:a="http://schemas.openxmlformats.org/drawingml/2006/main" xmlns:r="http://schemas.openxmlformats.org/officeDocument/2006/relationships" xmlns:p="http://schemas.openxmlformats.org/presentationml/2006/main">
+  <p:cSld>
+    <p:spTree>
+      <p:nvGrpSpPr>
+        <p:cNvPr id="1" name=""/>
+        <p:cNvGrpSpPr/>
+        <p:nvPr/>
+      </p:nvGrpSpPr>
+      <p:grpSpPr>
+        <a:xfrm>
+          <a:off x="0" y="0"/>
+          <a:ext cx="0" cy="0"/>
+          <a:chOff x="0" y="0"/>
+          <a:chExt cx="0" cy="0"/>
+        </a:xfrm>
+      </p:grpSpPr>
+      <p:sp>
+        <p:nvSpPr>
+          <p:cNvPr id="2" name="Slide Image Placeholder 1"/>
+          <p:cNvSpPr>
+            <a:spLocks noGrp="1" noRot="1" noChangeAspect="1"/>
+          </p:cNvSpPr>
+          <p:nvPr>
+            <p:ph type="sldImg"/>
+          </p:nvPr>
+        </p:nvSpPr>
+        <p:spPr>
+          <a:xfrm>
+            <a:off x="-457200" y="3048000"/>
+            <a:ext cx="14630400" cy="8229600"/>
+          </a:xfrm>
+          <a:prstGeom prst="rect">
+            <a:avLst/>
+          </a:prstGeom>
+          <a:noFill/>
+          <a:ln w="12700">
+            <a:solidFill>
+              <a:prstClr val="black"/>
+            </a:solidFill>
+          </a:ln>
+        </p:spPr>
+      </p:sp>
+      <p:sp>
+        <p:nvSpPr>
+          <p:cNvPr id="3" name="Notes Placeholder 2"/>
+          <p:cNvSpPr>
+            <a:spLocks noGrp="1"/>
+          </p:cNvSpPr>
+          <p:nvPr>
+            <p:ph type="body" idx="1"/>
+          </p:nvPr>
+        </p:nvSpPr>
+        <p:spPr>
+          <a:xfrm>
+            <a:off x="1371600" y="11734800"/>
+            <a:ext cx="10972800" cy="9601200"/>
+          </a:xfrm>
+          <a:prstGeom prst="rect">
+            <a:avLst/>
+          </a:prstGeom>
+        </p:spPr>
+        <p:txBody>
+          <a:bodyPr/>
+          <a:lstStyle/>
+          <a:p>
             <a:r>
               <a:rPr lang="en-US" dirty="0"/>
               <a:t>This dataset contained information about companies that were not located in the U.S. For the purpose of my analysis, I excluded those and only focused on U.S. based companies. </a:t>
@@ -1938,6 +867,421 @@
     <p:extLst>
       <p:ext uri="{BB962C8B-B14F-4D97-AF65-F5344CB8AC3E}">
         <p14:creationId xmlns:p14="http://schemas.microsoft.com/office/powerpoint/2010/main" val="2118610951"/>
+      </p:ext>
+    </p:extLst>
+  </p:cSld>
+  <p:clrMapOvr>
+    <a:masterClrMapping/>
+  </p:clrMapOvr>
+</p:notes>
+</file>
+
+<file path=ppt/notesSlides/notesSlide5.xml><?xml version="1.0" encoding="utf-8"?>
+<p:notes xmlns:a="http://schemas.openxmlformats.org/drawingml/2006/main" xmlns:r="http://schemas.openxmlformats.org/officeDocument/2006/relationships" xmlns:p="http://schemas.openxmlformats.org/presentationml/2006/main">
+  <p:cSld>
+    <p:spTree>
+      <p:nvGrpSpPr>
+        <p:cNvPr id="1" name=""/>
+        <p:cNvGrpSpPr/>
+        <p:nvPr/>
+      </p:nvGrpSpPr>
+      <p:grpSpPr>
+        <a:xfrm>
+          <a:off x="0" y="0"/>
+          <a:ext cx="0" cy="0"/>
+          <a:chOff x="0" y="0"/>
+          <a:chExt cx="0" cy="0"/>
+        </a:xfrm>
+      </p:grpSpPr>
+      <p:sp>
+        <p:nvSpPr>
+          <p:cNvPr id="2" name="Slide Image Placeholder 1"/>
+          <p:cNvSpPr>
+            <a:spLocks noGrp="1" noRot="1" noChangeAspect="1"/>
+          </p:cNvSpPr>
+          <p:nvPr>
+            <p:ph type="sldImg"/>
+          </p:nvPr>
+        </p:nvSpPr>
+        <p:spPr>
+          <a:xfrm>
+            <a:off x="-457200" y="3048000"/>
+            <a:ext cx="14630400" cy="8229600"/>
+          </a:xfrm>
+          <a:prstGeom prst="rect">
+            <a:avLst/>
+          </a:prstGeom>
+          <a:noFill/>
+          <a:ln w="12700">
+            <a:solidFill>
+              <a:prstClr val="black"/>
+            </a:solidFill>
+          </a:ln>
+        </p:spPr>
+      </p:sp>
+      <p:sp>
+        <p:nvSpPr>
+          <p:cNvPr id="3" name="Notes Placeholder 2"/>
+          <p:cNvSpPr>
+            <a:spLocks noGrp="1"/>
+          </p:cNvSpPr>
+          <p:nvPr>
+            <p:ph type="body" idx="1"/>
+          </p:nvPr>
+        </p:nvSpPr>
+        <p:spPr>
+          <a:xfrm>
+            <a:off x="1371600" y="11734800"/>
+            <a:ext cx="10972800" cy="9601200"/>
+          </a:xfrm>
+          <a:prstGeom prst="rect">
+            <a:avLst/>
+          </a:prstGeom>
+        </p:spPr>
+        <p:txBody>
+          <a:bodyPr/>
+          <a:lstStyle/>
+          <a:p>
+            <a:endParaRPr lang="en-US" dirty="0"/>
+          </a:p>
+        </p:txBody>
+      </p:sp>
+    </p:spTree>
+    <p:extLst>
+      <p:ext uri="{BB962C8B-B14F-4D97-AF65-F5344CB8AC3E}">
+        <p14:creationId xmlns:p14="http://schemas.microsoft.com/office/powerpoint/2010/main" val="2188932178"/>
+      </p:ext>
+    </p:extLst>
+  </p:cSld>
+  <p:clrMapOvr>
+    <a:masterClrMapping/>
+  </p:clrMapOvr>
+</p:notes>
+</file>
+
+<file path=ppt/notesSlides/notesSlide6.xml><?xml version="1.0" encoding="utf-8"?>
+<p:notes xmlns:a="http://schemas.openxmlformats.org/drawingml/2006/main" xmlns:r="http://schemas.openxmlformats.org/officeDocument/2006/relationships" xmlns:p="http://schemas.openxmlformats.org/presentationml/2006/main">
+  <p:cSld>
+    <p:spTree>
+      <p:nvGrpSpPr>
+        <p:cNvPr id="1" name=""/>
+        <p:cNvGrpSpPr/>
+        <p:nvPr/>
+      </p:nvGrpSpPr>
+      <p:grpSpPr>
+        <a:xfrm>
+          <a:off x="0" y="0"/>
+          <a:ext cx="0" cy="0"/>
+          <a:chOff x="0" y="0"/>
+          <a:chExt cx="0" cy="0"/>
+        </a:xfrm>
+      </p:grpSpPr>
+      <p:sp>
+        <p:nvSpPr>
+          <p:cNvPr id="2" name="Slide Image Placeholder 1"/>
+          <p:cNvSpPr>
+            <a:spLocks noGrp="1" noRot="1" noChangeAspect="1"/>
+          </p:cNvSpPr>
+          <p:nvPr>
+            <p:ph type="sldImg"/>
+          </p:nvPr>
+        </p:nvSpPr>
+        <p:spPr>
+          <a:xfrm>
+            <a:off x="-457200" y="3048000"/>
+            <a:ext cx="14630400" cy="8229600"/>
+          </a:xfrm>
+          <a:prstGeom prst="rect">
+            <a:avLst/>
+          </a:prstGeom>
+          <a:noFill/>
+          <a:ln w="12700">
+            <a:solidFill>
+              <a:prstClr val="black"/>
+            </a:solidFill>
+          </a:ln>
+        </p:spPr>
+      </p:sp>
+      <p:sp>
+        <p:nvSpPr>
+          <p:cNvPr id="3" name="Notes Placeholder 2"/>
+          <p:cNvSpPr>
+            <a:spLocks noGrp="1"/>
+          </p:cNvSpPr>
+          <p:nvPr>
+            <p:ph type="body" idx="1"/>
+          </p:nvPr>
+        </p:nvSpPr>
+        <p:spPr>
+          <a:xfrm>
+            <a:off x="1371600" y="11734800"/>
+            <a:ext cx="10972800" cy="9601200"/>
+          </a:xfrm>
+          <a:prstGeom prst="rect">
+            <a:avLst/>
+          </a:prstGeom>
+        </p:spPr>
+        <p:txBody>
+          <a:bodyPr/>
+          <a:lstStyle/>
+          <a:p>
+            <a:endParaRPr lang="en-US" dirty="0"/>
+          </a:p>
+        </p:txBody>
+      </p:sp>
+    </p:spTree>
+    <p:extLst>
+      <p:ext uri="{BB962C8B-B14F-4D97-AF65-F5344CB8AC3E}">
+        <p14:creationId xmlns:p14="http://schemas.microsoft.com/office/powerpoint/2010/main" val="409545456"/>
+      </p:ext>
+    </p:extLst>
+  </p:cSld>
+  <p:clrMapOvr>
+    <a:masterClrMapping/>
+  </p:clrMapOvr>
+</p:notes>
+</file>
+
+<file path=ppt/notesSlides/notesSlide7.xml><?xml version="1.0" encoding="utf-8"?>
+<p:notes xmlns:a="http://schemas.openxmlformats.org/drawingml/2006/main" xmlns:r="http://schemas.openxmlformats.org/officeDocument/2006/relationships" xmlns:p="http://schemas.openxmlformats.org/presentationml/2006/main">
+  <p:cSld>
+    <p:spTree>
+      <p:nvGrpSpPr>
+        <p:cNvPr id="1" name=""/>
+        <p:cNvGrpSpPr/>
+        <p:nvPr/>
+      </p:nvGrpSpPr>
+      <p:grpSpPr>
+        <a:xfrm>
+          <a:off x="0" y="0"/>
+          <a:ext cx="0" cy="0"/>
+          <a:chOff x="0" y="0"/>
+          <a:chExt cx="0" cy="0"/>
+        </a:xfrm>
+      </p:grpSpPr>
+      <p:sp>
+        <p:nvSpPr>
+          <p:cNvPr id="2" name="Slide Image Placeholder 1"/>
+          <p:cNvSpPr>
+            <a:spLocks noGrp="1" noRot="1" noChangeAspect="1"/>
+          </p:cNvSpPr>
+          <p:nvPr>
+            <p:ph type="sldImg"/>
+          </p:nvPr>
+        </p:nvSpPr>
+        <p:spPr>
+          <a:xfrm>
+            <a:off x="-457200" y="3048000"/>
+            <a:ext cx="14630400" cy="8229600"/>
+          </a:xfrm>
+          <a:prstGeom prst="rect">
+            <a:avLst/>
+          </a:prstGeom>
+          <a:noFill/>
+          <a:ln w="12700">
+            <a:solidFill>
+              <a:prstClr val="black"/>
+            </a:solidFill>
+          </a:ln>
+        </p:spPr>
+      </p:sp>
+      <p:sp>
+        <p:nvSpPr>
+          <p:cNvPr id="3" name="Notes Placeholder 2"/>
+          <p:cNvSpPr>
+            <a:spLocks noGrp="1"/>
+          </p:cNvSpPr>
+          <p:nvPr>
+            <p:ph type="body" idx="1"/>
+          </p:nvPr>
+        </p:nvSpPr>
+        <p:spPr>
+          <a:xfrm>
+            <a:off x="1371600" y="11734800"/>
+            <a:ext cx="10972800" cy="9601200"/>
+          </a:xfrm>
+          <a:prstGeom prst="rect">
+            <a:avLst/>
+          </a:prstGeom>
+        </p:spPr>
+        <p:txBody>
+          <a:bodyPr/>
+          <a:lstStyle/>
+          <a:p>
+            <a:endParaRPr lang="en-US" dirty="0"/>
+          </a:p>
+        </p:txBody>
+      </p:sp>
+    </p:spTree>
+    <p:extLst>
+      <p:ext uri="{BB962C8B-B14F-4D97-AF65-F5344CB8AC3E}">
+        <p14:creationId xmlns:p14="http://schemas.microsoft.com/office/powerpoint/2010/main" val="2150124098"/>
+      </p:ext>
+    </p:extLst>
+  </p:cSld>
+  <p:clrMapOvr>
+    <a:masterClrMapping/>
+  </p:clrMapOvr>
+</p:notes>
+</file>
+
+<file path=ppt/notesSlides/notesSlide8.xml><?xml version="1.0" encoding="utf-8"?>
+<p:notes xmlns:a="http://schemas.openxmlformats.org/drawingml/2006/main" xmlns:r="http://schemas.openxmlformats.org/officeDocument/2006/relationships" xmlns:p="http://schemas.openxmlformats.org/presentationml/2006/main">
+  <p:cSld>
+    <p:spTree>
+      <p:nvGrpSpPr>
+        <p:cNvPr id="1" name=""/>
+        <p:cNvGrpSpPr/>
+        <p:nvPr/>
+      </p:nvGrpSpPr>
+      <p:grpSpPr>
+        <a:xfrm>
+          <a:off x="0" y="0"/>
+          <a:ext cx="0" cy="0"/>
+          <a:chOff x="0" y="0"/>
+          <a:chExt cx="0" cy="0"/>
+        </a:xfrm>
+      </p:grpSpPr>
+      <p:sp>
+        <p:nvSpPr>
+          <p:cNvPr id="2" name="Slide Image Placeholder 1"/>
+          <p:cNvSpPr>
+            <a:spLocks noGrp="1" noRot="1" noChangeAspect="1"/>
+          </p:cNvSpPr>
+          <p:nvPr>
+            <p:ph type="sldImg"/>
+          </p:nvPr>
+        </p:nvSpPr>
+        <p:spPr>
+          <a:xfrm>
+            <a:off x="-457200" y="3048000"/>
+            <a:ext cx="14630400" cy="8229600"/>
+          </a:xfrm>
+          <a:prstGeom prst="rect">
+            <a:avLst/>
+          </a:prstGeom>
+          <a:noFill/>
+          <a:ln w="12700">
+            <a:solidFill>
+              <a:prstClr val="black"/>
+            </a:solidFill>
+          </a:ln>
+        </p:spPr>
+      </p:sp>
+      <p:sp>
+        <p:nvSpPr>
+          <p:cNvPr id="3" name="Notes Placeholder 2"/>
+          <p:cNvSpPr>
+            <a:spLocks noGrp="1"/>
+          </p:cNvSpPr>
+          <p:nvPr>
+            <p:ph type="body" idx="1"/>
+          </p:nvPr>
+        </p:nvSpPr>
+        <p:spPr>
+          <a:xfrm>
+            <a:off x="1371600" y="11734800"/>
+            <a:ext cx="10972800" cy="9601200"/>
+          </a:xfrm>
+          <a:prstGeom prst="rect">
+            <a:avLst/>
+          </a:prstGeom>
+        </p:spPr>
+        <p:txBody>
+          <a:bodyPr/>
+          <a:lstStyle/>
+          <a:p>
+            <a:endParaRPr lang="en-US" dirty="0"/>
+          </a:p>
+        </p:txBody>
+      </p:sp>
+    </p:spTree>
+    <p:extLst>
+      <p:ext uri="{BB962C8B-B14F-4D97-AF65-F5344CB8AC3E}">
+        <p14:creationId xmlns:p14="http://schemas.microsoft.com/office/powerpoint/2010/main" val="3408489037"/>
+      </p:ext>
+    </p:extLst>
+  </p:cSld>
+  <p:clrMapOvr>
+    <a:masterClrMapping/>
+  </p:clrMapOvr>
+</p:notes>
+</file>
+
+<file path=ppt/notesSlides/notesSlide9.xml><?xml version="1.0" encoding="utf-8"?>
+<p:notes xmlns:a="http://schemas.openxmlformats.org/drawingml/2006/main" xmlns:r="http://schemas.openxmlformats.org/officeDocument/2006/relationships" xmlns:p="http://schemas.openxmlformats.org/presentationml/2006/main">
+  <p:cSld>
+    <p:spTree>
+      <p:nvGrpSpPr>
+        <p:cNvPr id="1" name=""/>
+        <p:cNvGrpSpPr/>
+        <p:nvPr/>
+      </p:nvGrpSpPr>
+      <p:grpSpPr>
+        <a:xfrm>
+          <a:off x="0" y="0"/>
+          <a:ext cx="0" cy="0"/>
+          <a:chOff x="0" y="0"/>
+          <a:chExt cx="0" cy="0"/>
+        </a:xfrm>
+      </p:grpSpPr>
+      <p:sp>
+        <p:nvSpPr>
+          <p:cNvPr id="2" name="Slide Image Placeholder 1"/>
+          <p:cNvSpPr>
+            <a:spLocks noGrp="1" noRot="1" noChangeAspect="1"/>
+          </p:cNvSpPr>
+          <p:nvPr>
+            <p:ph type="sldImg"/>
+          </p:nvPr>
+        </p:nvSpPr>
+        <p:spPr>
+          <a:xfrm>
+            <a:off x="-457200" y="3048000"/>
+            <a:ext cx="14630400" cy="8229600"/>
+          </a:xfrm>
+          <a:prstGeom prst="rect">
+            <a:avLst/>
+          </a:prstGeom>
+          <a:noFill/>
+          <a:ln w="12700">
+            <a:solidFill>
+              <a:prstClr val="black"/>
+            </a:solidFill>
+          </a:ln>
+        </p:spPr>
+      </p:sp>
+      <p:sp>
+        <p:nvSpPr>
+          <p:cNvPr id="3" name="Notes Placeholder 2"/>
+          <p:cNvSpPr>
+            <a:spLocks noGrp="1"/>
+          </p:cNvSpPr>
+          <p:nvPr>
+            <p:ph type="body" idx="1"/>
+          </p:nvPr>
+        </p:nvSpPr>
+        <p:spPr>
+          <a:xfrm>
+            <a:off x="1371600" y="11734800"/>
+            <a:ext cx="10972800" cy="9601200"/>
+          </a:xfrm>
+          <a:prstGeom prst="rect">
+            <a:avLst/>
+          </a:prstGeom>
+        </p:spPr>
+        <p:txBody>
+          <a:bodyPr/>
+          <a:lstStyle/>
+          <a:p>
+            <a:endParaRPr lang="en-US" dirty="0"/>
+          </a:p>
+        </p:txBody>
+      </p:sp>
+    </p:spTree>
+    <p:extLst>
+      <p:ext uri="{BB962C8B-B14F-4D97-AF65-F5344CB8AC3E}">
+        <p14:creationId xmlns:p14="http://schemas.microsoft.com/office/powerpoint/2010/main" val="4261528026"/>
       </p:ext>
     </p:extLst>
   </p:cSld>
@@ -24727,7 +24071,7 @@
         </p:nvSpPr>
         <p:spPr>
           <a:xfrm>
-            <a:off x="3556475" y="1040351"/>
+            <a:off x="3556475" y="338222"/>
             <a:ext cx="5385816" cy="1225296"/>
           </a:xfrm>
         </p:spPr>
@@ -24737,7 +24081,15 @@
           <a:p>
             <a:r>
               <a:rPr lang="en-US" dirty="0"/>
-              <a:t>Data Science Salaries from 2022-2023</a:t>
+              <a:t>Full-time, </a:t>
+            </a:r>
+            <a:r>
+              <a:rPr lang="en-US" dirty="0" err="1"/>
+              <a:t>u.s.</a:t>
+            </a:r>
+            <a:r>
+              <a:rPr lang="en-US" dirty="0"/>
+              <a:t> based, Data Science Salaries from 2020-2023</a:t>
             </a:r>
             <a:br>
               <a:rPr lang="en-US" dirty="0"/>
@@ -24797,6 +24149,266 @@
 </file>
 
 <file path=ppt/slides/slide10.xml><?xml version="1.0" encoding="utf-8"?>
+<p:sld xmlns:a="http://schemas.openxmlformats.org/drawingml/2006/main" xmlns:r="http://schemas.openxmlformats.org/officeDocument/2006/relationships" xmlns:p="http://schemas.openxmlformats.org/presentationml/2006/main">
+  <p:cSld>
+    <p:spTree>
+      <p:nvGrpSpPr>
+        <p:cNvPr id="1" name=""/>
+        <p:cNvGrpSpPr/>
+        <p:nvPr/>
+      </p:nvGrpSpPr>
+      <p:grpSpPr>
+        <a:xfrm>
+          <a:off x="0" y="0"/>
+          <a:ext cx="0" cy="0"/>
+          <a:chOff x="0" y="0"/>
+          <a:chExt cx="0" cy="0"/>
+        </a:xfrm>
+      </p:grpSpPr>
+      <p:pic>
+        <p:nvPicPr>
+          <p:cNvPr id="11" name="Picture 10">
+            <a:extLst>
+              <a:ext uri="{FF2B5EF4-FFF2-40B4-BE49-F238E27FC236}">
+                <a16:creationId xmlns:a16="http://schemas.microsoft.com/office/drawing/2014/main" id="{9A8657BA-97D5-28F2-73E8-3F561BA5BA12}"/>
+              </a:ext>
+            </a:extLst>
+          </p:cNvPr>
+          <p:cNvPicPr>
+            <a:picLocks noChangeAspect="1"/>
+          </p:cNvPicPr>
+          <p:nvPr/>
+        </p:nvPicPr>
+        <p:blipFill>
+          <a:blip r:embed="rId3"/>
+          <a:stretch>
+            <a:fillRect/>
+          </a:stretch>
+        </p:blipFill>
+        <p:spPr>
+          <a:xfrm>
+            <a:off x="1306284" y="177592"/>
+            <a:ext cx="8539843" cy="6502816"/>
+          </a:xfrm>
+          <a:prstGeom prst="rect">
+            <a:avLst/>
+          </a:prstGeom>
+        </p:spPr>
+      </p:pic>
+    </p:spTree>
+    <p:extLst>
+      <p:ext uri="{BB962C8B-B14F-4D97-AF65-F5344CB8AC3E}">
+        <p14:creationId xmlns:p14="http://schemas.microsoft.com/office/powerpoint/2010/main" val="2903841477"/>
+      </p:ext>
+    </p:extLst>
+  </p:cSld>
+  <p:clrMapOvr>
+    <a:masterClrMapping/>
+  </p:clrMapOvr>
+</p:sld>
+</file>
+
+<file path=ppt/slides/slide11.xml><?xml version="1.0" encoding="utf-8"?>
+<p:sld xmlns:a="http://schemas.openxmlformats.org/drawingml/2006/main" xmlns:r="http://schemas.openxmlformats.org/officeDocument/2006/relationships" xmlns:p="http://schemas.openxmlformats.org/presentationml/2006/main">
+  <p:cSld>
+    <p:spTree>
+      <p:nvGrpSpPr>
+        <p:cNvPr id="1" name=""/>
+        <p:cNvGrpSpPr/>
+        <p:nvPr/>
+      </p:nvGrpSpPr>
+      <p:grpSpPr>
+        <a:xfrm>
+          <a:off x="0" y="0"/>
+          <a:ext cx="0" cy="0"/>
+          <a:chOff x="0" y="0"/>
+          <a:chExt cx="0" cy="0"/>
+        </a:xfrm>
+      </p:grpSpPr>
+      <p:sp>
+        <p:nvSpPr>
+          <p:cNvPr id="7" name="Title 6">
+            <a:extLst>
+              <a:ext uri="{FF2B5EF4-FFF2-40B4-BE49-F238E27FC236}">
+                <a16:creationId xmlns:a16="http://schemas.microsoft.com/office/drawing/2014/main" id="{330A5BFC-C134-C072-C14D-9E51A94C8E7E}"/>
+              </a:ext>
+            </a:extLst>
+          </p:cNvPr>
+          <p:cNvSpPr>
+            <a:spLocks noGrp="1"/>
+          </p:cNvSpPr>
+          <p:nvPr>
+            <p:ph type="title"/>
+          </p:nvPr>
+        </p:nvSpPr>
+        <p:spPr/>
+        <p:txBody>
+          <a:bodyPr/>
+          <a:lstStyle/>
+          <a:p>
+            <a:r>
+              <a:rPr lang="en-US" dirty="0"/>
+              <a:t>Future project plans</a:t>
+            </a:r>
+          </a:p>
+        </p:txBody>
+      </p:sp>
+      <p:sp>
+        <p:nvSpPr>
+          <p:cNvPr id="175" name="Slide Number Placeholder 174">
+            <a:extLst>
+              <a:ext uri="{FF2B5EF4-FFF2-40B4-BE49-F238E27FC236}">
+                <a16:creationId xmlns:a16="http://schemas.microsoft.com/office/drawing/2014/main" id="{1DECFA06-D307-B47D-DA95-31161374AD30}"/>
+              </a:ext>
+            </a:extLst>
+          </p:cNvPr>
+          <p:cNvSpPr>
+            <a:spLocks noGrp="1"/>
+          </p:cNvSpPr>
+          <p:nvPr>
+            <p:ph type="sldNum" sz="quarter" idx="12"/>
+          </p:nvPr>
+        </p:nvSpPr>
+        <p:spPr/>
+        <p:txBody>
+          <a:bodyPr/>
+          <a:lstStyle/>
+          <a:p>
+            <a:fld id="{48F63A3B-78C7-47BE-AE5E-E10140E04643}" type="slidenum">
+              <a:rPr lang="en-US" smtClean="0"/>
+              <a:pPr/>
+              <a:t>11</a:t>
+            </a:fld>
+            <a:endParaRPr lang="en-US" dirty="0"/>
+          </a:p>
+        </p:txBody>
+      </p:sp>
+      <p:sp>
+        <p:nvSpPr>
+          <p:cNvPr id="3" name="TextBox 2">
+            <a:extLst>
+              <a:ext uri="{FF2B5EF4-FFF2-40B4-BE49-F238E27FC236}">
+                <a16:creationId xmlns:a16="http://schemas.microsoft.com/office/drawing/2014/main" id="{D084A75D-B6A4-E4A3-7F3E-32E2CAD7DC45}"/>
+              </a:ext>
+            </a:extLst>
+          </p:cNvPr>
+          <p:cNvSpPr txBox="1"/>
+          <p:nvPr/>
+        </p:nvSpPr>
+        <p:spPr>
+          <a:xfrm>
+            <a:off x="2031691" y="2801566"/>
+            <a:ext cx="7986409" cy="1487587"/>
+          </a:xfrm>
+          <a:prstGeom prst="rect">
+            <a:avLst/>
+          </a:prstGeom>
+          <a:noFill/>
+        </p:spPr>
+        <p:txBody>
+          <a:bodyPr wrap="square" rtlCol="0">
+            <a:spAutoFit/>
+          </a:bodyPr>
+          <a:lstStyle/>
+          <a:p>
+            <a:pPr marR="0" lvl="0" algn="l" defTabSz="914400" rtl="0" eaLnBrk="1" fontAlgn="auto" latinLnBrk="0" hangingPunct="1">
+              <a:lnSpc>
+                <a:spcPct val="100000"/>
+              </a:lnSpc>
+              <a:spcBef>
+                <a:spcPts val="360"/>
+              </a:spcBef>
+              <a:spcAft>
+                <a:spcPts val="0"/>
+              </a:spcAft>
+              <a:buClrTx/>
+              <a:buSzTx/>
+              <a:tabLst/>
+              <a:defRPr/>
+            </a:pPr>
+            <a:endParaRPr kumimoji="0" lang="en-US" sz="2400" b="0" i="0" u="none" strike="noStrike" kern="1200" cap="none" spc="0" normalizeH="0" baseline="0" noProof="0" dirty="0">
+              <a:ln>
+                <a:noFill/>
+              </a:ln>
+              <a:solidFill>
+                <a:srgbClr val="1F2C8F"/>
+              </a:solidFill>
+              <a:effectLst/>
+              <a:uLnTx/>
+              <a:uFillTx/>
+              <a:latin typeface="Sabon Next LT"/>
+              <a:ea typeface="+mn-ea"/>
+              <a:cs typeface="+mn-cs"/>
+            </a:endParaRPr>
+          </a:p>
+          <a:p>
+            <a:pPr marL="342900" marR="0" lvl="0" indent="-342900" algn="l" defTabSz="914400" rtl="0" eaLnBrk="1" fontAlgn="auto" latinLnBrk="0" hangingPunct="1">
+              <a:lnSpc>
+                <a:spcPct val="100000"/>
+              </a:lnSpc>
+              <a:spcBef>
+                <a:spcPts val="360"/>
+              </a:spcBef>
+              <a:spcAft>
+                <a:spcPts val="0"/>
+              </a:spcAft>
+              <a:buClrTx/>
+              <a:buSzTx/>
+              <a:buFont typeface="Arial" panose="020B0604020202020204" pitchFamily="34" charset="0"/>
+              <a:buChar char="•"/>
+              <a:tabLst/>
+              <a:defRPr/>
+            </a:pPr>
+            <a:r>
+              <a:rPr lang="en-US" sz="2400" dirty="0">
+                <a:solidFill>
+                  <a:srgbClr val="1F2C8F"/>
+                </a:solidFill>
+                <a:latin typeface="Sabon Next LT"/>
+              </a:rPr>
+              <a:t>Analysis on companies located outside of the U.S</a:t>
+            </a:r>
+            <a:endParaRPr lang="en-US" dirty="0"/>
+          </a:p>
+          <a:p>
+            <a:pPr marL="342900" marR="0" lvl="0" indent="-342900" algn="l" defTabSz="914400" rtl="0" eaLnBrk="1" fontAlgn="auto" latinLnBrk="0" hangingPunct="1">
+              <a:lnSpc>
+                <a:spcPct val="100000"/>
+              </a:lnSpc>
+              <a:spcBef>
+                <a:spcPts val="360"/>
+              </a:spcBef>
+              <a:spcAft>
+                <a:spcPts val="0"/>
+              </a:spcAft>
+              <a:buClrTx/>
+              <a:buSzTx/>
+              <a:buFont typeface="Arial" panose="020B0604020202020204" pitchFamily="34" charset="0"/>
+              <a:buChar char="•"/>
+              <a:tabLst/>
+              <a:defRPr/>
+            </a:pPr>
+            <a:endParaRPr lang="en-US" dirty="0"/>
+          </a:p>
+          <a:p>
+            <a:endParaRPr lang="en-US" dirty="0"/>
+          </a:p>
+        </p:txBody>
+      </p:sp>
+    </p:spTree>
+    <p:extLst>
+      <p:ext uri="{BB962C8B-B14F-4D97-AF65-F5344CB8AC3E}">
+        <p14:creationId xmlns:p14="http://schemas.microsoft.com/office/powerpoint/2010/main" val="2502887943"/>
+      </p:ext>
+    </p:extLst>
+  </p:cSld>
+  <p:clrMapOvr>
+    <a:masterClrMapping/>
+  </p:clrMapOvr>
+</p:sld>
+</file>
+
+<file path=ppt/slides/slide12.xml><?xml version="1.0" encoding="utf-8"?>
 <p:sld xmlns:a="http://schemas.openxmlformats.org/drawingml/2006/main" xmlns:r="http://schemas.openxmlformats.org/officeDocument/2006/relationships" xmlns:p="http://schemas.openxmlformats.org/presentationml/2006/main">
   <p:cSld>
     <p:spTree>
@@ -24931,7 +24543,7 @@
 </p:sld>
 </file>
 
-<file path=ppt/slides/slide11.xml><?xml version="1.0" encoding="utf-8"?>
+<file path=ppt/slides/slide13.xml><?xml version="1.0" encoding="utf-8"?>
 <p:sld xmlns:a="http://schemas.openxmlformats.org/drawingml/2006/main" xmlns:r="http://schemas.openxmlformats.org/officeDocument/2006/relationships" xmlns:p="http://schemas.openxmlformats.org/presentationml/2006/main">
   <p:cSld>
     <p:spTree>
@@ -25003,7 +24615,7 @@
           <a:p>
             <a:fld id="{48F63A3B-78C7-47BE-AE5E-E10140E04643}" type="slidenum">
               <a:rPr lang="en-US" smtClean="0"/>
-              <a:t>11</a:t>
+              <a:t>13</a:t>
             </a:fld>
             <a:endParaRPr lang="en-US" dirty="0"/>
           </a:p>
@@ -25128,7 +24740,7 @@
 </p:sld>
 </file>
 
-<file path=ppt/slides/slide12.xml><?xml version="1.0" encoding="utf-8"?>
+<file path=ppt/slides/slide14.xml><?xml version="1.0" encoding="utf-8"?>
 <p:sld xmlns:a="http://schemas.openxmlformats.org/drawingml/2006/main" xmlns:r="http://schemas.openxmlformats.org/officeDocument/2006/relationships" xmlns:p="http://schemas.openxmlformats.org/presentationml/2006/main">
   <p:cSld>
     <p:spTree>
@@ -25170,36 +24782,6 @@
               <a:rPr lang="en-US" dirty="0"/>
               <a:t>text</a:t>
             </a:r>
-          </a:p>
-        </p:txBody>
-      </p:sp>
-      <p:sp>
-        <p:nvSpPr>
-          <p:cNvPr id="5" name="Slide Number Placeholder 4">
-            <a:extLst>
-              <a:ext uri="{FF2B5EF4-FFF2-40B4-BE49-F238E27FC236}">
-                <a16:creationId xmlns:a16="http://schemas.microsoft.com/office/drawing/2014/main" id="{BF7F20BE-640F-EFAB-3A43-2AA146DB42BF}"/>
-              </a:ext>
-            </a:extLst>
-          </p:cNvPr>
-          <p:cNvSpPr>
-            <a:spLocks noGrp="1"/>
-          </p:cNvSpPr>
-          <p:nvPr>
-            <p:ph type="sldNum" sz="quarter" idx="12"/>
-          </p:nvPr>
-        </p:nvSpPr>
-        <p:spPr/>
-        <p:txBody>
-          <a:bodyPr/>
-          <a:lstStyle/>
-          <a:p>
-            <a:fld id="{48F63A3B-78C7-47BE-AE5E-E10140E04643}" type="slidenum">
-              <a:rPr lang="en-US" smtClean="0"/>
-              <a:pPr/>
-              <a:t>12</a:t>
-            </a:fld>
-            <a:endParaRPr lang="en-US" dirty="0"/>
           </a:p>
         </p:txBody>
       </p:sp>
@@ -25843,104 +25425,40 @@
           <a:chExt cx="0" cy="0"/>
         </a:xfrm>
       </p:grpSpPr>
-      <p:sp>
-        <p:nvSpPr>
-          <p:cNvPr id="2" name="Title 1">
+      <p:pic>
+        <p:nvPicPr>
+          <p:cNvPr id="2" name="Picture 1">
             <a:extLst>
               <a:ext uri="{FF2B5EF4-FFF2-40B4-BE49-F238E27FC236}">
-                <a16:creationId xmlns:a16="http://schemas.microsoft.com/office/drawing/2014/main" id="{69125542-D540-B766-0FA1-10DE2ED0495C}"/>
+                <a16:creationId xmlns:a16="http://schemas.microsoft.com/office/drawing/2014/main" id="{CE9276F1-DEAB-CDFF-FE01-4F8DD91566FE}"/>
               </a:ext>
             </a:extLst>
           </p:cNvPr>
-          <p:cNvSpPr>
-            <a:spLocks noGrp="1"/>
-          </p:cNvSpPr>
-          <p:nvPr>
-            <p:ph type="title"/>
-          </p:nvPr>
-        </p:nvSpPr>
-        <p:spPr/>
-        <p:txBody>
-          <a:bodyPr/>
-          <a:lstStyle/>
-          <a:p>
-            <a:r>
-              <a:rPr lang="en-US" sz="4400" b="1" dirty="0">
-                <a:solidFill>
-                  <a:schemeClr val="accent6"/>
-                </a:solidFill>
-                <a:latin typeface="Arial Black" panose="020B0604020202020204" pitchFamily="34" charset="0"/>
-                <a:cs typeface="Arial Black" panose="020B0604020202020204" pitchFamily="34" charset="0"/>
-              </a:rPr>
-              <a:t>text</a:t>
-            </a:r>
-          </a:p>
-        </p:txBody>
-      </p:sp>
-      <p:graphicFrame>
-        <p:nvGraphicFramePr>
-          <p:cNvPr id="5" name="Content Placeholder 5" descr="Bar chart">
-            <a:extLst>
-              <a:ext uri="{FF2B5EF4-FFF2-40B4-BE49-F238E27FC236}">
-                <a16:creationId xmlns:a16="http://schemas.microsoft.com/office/drawing/2014/main" id="{ED69F325-47F8-5A12-D3A4-2BB6ADB3D0B6}"/>
-              </a:ext>
-            </a:extLst>
-          </p:cNvPr>
-          <p:cNvGraphicFramePr>
-            <a:graphicFrameLocks noGrp="1"/>
-          </p:cNvGraphicFramePr>
-          <p:nvPr>
-            <p:ph sz="half" idx="1"/>
-            <p:extLst>
-              <p:ext uri="{D42A27DB-BD31-4B8C-83A1-F6EECF244321}">
-                <p14:modId xmlns:p14="http://schemas.microsoft.com/office/powerpoint/2010/main" val="4222337726"/>
-              </p:ext>
-            </p:extLst>
-          </p:nvPr>
-        </p:nvGraphicFramePr>
-        <p:xfrm>
-          <a:off x="539750" y="2103438"/>
-          <a:ext cx="11118850" cy="4433887"/>
-        </p:xfrm>
-        <a:graphic>
-          <a:graphicData uri="http://schemas.openxmlformats.org/drawingml/2006/chart">
-            <c:chart xmlns:c="http://schemas.openxmlformats.org/drawingml/2006/chart" xmlns:r="http://schemas.openxmlformats.org/officeDocument/2006/relationships" r:id="rId2"/>
-          </a:graphicData>
-        </a:graphic>
-      </p:graphicFrame>
-      <p:sp>
-        <p:nvSpPr>
-          <p:cNvPr id="7" name="Slide Number Placeholder 6">
-            <a:extLst>
-              <a:ext uri="{FF2B5EF4-FFF2-40B4-BE49-F238E27FC236}">
-                <a16:creationId xmlns:a16="http://schemas.microsoft.com/office/drawing/2014/main" id="{712D1D31-1A67-703B-DF69-CA8142BF6A2D}"/>
-              </a:ext>
-            </a:extLst>
-          </p:cNvPr>
-          <p:cNvSpPr>
-            <a:spLocks noGrp="1"/>
-          </p:cNvSpPr>
-          <p:nvPr>
-            <p:ph type="sldNum" sz="quarter" idx="12"/>
-          </p:nvPr>
-        </p:nvSpPr>
-        <p:spPr/>
-        <p:txBody>
-          <a:bodyPr/>
-          <a:lstStyle/>
-          <a:p>
-            <a:fld id="{48F63A3B-78C7-47BE-AE5E-E10140E04643}" type="slidenum">
-              <a:rPr lang="en-US" smtClean="0"/>
-              <a:t>6</a:t>
-            </a:fld>
-            <a:endParaRPr lang="en-US" dirty="0"/>
-          </a:p>
-        </p:txBody>
-      </p:sp>
+          <p:cNvPicPr>
+            <a:picLocks noChangeAspect="1"/>
+          </p:cNvPicPr>
+          <p:nvPr/>
+        </p:nvPicPr>
+        <p:blipFill>
+          <a:blip r:embed="rId3"/>
+          <a:stretch>
+            <a:fillRect/>
+          </a:stretch>
+        </p:blipFill>
+        <p:spPr>
+          <a:xfrm>
+            <a:off x="0" y="321879"/>
+            <a:ext cx="12192000" cy="6214241"/>
+          </a:xfrm>
+          <a:prstGeom prst="rect">
+            <a:avLst/>
+          </a:prstGeom>
+        </p:spPr>
+      </p:pic>
     </p:spTree>
     <p:extLst>
       <p:ext uri="{BB962C8B-B14F-4D97-AF65-F5344CB8AC3E}">
-        <p14:creationId xmlns:p14="http://schemas.microsoft.com/office/powerpoint/2010/main" val="2903841477"/>
+        <p14:creationId xmlns:p14="http://schemas.microsoft.com/office/powerpoint/2010/main" val="3157424065"/>
       </p:ext>
     </p:extLst>
   </p:cSld>
@@ -25967,920 +25485,40 @@
           <a:chExt cx="0" cy="0"/>
         </a:xfrm>
       </p:grpSpPr>
-      <p:sp>
-        <p:nvSpPr>
-          <p:cNvPr id="2" name="Title 1">
+      <p:pic>
+        <p:nvPicPr>
+          <p:cNvPr id="6" name="Picture 5">
             <a:extLst>
               <a:ext uri="{FF2B5EF4-FFF2-40B4-BE49-F238E27FC236}">
-                <a16:creationId xmlns:a16="http://schemas.microsoft.com/office/drawing/2014/main" id="{884B311B-3177-0658-3585-6639F26A9BF6}"/>
+                <a16:creationId xmlns:a16="http://schemas.microsoft.com/office/drawing/2014/main" id="{2966D22E-3B24-B5CC-2677-132BC638DB6B}"/>
               </a:ext>
             </a:extLst>
           </p:cNvPr>
-          <p:cNvSpPr>
-            <a:spLocks noGrp="1"/>
-          </p:cNvSpPr>
-          <p:nvPr>
-            <p:ph type="title"/>
-          </p:nvPr>
-        </p:nvSpPr>
-        <p:spPr/>
-        <p:txBody>
-          <a:bodyPr/>
-          <a:lstStyle/>
-          <a:p>
-            <a:r>
-              <a:rPr lang="en-US" altLang="zh-CN" sz="4400" b="1" dirty="0">
-                <a:solidFill>
-                  <a:schemeClr val="accent6"/>
-                </a:solidFill>
-                <a:latin typeface="Arial Black" panose="020B0604020202020204" pitchFamily="34" charset="0"/>
-                <a:cs typeface="Arial Black" panose="020B0604020202020204" pitchFamily="34" charset="0"/>
-              </a:rPr>
-              <a:t>AREAS</a:t>
-            </a:r>
-            <a:r>
-              <a:rPr lang="zh-CN" altLang="en-US" sz="4400" b="1">
-                <a:solidFill>
-                  <a:schemeClr val="accent6"/>
-                </a:solidFill>
-                <a:latin typeface="Arial Black" panose="020B0604020202020204" pitchFamily="34" charset="0"/>
-                <a:cs typeface="Arial Black" panose="020B0604020202020204" pitchFamily="34" charset="0"/>
-              </a:rPr>
-              <a:t> </a:t>
-            </a:r>
-            <a:r>
-              <a:rPr lang="en-US" altLang="zh-CN" sz="4400" b="1" dirty="0">
-                <a:solidFill>
-                  <a:schemeClr val="accent6"/>
-                </a:solidFill>
-                <a:latin typeface="Arial Black" panose="020B0604020202020204" pitchFamily="34" charset="0"/>
-                <a:cs typeface="Arial Black" panose="020B0604020202020204" pitchFamily="34" charset="0"/>
-              </a:rPr>
-              <a:t>OF</a:t>
-            </a:r>
-            <a:r>
-              <a:rPr lang="zh-CN" altLang="en-US" sz="4400" b="1">
-                <a:solidFill>
-                  <a:schemeClr val="accent6"/>
-                </a:solidFill>
-                <a:latin typeface="Arial Black" panose="020B0604020202020204" pitchFamily="34" charset="0"/>
-                <a:cs typeface="Arial Black" panose="020B0604020202020204" pitchFamily="34" charset="0"/>
-              </a:rPr>
-              <a:t> </a:t>
-            </a:r>
-            <a:r>
-              <a:rPr lang="en-US" altLang="zh-CN" sz="4400" b="1" dirty="0">
-                <a:solidFill>
-                  <a:schemeClr val="accent6"/>
-                </a:solidFill>
-                <a:latin typeface="Arial Black" panose="020B0604020202020204" pitchFamily="34" charset="0"/>
-                <a:cs typeface="Arial Black" panose="020B0604020202020204" pitchFamily="34" charset="0"/>
-              </a:rPr>
-              <a:t>GROWTH</a:t>
-            </a:r>
-            <a:endParaRPr lang="en-US" sz="4400" b="1" dirty="0">
-              <a:solidFill>
-                <a:schemeClr val="accent6"/>
-              </a:solidFill>
-              <a:latin typeface="Arial Black" panose="020B0604020202020204" pitchFamily="34" charset="0"/>
-              <a:cs typeface="Arial Black" panose="020B0604020202020204" pitchFamily="34" charset="0"/>
-            </a:endParaRPr>
-          </a:p>
-        </p:txBody>
-      </p:sp>
-      <p:graphicFrame>
-        <p:nvGraphicFramePr>
-          <p:cNvPr id="6" name="Table 4">
-            <a:extLst>
-              <a:ext uri="{FF2B5EF4-FFF2-40B4-BE49-F238E27FC236}">
-                <a16:creationId xmlns:a16="http://schemas.microsoft.com/office/drawing/2014/main" id="{705AB9BF-07E9-9DED-DB8B-F644759C8FDC}"/>
-              </a:ext>
-            </a:extLst>
-          </p:cNvPr>
-          <p:cNvGraphicFramePr>
-            <a:graphicFrameLocks noGrp="1"/>
-          </p:cNvGraphicFramePr>
-          <p:nvPr>
-            <p:ph sz="half" idx="1"/>
-            <p:extLst>
-              <p:ext uri="{D42A27DB-BD31-4B8C-83A1-F6EECF244321}">
-                <p14:modId xmlns:p14="http://schemas.microsoft.com/office/powerpoint/2010/main" val="3690182348"/>
-              </p:ext>
-            </p:extLst>
-          </p:nvPr>
-        </p:nvGraphicFramePr>
-        <p:xfrm>
-          <a:off x="755650" y="2825750"/>
-          <a:ext cx="10680700" cy="2837333"/>
-        </p:xfrm>
-        <a:graphic>
-          <a:graphicData uri="http://schemas.openxmlformats.org/drawingml/2006/table">
-            <a:tbl>
-              <a:tblPr firstRow="1" bandRow="1">
-                <a:tableStyleId>{5C22544A-7EE6-4342-B048-85BDC9FD1C3A}</a:tableStyleId>
-              </a:tblPr>
-              <a:tblGrid>
-                <a:gridCol w="2136140">
-                  <a:extLst>
-                    <a:ext uri="{9D8B030D-6E8A-4147-A177-3AD203B41FA5}">
-                      <a16:colId xmlns:a16="http://schemas.microsoft.com/office/drawing/2014/main" val="1689330750"/>
-                    </a:ext>
-                  </a:extLst>
-                </a:gridCol>
-                <a:gridCol w="2136140">
-                  <a:extLst>
-                    <a:ext uri="{9D8B030D-6E8A-4147-A177-3AD203B41FA5}">
-                      <a16:colId xmlns:a16="http://schemas.microsoft.com/office/drawing/2014/main" val="2660631934"/>
-                    </a:ext>
-                  </a:extLst>
-                </a:gridCol>
-                <a:gridCol w="2136140">
-                  <a:extLst>
-                    <a:ext uri="{9D8B030D-6E8A-4147-A177-3AD203B41FA5}">
-                      <a16:colId xmlns:a16="http://schemas.microsoft.com/office/drawing/2014/main" val="3909717689"/>
-                    </a:ext>
-                  </a:extLst>
-                </a:gridCol>
-                <a:gridCol w="2136140">
-                  <a:extLst>
-                    <a:ext uri="{9D8B030D-6E8A-4147-A177-3AD203B41FA5}">
-                      <a16:colId xmlns:a16="http://schemas.microsoft.com/office/drawing/2014/main" val="1603189107"/>
-                    </a:ext>
-                  </a:extLst>
-                </a:gridCol>
-                <a:gridCol w="2136140">
-                  <a:extLst>
-                    <a:ext uri="{9D8B030D-6E8A-4147-A177-3AD203B41FA5}">
-                      <a16:colId xmlns:a16="http://schemas.microsoft.com/office/drawing/2014/main" val="2755691855"/>
-                    </a:ext>
-                  </a:extLst>
-                </a:gridCol>
-              </a:tblGrid>
-              <a:tr h="652257">
-                <a:tc>
-                  <a:txBody>
-                    <a:bodyPr/>
-                    <a:lstStyle/>
-                    <a:p>
-                      <a:pPr algn="ctr"/>
-                      <a:endParaRPr lang="en-US" sz="1900" dirty="0">
-                        <a:latin typeface="Sabon Next LT" panose="02000500000000000000" pitchFamily="2" charset="0"/>
-                        <a:cs typeface="Sabon Next LT" panose="02000500000000000000" pitchFamily="2" charset="0"/>
-                      </a:endParaRPr>
-                    </a:p>
-                  </a:txBody>
-                  <a:tcPr marL="96897" marR="96897" marT="48449" marB="48449" anchor="ctr">
-                    <a:solidFill>
-                      <a:schemeClr val="accent2"/>
-                    </a:solidFill>
-                  </a:tcPr>
-                </a:tc>
-                <a:tc>
-                  <a:txBody>
-                    <a:bodyPr/>
-                    <a:lstStyle/>
-                    <a:p>
-                      <a:pPr algn="ctr"/>
-                      <a:r>
-                        <a:rPr lang="en-US" sz="1900" b="0" kern="1200" dirty="0">
-                          <a:solidFill>
-                            <a:schemeClr val="bg1">
-                              <a:alpha val="99000"/>
-                            </a:schemeClr>
-                          </a:solidFill>
-                          <a:latin typeface="Sabon Next LT" panose="02000500000000000000" pitchFamily="2" charset="0"/>
-                          <a:ea typeface="+mn-ea"/>
-                          <a:cs typeface="Sabon Next LT" panose="02000500000000000000" pitchFamily="2" charset="0"/>
-                        </a:rPr>
-                        <a:t>B2B</a:t>
-                      </a:r>
-                    </a:p>
-                  </a:txBody>
-                  <a:tcPr marL="96897" marR="96897" marT="48449" marB="48449" anchor="ctr">
-                    <a:solidFill>
-                      <a:srgbClr val="DF8C8C"/>
-                    </a:solidFill>
-                  </a:tcPr>
-                </a:tc>
-                <a:tc>
-                  <a:txBody>
-                    <a:bodyPr/>
-                    <a:lstStyle/>
-                    <a:p>
-                      <a:pPr algn="ctr"/>
-                      <a:r>
-                        <a:rPr lang="en-US" sz="1900" b="0" kern="1200" dirty="0">
-                          <a:solidFill>
-                            <a:schemeClr val="bg1">
-                              <a:alpha val="99000"/>
-                            </a:schemeClr>
-                          </a:solidFill>
-                          <a:latin typeface="Sabon Next LT" panose="02000500000000000000" pitchFamily="2" charset="0"/>
-                          <a:ea typeface="+mn-ea"/>
-                          <a:cs typeface="Sabon Next LT" panose="02000500000000000000" pitchFamily="2" charset="0"/>
-                        </a:rPr>
-                        <a:t>Supply chain</a:t>
-                      </a:r>
-                    </a:p>
-                  </a:txBody>
-                  <a:tcPr marL="96897" marR="96897" marT="48449" marB="48449" anchor="ctr">
-                    <a:solidFill>
-                      <a:srgbClr val="DF8C8C"/>
-                    </a:solidFill>
-                  </a:tcPr>
-                </a:tc>
-                <a:tc>
-                  <a:txBody>
-                    <a:bodyPr/>
-                    <a:lstStyle/>
-                    <a:p>
-                      <a:pPr algn="ctr"/>
-                      <a:r>
-                        <a:rPr lang="en-US" sz="1900" b="0" dirty="0">
-                          <a:solidFill>
-                            <a:schemeClr val="bg1">
-                              <a:alpha val="99000"/>
-                            </a:schemeClr>
-                          </a:solidFill>
-                          <a:latin typeface="Sabon Next LT" panose="02000500000000000000" pitchFamily="2" charset="0"/>
-                          <a:cs typeface="Sabon Next LT" panose="02000500000000000000" pitchFamily="2" charset="0"/>
-                        </a:rPr>
-                        <a:t>ROI</a:t>
-                      </a:r>
-                    </a:p>
-                  </a:txBody>
-                  <a:tcPr marL="96897" marR="96897" marT="48449" marB="48449" anchor="ctr">
-                    <a:solidFill>
-                      <a:srgbClr val="DF8C8C"/>
-                    </a:solidFill>
-                  </a:tcPr>
-                </a:tc>
-                <a:tc>
-                  <a:txBody>
-                    <a:bodyPr/>
-                    <a:lstStyle/>
-                    <a:p>
-                      <a:pPr algn="ctr"/>
-                      <a:r>
-                        <a:rPr lang="en-US" sz="1900" b="0" dirty="0">
-                          <a:solidFill>
-                            <a:schemeClr val="bg1">
-                              <a:alpha val="99000"/>
-                            </a:schemeClr>
-                          </a:solidFill>
-                          <a:latin typeface="Sabon Next LT" panose="02000500000000000000" pitchFamily="2" charset="0"/>
-                          <a:cs typeface="Sabon Next LT" panose="02000500000000000000" pitchFamily="2" charset="0"/>
-                        </a:rPr>
-                        <a:t>E-commerce</a:t>
-                      </a:r>
-                    </a:p>
-                  </a:txBody>
-                  <a:tcPr marL="96897" marR="96897" marT="48449" marB="48449" anchor="ctr">
-                    <a:solidFill>
-                      <a:srgbClr val="DF8C8C"/>
-                    </a:solidFill>
-                  </a:tcPr>
-                </a:tc>
-                <a:extLst>
-                  <a:ext uri="{0D108BD9-81ED-4DB2-BD59-A6C34878D82A}">
-                    <a16:rowId xmlns:a16="http://schemas.microsoft.com/office/drawing/2014/main" val="479928716"/>
-                  </a:ext>
-                </a:extLst>
-              </a:tr>
-              <a:tr h="546269">
-                <a:tc>
-                  <a:txBody>
-                    <a:bodyPr/>
-                    <a:lstStyle/>
-                    <a:p>
-                      <a:pPr algn="ctr"/>
-                      <a:r>
-                        <a:rPr lang="en-US" sz="1900" dirty="0">
-                          <a:solidFill>
-                            <a:schemeClr val="tx1"/>
-                          </a:solidFill>
-                          <a:latin typeface="Sabon Next LT" panose="02000500000000000000" pitchFamily="2" charset="0"/>
-                          <a:cs typeface="Sabon Next LT" panose="02000500000000000000" pitchFamily="2" charset="0"/>
-                        </a:rPr>
-                        <a:t>Q1</a:t>
-                      </a:r>
-                    </a:p>
-                  </a:txBody>
-                  <a:tcPr marL="96897" marR="96897" marT="48449" marB="48449" anchor="ctr">
-                    <a:solidFill>
-                      <a:schemeClr val="accent2">
-                        <a:lumMod val="40000"/>
-                        <a:lumOff val="60000"/>
-                      </a:schemeClr>
-                    </a:solidFill>
-                  </a:tcPr>
-                </a:tc>
-                <a:tc>
-                  <a:txBody>
-                    <a:bodyPr/>
-                    <a:lstStyle/>
-                    <a:p>
-                      <a:pPr algn="ctr"/>
-                      <a:r>
-                        <a:rPr lang="en-US" sz="1900" dirty="0">
-                          <a:solidFill>
-                            <a:schemeClr val="tx1"/>
-                          </a:solidFill>
-                          <a:latin typeface="Sabon Next LT" panose="02000500000000000000" pitchFamily="2" charset="0"/>
-                          <a:cs typeface="Sabon Next LT" panose="02000500000000000000" pitchFamily="2" charset="0"/>
-                        </a:rPr>
-                        <a:t>4.5</a:t>
-                      </a:r>
-                    </a:p>
-                  </a:txBody>
-                  <a:tcPr marL="96897" marR="96897" marT="48449" marB="48449" anchor="ctr">
-                    <a:solidFill>
-                      <a:schemeClr val="accent2">
-                        <a:lumMod val="40000"/>
-                        <a:lumOff val="60000"/>
-                      </a:schemeClr>
-                    </a:solidFill>
-                  </a:tcPr>
-                </a:tc>
-                <a:tc>
-                  <a:txBody>
-                    <a:bodyPr/>
-                    <a:lstStyle/>
-                    <a:p>
-                      <a:pPr algn="ctr"/>
-                      <a:r>
-                        <a:rPr lang="en-US" sz="1900" dirty="0">
-                          <a:solidFill>
-                            <a:schemeClr val="tx1"/>
-                          </a:solidFill>
-                          <a:latin typeface="Sabon Next LT" panose="02000500000000000000" pitchFamily="2" charset="0"/>
-                          <a:cs typeface="Sabon Next LT" panose="02000500000000000000" pitchFamily="2" charset="0"/>
-                        </a:rPr>
-                        <a:t>2.3</a:t>
-                      </a:r>
-                    </a:p>
-                  </a:txBody>
-                  <a:tcPr marL="96897" marR="96897" marT="48449" marB="48449" anchor="ctr">
-                    <a:solidFill>
-                      <a:schemeClr val="accent2">
-                        <a:lumMod val="40000"/>
-                        <a:lumOff val="60000"/>
-                      </a:schemeClr>
-                    </a:solidFill>
-                  </a:tcPr>
-                </a:tc>
-                <a:tc>
-                  <a:txBody>
-                    <a:bodyPr/>
-                    <a:lstStyle/>
-                    <a:p>
-                      <a:pPr algn="ctr"/>
-                      <a:r>
-                        <a:rPr lang="en-US" sz="1900" dirty="0">
-                          <a:solidFill>
-                            <a:schemeClr val="tx1"/>
-                          </a:solidFill>
-                          <a:latin typeface="Sabon Next LT" panose="02000500000000000000" pitchFamily="2" charset="0"/>
-                          <a:cs typeface="Sabon Next LT" panose="02000500000000000000" pitchFamily="2" charset="0"/>
-                        </a:rPr>
-                        <a:t>1.7</a:t>
-                      </a:r>
-                    </a:p>
-                  </a:txBody>
-                  <a:tcPr marL="96897" marR="96897" marT="48449" marB="48449" anchor="ctr">
-                    <a:solidFill>
-                      <a:schemeClr val="accent2">
-                        <a:lumMod val="40000"/>
-                        <a:lumOff val="60000"/>
-                      </a:schemeClr>
-                    </a:solidFill>
-                  </a:tcPr>
-                </a:tc>
-                <a:tc>
-                  <a:txBody>
-                    <a:bodyPr/>
-                    <a:lstStyle/>
-                    <a:p>
-                      <a:pPr algn="ctr"/>
-                      <a:r>
-                        <a:rPr lang="en-US" sz="1900" dirty="0">
-                          <a:solidFill>
-                            <a:schemeClr val="tx1"/>
-                          </a:solidFill>
-                          <a:latin typeface="Sabon Next LT" panose="02000500000000000000" pitchFamily="2" charset="0"/>
-                          <a:cs typeface="Sabon Next LT" panose="02000500000000000000" pitchFamily="2" charset="0"/>
-                        </a:rPr>
-                        <a:t>5.0</a:t>
-                      </a:r>
-                    </a:p>
-                  </a:txBody>
-                  <a:tcPr marL="96897" marR="96897" marT="48449" marB="48449" anchor="ctr">
-                    <a:solidFill>
-                      <a:schemeClr val="accent2">
-                        <a:lumMod val="40000"/>
-                        <a:lumOff val="60000"/>
-                      </a:schemeClr>
-                    </a:solidFill>
-                  </a:tcPr>
-                </a:tc>
-                <a:extLst>
-                  <a:ext uri="{0D108BD9-81ED-4DB2-BD59-A6C34878D82A}">
-                    <a16:rowId xmlns:a16="http://schemas.microsoft.com/office/drawing/2014/main" val="1760208656"/>
-                  </a:ext>
-                </a:extLst>
-              </a:tr>
-              <a:tr h="546269">
-                <a:tc>
-                  <a:txBody>
-                    <a:bodyPr/>
-                    <a:lstStyle/>
-                    <a:p>
-                      <a:pPr algn="ctr"/>
-                      <a:r>
-                        <a:rPr lang="en-US" sz="1900" dirty="0">
-                          <a:solidFill>
-                            <a:schemeClr val="tx1"/>
-                          </a:solidFill>
-                          <a:latin typeface="Sabon Next LT" panose="02000500000000000000" pitchFamily="2" charset="0"/>
-                          <a:cs typeface="Sabon Next LT" panose="02000500000000000000" pitchFamily="2" charset="0"/>
-                        </a:rPr>
-                        <a:t>Q2</a:t>
-                      </a:r>
-                    </a:p>
-                  </a:txBody>
-                  <a:tcPr marL="96897" marR="96897" marT="48449" marB="48449" anchor="ctr">
-                    <a:solidFill>
-                      <a:schemeClr val="accent2">
-                        <a:lumMod val="20000"/>
-                        <a:lumOff val="80000"/>
-                      </a:schemeClr>
-                    </a:solidFill>
-                  </a:tcPr>
-                </a:tc>
-                <a:tc>
-                  <a:txBody>
-                    <a:bodyPr/>
-                    <a:lstStyle/>
-                    <a:p>
-                      <a:pPr algn="ctr"/>
-                      <a:r>
-                        <a:rPr lang="en-US" sz="1900" dirty="0">
-                          <a:solidFill>
-                            <a:schemeClr val="tx1"/>
-                          </a:solidFill>
-                          <a:latin typeface="Sabon Next LT" panose="02000500000000000000" pitchFamily="2" charset="0"/>
-                          <a:cs typeface="Sabon Next LT" panose="02000500000000000000" pitchFamily="2" charset="0"/>
-                        </a:rPr>
-                        <a:t>3.2</a:t>
-                      </a:r>
-                    </a:p>
-                  </a:txBody>
-                  <a:tcPr marL="96897" marR="96897" marT="48449" marB="48449" anchor="ctr">
-                    <a:solidFill>
-                      <a:schemeClr val="accent2">
-                        <a:lumMod val="20000"/>
-                        <a:lumOff val="80000"/>
-                      </a:schemeClr>
-                    </a:solidFill>
-                  </a:tcPr>
-                </a:tc>
-                <a:tc>
-                  <a:txBody>
-                    <a:bodyPr/>
-                    <a:lstStyle/>
-                    <a:p>
-                      <a:pPr algn="ctr"/>
-                      <a:r>
-                        <a:rPr lang="en-US" sz="1900" dirty="0">
-                          <a:solidFill>
-                            <a:schemeClr val="tx1"/>
-                          </a:solidFill>
-                          <a:latin typeface="Sabon Next LT" panose="02000500000000000000" pitchFamily="2" charset="0"/>
-                          <a:cs typeface="Sabon Next LT" panose="02000500000000000000" pitchFamily="2" charset="0"/>
-                        </a:rPr>
-                        <a:t>5.1</a:t>
-                      </a:r>
-                    </a:p>
-                  </a:txBody>
-                  <a:tcPr marL="96897" marR="96897" marT="48449" marB="48449" anchor="ctr">
-                    <a:solidFill>
-                      <a:schemeClr val="accent2">
-                        <a:lumMod val="20000"/>
-                        <a:lumOff val="80000"/>
-                      </a:schemeClr>
-                    </a:solidFill>
-                  </a:tcPr>
-                </a:tc>
-                <a:tc>
-                  <a:txBody>
-                    <a:bodyPr/>
-                    <a:lstStyle/>
-                    <a:p>
-                      <a:pPr algn="ctr"/>
-                      <a:r>
-                        <a:rPr lang="en-US" sz="1900" dirty="0">
-                          <a:solidFill>
-                            <a:schemeClr val="tx1"/>
-                          </a:solidFill>
-                          <a:latin typeface="Sabon Next LT" panose="02000500000000000000" pitchFamily="2" charset="0"/>
-                          <a:cs typeface="Sabon Next LT" panose="02000500000000000000" pitchFamily="2" charset="0"/>
-                        </a:rPr>
-                        <a:t>4.4</a:t>
-                      </a:r>
-                    </a:p>
-                  </a:txBody>
-                  <a:tcPr marL="96897" marR="96897" marT="48449" marB="48449" anchor="ctr">
-                    <a:solidFill>
-                      <a:schemeClr val="accent2">
-                        <a:lumMod val="20000"/>
-                        <a:lumOff val="80000"/>
-                      </a:schemeClr>
-                    </a:solidFill>
-                  </a:tcPr>
-                </a:tc>
-                <a:tc>
-                  <a:txBody>
-                    <a:bodyPr/>
-                    <a:lstStyle/>
-                    <a:p>
-                      <a:pPr algn="ctr"/>
-                      <a:r>
-                        <a:rPr lang="en-US" sz="1900" dirty="0">
-                          <a:solidFill>
-                            <a:schemeClr val="tx1"/>
-                          </a:solidFill>
-                          <a:latin typeface="Sabon Next LT" panose="02000500000000000000" pitchFamily="2" charset="0"/>
-                          <a:cs typeface="Sabon Next LT" panose="02000500000000000000" pitchFamily="2" charset="0"/>
-                        </a:rPr>
-                        <a:t>3.0</a:t>
-                      </a:r>
-                    </a:p>
-                  </a:txBody>
-                  <a:tcPr marL="96897" marR="96897" marT="48449" marB="48449" anchor="ctr">
-                    <a:solidFill>
-                      <a:schemeClr val="accent2">
-                        <a:lumMod val="20000"/>
-                        <a:lumOff val="80000"/>
-                      </a:schemeClr>
-                    </a:solidFill>
-                  </a:tcPr>
-                </a:tc>
-                <a:extLst>
-                  <a:ext uri="{0D108BD9-81ED-4DB2-BD59-A6C34878D82A}">
-                    <a16:rowId xmlns:a16="http://schemas.microsoft.com/office/drawing/2014/main" val="3634243071"/>
-                  </a:ext>
-                </a:extLst>
-              </a:tr>
-              <a:tr h="546269">
-                <a:tc>
-                  <a:txBody>
-                    <a:bodyPr/>
-                    <a:lstStyle/>
-                    <a:p>
-                      <a:pPr algn="ctr"/>
-                      <a:r>
-                        <a:rPr lang="en-US" sz="1900" dirty="0">
-                          <a:solidFill>
-                            <a:schemeClr val="tx1"/>
-                          </a:solidFill>
-                          <a:latin typeface="Sabon Next LT" panose="02000500000000000000" pitchFamily="2" charset="0"/>
-                          <a:cs typeface="Sabon Next LT" panose="02000500000000000000" pitchFamily="2" charset="0"/>
-                        </a:rPr>
-                        <a:t>Q3</a:t>
-                      </a:r>
-                    </a:p>
-                  </a:txBody>
-                  <a:tcPr marL="96897" marR="96897" marT="48449" marB="48449" anchor="ctr">
-                    <a:solidFill>
-                      <a:schemeClr val="accent2">
-                        <a:lumMod val="40000"/>
-                        <a:lumOff val="60000"/>
-                      </a:schemeClr>
-                    </a:solidFill>
-                  </a:tcPr>
-                </a:tc>
-                <a:tc>
-                  <a:txBody>
-                    <a:bodyPr/>
-                    <a:lstStyle/>
-                    <a:p>
-                      <a:pPr algn="ctr"/>
-                      <a:r>
-                        <a:rPr lang="en-US" sz="1900" dirty="0">
-                          <a:solidFill>
-                            <a:schemeClr val="tx1"/>
-                          </a:solidFill>
-                          <a:latin typeface="Sabon Next LT" panose="02000500000000000000" pitchFamily="2" charset="0"/>
-                          <a:cs typeface="Sabon Next LT" panose="02000500000000000000" pitchFamily="2" charset="0"/>
-                        </a:rPr>
-                        <a:t>2.1</a:t>
-                      </a:r>
-                    </a:p>
-                  </a:txBody>
-                  <a:tcPr marL="96897" marR="96897" marT="48449" marB="48449" anchor="ctr">
-                    <a:solidFill>
-                      <a:schemeClr val="accent2">
-                        <a:lumMod val="40000"/>
-                        <a:lumOff val="60000"/>
-                      </a:schemeClr>
-                    </a:solidFill>
-                  </a:tcPr>
-                </a:tc>
-                <a:tc>
-                  <a:txBody>
-                    <a:bodyPr/>
-                    <a:lstStyle/>
-                    <a:p>
-                      <a:pPr algn="ctr"/>
-                      <a:r>
-                        <a:rPr lang="en-US" sz="1900" dirty="0">
-                          <a:solidFill>
-                            <a:schemeClr val="tx1"/>
-                          </a:solidFill>
-                          <a:latin typeface="Sabon Next LT" panose="02000500000000000000" pitchFamily="2" charset="0"/>
-                          <a:cs typeface="Sabon Next LT" panose="02000500000000000000" pitchFamily="2" charset="0"/>
-                        </a:rPr>
-                        <a:t>1.7</a:t>
-                      </a:r>
-                    </a:p>
-                  </a:txBody>
-                  <a:tcPr marL="96897" marR="96897" marT="48449" marB="48449" anchor="ctr">
-                    <a:solidFill>
-                      <a:schemeClr val="accent2">
-                        <a:lumMod val="40000"/>
-                        <a:lumOff val="60000"/>
-                      </a:schemeClr>
-                    </a:solidFill>
-                  </a:tcPr>
-                </a:tc>
-                <a:tc>
-                  <a:txBody>
-                    <a:bodyPr/>
-                    <a:lstStyle/>
-                    <a:p>
-                      <a:pPr algn="ctr"/>
-                      <a:r>
-                        <a:rPr lang="en-US" sz="1900" dirty="0">
-                          <a:solidFill>
-                            <a:schemeClr val="tx1"/>
-                          </a:solidFill>
-                          <a:latin typeface="Sabon Next LT" panose="02000500000000000000" pitchFamily="2" charset="0"/>
-                          <a:cs typeface="Sabon Next LT" panose="02000500000000000000" pitchFamily="2" charset="0"/>
-                        </a:rPr>
-                        <a:t>2.5</a:t>
-                      </a:r>
-                    </a:p>
-                  </a:txBody>
-                  <a:tcPr marL="96897" marR="96897" marT="48449" marB="48449" anchor="ctr">
-                    <a:solidFill>
-                      <a:schemeClr val="accent2">
-                        <a:lumMod val="40000"/>
-                        <a:lumOff val="60000"/>
-                      </a:schemeClr>
-                    </a:solidFill>
-                  </a:tcPr>
-                </a:tc>
-                <a:tc>
-                  <a:txBody>
-                    <a:bodyPr/>
-                    <a:lstStyle/>
-                    <a:p>
-                      <a:pPr algn="ctr"/>
-                      <a:r>
-                        <a:rPr lang="en-US" sz="1900" dirty="0">
-                          <a:solidFill>
-                            <a:schemeClr val="tx1"/>
-                          </a:solidFill>
-                          <a:latin typeface="Sabon Next LT" panose="02000500000000000000" pitchFamily="2" charset="0"/>
-                          <a:cs typeface="Sabon Next LT" panose="02000500000000000000" pitchFamily="2" charset="0"/>
-                        </a:rPr>
-                        <a:t>2.8</a:t>
-                      </a:r>
-                    </a:p>
-                  </a:txBody>
-                  <a:tcPr marL="96897" marR="96897" marT="48449" marB="48449" anchor="ctr">
-                    <a:solidFill>
-                      <a:schemeClr val="accent2">
-                        <a:lumMod val="40000"/>
-                        <a:lumOff val="60000"/>
-                      </a:schemeClr>
-                    </a:solidFill>
-                  </a:tcPr>
-                </a:tc>
-                <a:extLst>
-                  <a:ext uri="{0D108BD9-81ED-4DB2-BD59-A6C34878D82A}">
-                    <a16:rowId xmlns:a16="http://schemas.microsoft.com/office/drawing/2014/main" val="415808797"/>
-                  </a:ext>
-                </a:extLst>
-              </a:tr>
-              <a:tr h="546269">
-                <a:tc>
-                  <a:txBody>
-                    <a:bodyPr/>
-                    <a:lstStyle/>
-                    <a:p>
-                      <a:pPr algn="ctr"/>
-                      <a:r>
-                        <a:rPr lang="en-US" sz="1900" dirty="0">
-                          <a:solidFill>
-                            <a:schemeClr val="tx1"/>
-                          </a:solidFill>
-                          <a:latin typeface="Sabon Next LT" panose="02000500000000000000" pitchFamily="2" charset="0"/>
-                          <a:cs typeface="Sabon Next LT" panose="02000500000000000000" pitchFamily="2" charset="0"/>
-                        </a:rPr>
-                        <a:t>Q4</a:t>
-                      </a:r>
-                    </a:p>
-                  </a:txBody>
-                  <a:tcPr marL="96897" marR="96897" marT="48449" marB="48449" anchor="ctr">
-                    <a:solidFill>
-                      <a:schemeClr val="accent2">
-                        <a:lumMod val="20000"/>
-                        <a:lumOff val="80000"/>
-                      </a:schemeClr>
-                    </a:solidFill>
-                  </a:tcPr>
-                </a:tc>
-                <a:tc>
-                  <a:txBody>
-                    <a:bodyPr/>
-                    <a:lstStyle/>
-                    <a:p>
-                      <a:pPr algn="ctr"/>
-                      <a:r>
-                        <a:rPr lang="en-US" sz="1900" dirty="0">
-                          <a:solidFill>
-                            <a:schemeClr val="tx1"/>
-                          </a:solidFill>
-                          <a:latin typeface="Sabon Next LT" panose="02000500000000000000" pitchFamily="2" charset="0"/>
-                          <a:cs typeface="Sabon Next LT" panose="02000500000000000000" pitchFamily="2" charset="0"/>
-                        </a:rPr>
-                        <a:t>4.5</a:t>
-                      </a:r>
-                    </a:p>
-                  </a:txBody>
-                  <a:tcPr marL="96897" marR="96897" marT="48449" marB="48449" anchor="ctr">
-                    <a:solidFill>
-                      <a:schemeClr val="accent2">
-                        <a:lumMod val="20000"/>
-                        <a:lumOff val="80000"/>
-                      </a:schemeClr>
-                    </a:solidFill>
-                  </a:tcPr>
-                </a:tc>
-                <a:tc>
-                  <a:txBody>
-                    <a:bodyPr/>
-                    <a:lstStyle/>
-                    <a:p>
-                      <a:pPr algn="ctr"/>
-                      <a:r>
-                        <a:rPr lang="en-US" sz="1900" dirty="0">
-                          <a:solidFill>
-                            <a:schemeClr val="tx1"/>
-                          </a:solidFill>
-                          <a:latin typeface="Sabon Next LT" panose="02000500000000000000" pitchFamily="2" charset="0"/>
-                          <a:cs typeface="Sabon Next LT" panose="02000500000000000000" pitchFamily="2" charset="0"/>
-                        </a:rPr>
-                        <a:t>2.2</a:t>
-                      </a:r>
-                    </a:p>
-                  </a:txBody>
-                  <a:tcPr marL="96897" marR="96897" marT="48449" marB="48449" anchor="ctr">
-                    <a:solidFill>
-                      <a:schemeClr val="accent2">
-                        <a:lumMod val="20000"/>
-                        <a:lumOff val="80000"/>
-                      </a:schemeClr>
-                    </a:solidFill>
-                  </a:tcPr>
-                </a:tc>
-                <a:tc>
-                  <a:txBody>
-                    <a:bodyPr/>
-                    <a:lstStyle/>
-                    <a:p>
-                      <a:pPr algn="ctr"/>
-                      <a:r>
-                        <a:rPr lang="en-US" sz="1900" dirty="0">
-                          <a:solidFill>
-                            <a:schemeClr val="tx1"/>
-                          </a:solidFill>
-                          <a:latin typeface="Sabon Next LT" panose="02000500000000000000" pitchFamily="2" charset="0"/>
-                          <a:cs typeface="Sabon Next LT" panose="02000500000000000000" pitchFamily="2" charset="0"/>
-                        </a:rPr>
-                        <a:t>1.7</a:t>
-                      </a:r>
-                    </a:p>
-                  </a:txBody>
-                  <a:tcPr marL="96897" marR="96897" marT="48449" marB="48449" anchor="ctr">
-                    <a:solidFill>
-                      <a:schemeClr val="accent2">
-                        <a:lumMod val="20000"/>
-                        <a:lumOff val="80000"/>
-                      </a:schemeClr>
-                    </a:solidFill>
-                  </a:tcPr>
-                </a:tc>
-                <a:tc>
-                  <a:txBody>
-                    <a:bodyPr/>
-                    <a:lstStyle/>
-                    <a:p>
-                      <a:pPr algn="ctr"/>
-                      <a:r>
-                        <a:rPr lang="en-US" sz="1900" dirty="0">
-                          <a:solidFill>
-                            <a:schemeClr val="tx1"/>
-                          </a:solidFill>
-                          <a:latin typeface="Sabon Next LT" panose="02000500000000000000" pitchFamily="2" charset="0"/>
-                          <a:cs typeface="Sabon Next LT" panose="02000500000000000000" pitchFamily="2" charset="0"/>
-                        </a:rPr>
-                        <a:t>7.0</a:t>
-                      </a:r>
-                    </a:p>
-                  </a:txBody>
-                  <a:tcPr marL="96897" marR="96897" marT="48449" marB="48449" anchor="ctr">
-                    <a:solidFill>
-                      <a:schemeClr val="accent2">
-                        <a:lumMod val="20000"/>
-                        <a:lumOff val="80000"/>
-                      </a:schemeClr>
-                    </a:solidFill>
-                  </a:tcPr>
-                </a:tc>
-                <a:extLst>
-                  <a:ext uri="{0D108BD9-81ED-4DB2-BD59-A6C34878D82A}">
-                    <a16:rowId xmlns:a16="http://schemas.microsoft.com/office/drawing/2014/main" val="380950325"/>
-                  </a:ext>
-                </a:extLst>
-              </a:tr>
-            </a:tbl>
-          </a:graphicData>
-        </a:graphic>
-      </p:graphicFrame>
-      <p:sp>
-        <p:nvSpPr>
-          <p:cNvPr id="7" name="Footer Placeholder 6">
-            <a:extLst>
-              <a:ext uri="{FF2B5EF4-FFF2-40B4-BE49-F238E27FC236}">
-                <a16:creationId xmlns:a16="http://schemas.microsoft.com/office/drawing/2014/main" id="{3A122237-B06F-5E42-B051-D7859FC21D7D}"/>
-              </a:ext>
-            </a:extLst>
-          </p:cNvPr>
-          <p:cNvSpPr>
-            <a:spLocks noGrp="1"/>
-          </p:cNvSpPr>
-          <p:nvPr>
-            <p:ph type="ftr" sz="quarter" idx="11"/>
-          </p:nvPr>
-        </p:nvSpPr>
-        <p:spPr/>
-        <p:txBody>
-          <a:bodyPr/>
-          <a:lstStyle/>
-          <a:p>
-            <a:r>
-              <a:rPr lang="en-US"/>
-              <a:t>Presentation title</a:t>
-            </a:r>
-            <a:endParaRPr lang="en-US" dirty="0"/>
-          </a:p>
-        </p:txBody>
-      </p:sp>
-      <p:sp>
-        <p:nvSpPr>
-          <p:cNvPr id="8" name="Slide Number Placeholder 7">
-            <a:extLst>
-              <a:ext uri="{FF2B5EF4-FFF2-40B4-BE49-F238E27FC236}">
-                <a16:creationId xmlns:a16="http://schemas.microsoft.com/office/drawing/2014/main" id="{AECF22D2-2B16-C40D-AA90-609B5CD08B3D}"/>
-              </a:ext>
-            </a:extLst>
-          </p:cNvPr>
-          <p:cNvSpPr>
-            <a:spLocks noGrp="1"/>
-          </p:cNvSpPr>
-          <p:nvPr>
-            <p:ph type="sldNum" sz="quarter" idx="12"/>
-          </p:nvPr>
-        </p:nvSpPr>
-        <p:spPr/>
-        <p:txBody>
-          <a:bodyPr/>
-          <a:lstStyle/>
-          <a:p>
-            <a:fld id="{48F63A3B-78C7-47BE-AE5E-E10140E04643}" type="slidenum">
-              <a:rPr lang="en-US" smtClean="0"/>
-              <a:t>7</a:t>
-            </a:fld>
-            <a:endParaRPr lang="en-US" dirty="0"/>
-          </a:p>
-        </p:txBody>
-      </p:sp>
+          <p:cNvPicPr>
+            <a:picLocks noChangeAspect="1"/>
+          </p:cNvPicPr>
+          <p:nvPr/>
+        </p:nvPicPr>
+        <p:blipFill>
+          <a:blip r:embed="rId3"/>
+          <a:stretch>
+            <a:fillRect/>
+          </a:stretch>
+        </p:blipFill>
+        <p:spPr>
+          <a:xfrm>
+            <a:off x="0" y="227405"/>
+            <a:ext cx="12192000" cy="6403189"/>
+          </a:xfrm>
+          <a:prstGeom prst="rect">
+            <a:avLst/>
+          </a:prstGeom>
+        </p:spPr>
+      </p:pic>
     </p:spTree>
     <p:extLst>
       <p:ext uri="{BB962C8B-B14F-4D97-AF65-F5344CB8AC3E}">
-        <p14:creationId xmlns:p14="http://schemas.microsoft.com/office/powerpoint/2010/main" val="2886474736"/>
+        <p14:creationId xmlns:p14="http://schemas.microsoft.com/office/powerpoint/2010/main" val="330156191"/>
       </p:ext>
     </p:extLst>
   </p:cSld>
@@ -26907,97 +25545,40 @@
           <a:chExt cx="0" cy="0"/>
         </a:xfrm>
       </p:grpSpPr>
-      <p:sp>
-        <p:nvSpPr>
-          <p:cNvPr id="4" name="Title 3">
+      <p:pic>
+        <p:nvPicPr>
+          <p:cNvPr id="10" name="Picture 9">
             <a:extLst>
               <a:ext uri="{FF2B5EF4-FFF2-40B4-BE49-F238E27FC236}">
-                <a16:creationId xmlns:a16="http://schemas.microsoft.com/office/drawing/2014/main" id="{77C09F16-6D23-666F-6800-8FC697831948}"/>
+                <a16:creationId xmlns:a16="http://schemas.microsoft.com/office/drawing/2014/main" id="{A60F42F0-C152-59D4-C3CF-88E1D723A929}"/>
               </a:ext>
             </a:extLst>
           </p:cNvPr>
-          <p:cNvSpPr>
-            <a:spLocks noGrp="1"/>
-          </p:cNvSpPr>
-          <p:nvPr>
-            <p:ph type="title"/>
-          </p:nvPr>
-        </p:nvSpPr>
-        <p:spPr/>
-        <p:txBody>
-          <a:bodyPr/>
-          <a:lstStyle/>
-          <a:p>
-            <a:r>
-              <a:rPr lang="en-US" dirty="0"/>
-              <a:t>MEET OUR TEAM</a:t>
-            </a:r>
-          </a:p>
-        </p:txBody>
-      </p:sp>
-      <p:sp>
-        <p:nvSpPr>
-          <p:cNvPr id="73" name="Footer Placeholder 72">
-            <a:extLst>
-              <a:ext uri="{FF2B5EF4-FFF2-40B4-BE49-F238E27FC236}">
-                <a16:creationId xmlns:a16="http://schemas.microsoft.com/office/drawing/2014/main" id="{253AA363-0A91-5CE9-7764-DD7813D6BF70}"/>
-              </a:ext>
-            </a:extLst>
-          </p:cNvPr>
-          <p:cNvSpPr>
-            <a:spLocks noGrp="1"/>
-          </p:cNvSpPr>
-          <p:nvPr>
-            <p:ph type="ftr" sz="quarter" idx="11"/>
-          </p:nvPr>
-        </p:nvSpPr>
-        <p:spPr/>
-        <p:txBody>
-          <a:bodyPr/>
-          <a:lstStyle/>
-          <a:p>
-            <a:r>
-              <a:rPr lang="en-US"/>
-              <a:t>Presentation title</a:t>
-            </a:r>
-            <a:endParaRPr lang="en-US" dirty="0"/>
-          </a:p>
-        </p:txBody>
-      </p:sp>
-      <p:sp>
-        <p:nvSpPr>
-          <p:cNvPr id="74" name="Slide Number Placeholder 73">
-            <a:extLst>
-              <a:ext uri="{FF2B5EF4-FFF2-40B4-BE49-F238E27FC236}">
-                <a16:creationId xmlns:a16="http://schemas.microsoft.com/office/drawing/2014/main" id="{B964C6B0-844C-A964-2B74-46CF893E1381}"/>
-              </a:ext>
-            </a:extLst>
-          </p:cNvPr>
-          <p:cNvSpPr>
-            <a:spLocks noGrp="1"/>
-          </p:cNvSpPr>
-          <p:nvPr>
-            <p:ph type="sldNum" sz="quarter" idx="12"/>
-          </p:nvPr>
-        </p:nvSpPr>
-        <p:spPr/>
-        <p:txBody>
-          <a:bodyPr/>
-          <a:lstStyle/>
-          <a:p>
-            <a:fld id="{48F63A3B-78C7-47BE-AE5E-E10140E04643}" type="slidenum">
-              <a:rPr lang="en-US" smtClean="0"/>
-              <a:pPr/>
-              <a:t>8</a:t>
-            </a:fld>
-            <a:endParaRPr lang="en-US" dirty="0"/>
-          </a:p>
-        </p:txBody>
-      </p:sp>
+          <p:cNvPicPr>
+            <a:picLocks noChangeAspect="1"/>
+          </p:cNvPicPr>
+          <p:nvPr/>
+        </p:nvPicPr>
+        <p:blipFill>
+          <a:blip r:embed="rId3"/>
+          <a:stretch>
+            <a:fillRect/>
+          </a:stretch>
+        </p:blipFill>
+        <p:spPr>
+          <a:xfrm>
+            <a:off x="825905" y="0"/>
+            <a:ext cx="10540190" cy="6858000"/>
+          </a:xfrm>
+          <a:prstGeom prst="rect">
+            <a:avLst/>
+          </a:prstGeom>
+        </p:spPr>
+      </p:pic>
     </p:spTree>
     <p:extLst>
       <p:ext uri="{BB962C8B-B14F-4D97-AF65-F5344CB8AC3E}">
-        <p14:creationId xmlns:p14="http://schemas.microsoft.com/office/powerpoint/2010/main" val="2011930182"/>
+        <p14:creationId xmlns:p14="http://schemas.microsoft.com/office/powerpoint/2010/main" val="1597981355"/>
       </p:ext>
     </p:extLst>
   </p:cSld>
@@ -27024,68 +25605,40 @@
           <a:chExt cx="0" cy="0"/>
         </a:xfrm>
       </p:grpSpPr>
-      <p:sp>
-        <p:nvSpPr>
-          <p:cNvPr id="7" name="Title 6">
+      <p:pic>
+        <p:nvPicPr>
+          <p:cNvPr id="4" name="Picture 3">
             <a:extLst>
               <a:ext uri="{FF2B5EF4-FFF2-40B4-BE49-F238E27FC236}">
-                <a16:creationId xmlns:a16="http://schemas.microsoft.com/office/drawing/2014/main" id="{330A5BFC-C134-C072-C14D-9E51A94C8E7E}"/>
+                <a16:creationId xmlns:a16="http://schemas.microsoft.com/office/drawing/2014/main" id="{D6472FDB-F1C0-8B65-2A56-D5A4EC659E8B}"/>
               </a:ext>
             </a:extLst>
           </p:cNvPr>
-          <p:cNvSpPr>
-            <a:spLocks noGrp="1"/>
-          </p:cNvSpPr>
-          <p:nvPr>
-            <p:ph type="title"/>
-          </p:nvPr>
-        </p:nvSpPr>
-        <p:spPr/>
-        <p:txBody>
-          <a:bodyPr/>
-          <a:lstStyle/>
-          <a:p>
-            <a:r>
-              <a:rPr lang="en-US" dirty="0"/>
-              <a:t>Future project plans</a:t>
-            </a:r>
-          </a:p>
-        </p:txBody>
-      </p:sp>
-      <p:sp>
-        <p:nvSpPr>
-          <p:cNvPr id="175" name="Slide Number Placeholder 174">
-            <a:extLst>
-              <a:ext uri="{FF2B5EF4-FFF2-40B4-BE49-F238E27FC236}">
-                <a16:creationId xmlns:a16="http://schemas.microsoft.com/office/drawing/2014/main" id="{1DECFA06-D307-B47D-DA95-31161374AD30}"/>
-              </a:ext>
-            </a:extLst>
-          </p:cNvPr>
-          <p:cNvSpPr>
-            <a:spLocks noGrp="1"/>
-          </p:cNvSpPr>
-          <p:nvPr>
-            <p:ph type="sldNum" sz="quarter" idx="12"/>
-          </p:nvPr>
-        </p:nvSpPr>
-        <p:spPr/>
-        <p:txBody>
-          <a:bodyPr/>
-          <a:lstStyle/>
-          <a:p>
-            <a:fld id="{48F63A3B-78C7-47BE-AE5E-E10140E04643}" type="slidenum">
-              <a:rPr lang="en-US" smtClean="0"/>
-              <a:pPr/>
-              <a:t>9</a:t>
-            </a:fld>
-            <a:endParaRPr lang="en-US" dirty="0"/>
-          </a:p>
-        </p:txBody>
-      </p:sp>
+          <p:cNvPicPr>
+            <a:picLocks noChangeAspect="1"/>
+          </p:cNvPicPr>
+          <p:nvPr/>
+        </p:nvPicPr>
+        <p:blipFill>
+          <a:blip r:embed="rId3"/>
+          <a:stretch>
+            <a:fillRect/>
+          </a:stretch>
+        </p:blipFill>
+        <p:spPr>
+          <a:xfrm>
+            <a:off x="0" y="1251390"/>
+            <a:ext cx="12192000" cy="4532676"/>
+          </a:xfrm>
+          <a:prstGeom prst="rect">
+            <a:avLst/>
+          </a:prstGeom>
+        </p:spPr>
+      </p:pic>
     </p:spTree>
     <p:extLst>
       <p:ext uri="{BB962C8B-B14F-4D97-AF65-F5344CB8AC3E}">
-        <p14:creationId xmlns:p14="http://schemas.microsoft.com/office/powerpoint/2010/main" val="2502887943"/>
+        <p14:creationId xmlns:p14="http://schemas.microsoft.com/office/powerpoint/2010/main" val="2886474736"/>
       </p:ext>
     </p:extLst>
   </p:cSld>

</xml_diff>

<commit_message>
refactored the code to ignore the original data masks. also considered employee residency as well
</commit_message>
<xml_diff>
--- a/powerpoint/Data Science Salaries from 2022-2023 pt2.pptx
+++ b/powerpoint/Data Science Salaries from 2022-2023 pt2.pptx
@@ -5,7 +5,7 @@
     <p:sldMasterId id="2147483650" r:id="rId1"/>
   </p:sldMasterIdLst>
   <p:notesMasterIdLst>
-    <p:notesMasterId r:id="rId16"/>
+    <p:notesMasterId r:id="rId15"/>
   </p:notesMasterIdLst>
   <p:sldIdLst>
     <p:sldId id="278" r:id="rId2"/>
@@ -20,8 +20,7 @@
     <p:sldId id="283" r:id="rId11"/>
     <p:sldId id="289" r:id="rId12"/>
     <p:sldId id="293" r:id="rId13"/>
-    <p:sldId id="290" r:id="rId14"/>
-    <p:sldId id="292" r:id="rId15"/>
+    <p:sldId id="298" r:id="rId14"/>
   </p:sldIdLst>
   <p:sldSz cx="12192000" cy="6858000"/>
   <p:notesSz cx="13716000" cy="24384000"/>
@@ -456,7 +455,28 @@
           <a:bodyPr/>
           <a:lstStyle/>
           <a:p>
-            <a:endParaRPr lang="en-US" dirty="0"/>
+            <a:r>
+              <a:rPr lang="en-US" dirty="0"/>
+              <a:t>Good afternoon,</a:t>
+            </a:r>
+          </a:p>
+          <a:p>
+            <a:r>
+              <a:rPr lang="en-US" dirty="0"/>
+              <a:t>My name is Joshlyn Jamerson, and this presentation is going to cover information about full-time, U.S. based, data science salaries from 2020-2023. </a:t>
+            </a:r>
+          </a:p>
+          <a:p>
+            <a:r>
+              <a:rPr lang="en-US" dirty="0"/>
+              <a:t>I chose this topic, mainly because I’m nosy, and I love knowing what other people make. No but seriously, I thought this was a great dataset since everyone in this zoom room has some interest in this topic. </a:t>
+            </a:r>
+          </a:p>
+          <a:p>
+            <a:r>
+              <a:rPr lang="en-US" dirty="0"/>
+              <a:t>Many of us will pursue a data science career after the military, so it’s beneficial to understand what the current market standards are in the data science field. </a:t>
+            </a:r>
           </a:p>
         </p:txBody>
       </p:sp>
@@ -464,6 +484,386 @@
     <p:extLst>
       <p:ext uri="{BB962C8B-B14F-4D97-AF65-F5344CB8AC3E}">
         <p14:creationId xmlns:p14="http://schemas.microsoft.com/office/powerpoint/2010/main" val="4290754978"/>
+      </p:ext>
+    </p:extLst>
+  </p:cSld>
+  <p:clrMapOvr>
+    <a:masterClrMapping/>
+  </p:clrMapOvr>
+</p:notes>
+</file>
+
+<file path=ppt/notesSlides/notesSlide10.xml><?xml version="1.0" encoding="utf-8"?>
+<p:notes xmlns:a="http://schemas.openxmlformats.org/drawingml/2006/main" xmlns:r="http://schemas.openxmlformats.org/officeDocument/2006/relationships" xmlns:p="http://schemas.openxmlformats.org/presentationml/2006/main">
+  <p:cSld>
+    <p:spTree>
+      <p:nvGrpSpPr>
+        <p:cNvPr id="1" name=""/>
+        <p:cNvGrpSpPr/>
+        <p:nvPr/>
+      </p:nvGrpSpPr>
+      <p:grpSpPr>
+        <a:xfrm>
+          <a:off x="0" y="0"/>
+          <a:ext cx="0" cy="0"/>
+          <a:chOff x="0" y="0"/>
+          <a:chExt cx="0" cy="0"/>
+        </a:xfrm>
+      </p:grpSpPr>
+      <p:sp>
+        <p:nvSpPr>
+          <p:cNvPr id="2" name="Slide Image Placeholder 1"/>
+          <p:cNvSpPr>
+            <a:spLocks noGrp="1" noRot="1" noChangeAspect="1"/>
+          </p:cNvSpPr>
+          <p:nvPr>
+            <p:ph type="sldImg"/>
+          </p:nvPr>
+        </p:nvSpPr>
+        <p:spPr>
+          <a:xfrm>
+            <a:off x="-457200" y="3048000"/>
+            <a:ext cx="14630400" cy="8229600"/>
+          </a:xfrm>
+          <a:prstGeom prst="rect">
+            <a:avLst/>
+          </a:prstGeom>
+          <a:noFill/>
+          <a:ln w="12700">
+            <a:solidFill>
+              <a:prstClr val="black"/>
+            </a:solidFill>
+          </a:ln>
+        </p:spPr>
+      </p:sp>
+      <p:sp>
+        <p:nvSpPr>
+          <p:cNvPr id="3" name="Notes Placeholder 2"/>
+          <p:cNvSpPr>
+            <a:spLocks noGrp="1"/>
+          </p:cNvSpPr>
+          <p:nvPr>
+            <p:ph type="body" idx="1"/>
+          </p:nvPr>
+        </p:nvSpPr>
+        <p:spPr>
+          <a:xfrm>
+            <a:off x="1371600" y="11734800"/>
+            <a:ext cx="10972800" cy="9601200"/>
+          </a:xfrm>
+          <a:prstGeom prst="rect">
+            <a:avLst/>
+          </a:prstGeom>
+        </p:spPr>
+        <p:txBody>
+          <a:bodyPr/>
+          <a:lstStyle/>
+          <a:p>
+            <a:r>
+              <a:rPr lang="en-US" dirty="0"/>
+              <a:t>This boxplot shows the salary distribution by experience level.</a:t>
+            </a:r>
+          </a:p>
+          <a:p>
+            <a:r>
+              <a:rPr lang="en-US" dirty="0"/>
+              <a:t>The whiskers are the minimum and maximum values. The line within the box is the median and the box itself shows the lower quartile and upper quartile ranges. Anything plotted outside of the whiskers are outliers. </a:t>
+            </a:r>
+          </a:p>
+          <a:p>
+            <a:r>
+              <a:rPr lang="en-US" dirty="0"/>
+              <a:t>As I expected, entry level jobs typically tend to be the lowest paid, followed by mid-level, senior level, and executive level. There are the most outliers with mid-level and senior level jobs. </a:t>
+            </a:r>
+          </a:p>
+        </p:txBody>
+      </p:sp>
+    </p:spTree>
+    <p:extLst>
+      <p:ext uri="{BB962C8B-B14F-4D97-AF65-F5344CB8AC3E}">
+        <p14:creationId xmlns:p14="http://schemas.microsoft.com/office/powerpoint/2010/main" val="4261528026"/>
+      </p:ext>
+    </p:extLst>
+  </p:cSld>
+  <p:clrMapOvr>
+    <a:masterClrMapping/>
+  </p:clrMapOvr>
+</p:notes>
+</file>
+
+<file path=ppt/notesSlides/notesSlide11.xml><?xml version="1.0" encoding="utf-8"?>
+<p:notes xmlns:a="http://schemas.openxmlformats.org/drawingml/2006/main" xmlns:r="http://schemas.openxmlformats.org/officeDocument/2006/relationships" xmlns:p="http://schemas.openxmlformats.org/presentationml/2006/main">
+  <p:cSld>
+    <p:spTree>
+      <p:nvGrpSpPr>
+        <p:cNvPr id="1" name=""/>
+        <p:cNvGrpSpPr/>
+        <p:nvPr/>
+      </p:nvGrpSpPr>
+      <p:grpSpPr>
+        <a:xfrm>
+          <a:off x="0" y="0"/>
+          <a:ext cx="0" cy="0"/>
+          <a:chOff x="0" y="0"/>
+          <a:chExt cx="0" cy="0"/>
+        </a:xfrm>
+      </p:grpSpPr>
+      <p:sp>
+        <p:nvSpPr>
+          <p:cNvPr id="2" name="Slide Image Placeholder 1"/>
+          <p:cNvSpPr>
+            <a:spLocks noGrp="1" noRot="1" noChangeAspect="1"/>
+          </p:cNvSpPr>
+          <p:nvPr>
+            <p:ph type="sldImg"/>
+          </p:nvPr>
+        </p:nvSpPr>
+        <p:spPr>
+          <a:xfrm>
+            <a:off x="-457200" y="3048000"/>
+            <a:ext cx="14630400" cy="8229600"/>
+          </a:xfrm>
+          <a:prstGeom prst="rect">
+            <a:avLst/>
+          </a:prstGeom>
+          <a:noFill/>
+          <a:ln w="12700">
+            <a:solidFill>
+              <a:prstClr val="black"/>
+            </a:solidFill>
+          </a:ln>
+        </p:spPr>
+      </p:sp>
+      <p:sp>
+        <p:nvSpPr>
+          <p:cNvPr id="3" name="Notes Placeholder 2"/>
+          <p:cNvSpPr>
+            <a:spLocks noGrp="1"/>
+          </p:cNvSpPr>
+          <p:nvPr>
+            <p:ph type="body" idx="1"/>
+          </p:nvPr>
+        </p:nvSpPr>
+        <p:spPr>
+          <a:xfrm>
+            <a:off x="1371600" y="11734800"/>
+            <a:ext cx="10972800" cy="9601200"/>
+          </a:xfrm>
+          <a:prstGeom prst="rect">
+            <a:avLst/>
+          </a:prstGeom>
+        </p:spPr>
+        <p:txBody>
+          <a:bodyPr/>
+          <a:lstStyle/>
+          <a:p>
+            <a:r>
+              <a:rPr lang="en-US" dirty="0"/>
+              <a:t>If I had more time, I would be interested in doing analysis on companies that are located outside of the U.S.</a:t>
+            </a:r>
+          </a:p>
+          <a:p>
+            <a:r>
+              <a:rPr lang="en-US" dirty="0"/>
+              <a:t>I would also be interested in looking into doing some comparison between employees pay who are located in the U.S. versus outside of the U.S.</a:t>
+            </a:r>
+          </a:p>
+          <a:p>
+            <a:r>
+              <a:rPr lang="en-US" dirty="0"/>
+              <a:t>It would be beneficial to look at other employment types besides just full time. </a:t>
+            </a:r>
+          </a:p>
+          <a:p>
+            <a:r>
+              <a:rPr lang="en-US" dirty="0"/>
+              <a:t>I would also like to look at other sources to compare the information in this dataset versus others to see how they vary. </a:t>
+            </a:r>
+          </a:p>
+        </p:txBody>
+      </p:sp>
+    </p:spTree>
+    <p:extLst>
+      <p:ext uri="{BB962C8B-B14F-4D97-AF65-F5344CB8AC3E}">
+        <p14:creationId xmlns:p14="http://schemas.microsoft.com/office/powerpoint/2010/main" val="734572894"/>
+      </p:ext>
+    </p:extLst>
+  </p:cSld>
+  <p:clrMapOvr>
+    <a:masterClrMapping/>
+  </p:clrMapOvr>
+</p:notes>
+</file>
+
+<file path=ppt/notesSlides/notesSlide12.xml><?xml version="1.0" encoding="utf-8"?>
+<p:notes xmlns:a="http://schemas.openxmlformats.org/drawingml/2006/main" xmlns:r="http://schemas.openxmlformats.org/officeDocument/2006/relationships" xmlns:p="http://schemas.openxmlformats.org/presentationml/2006/main">
+  <p:cSld>
+    <p:spTree>
+      <p:nvGrpSpPr>
+        <p:cNvPr id="1" name=""/>
+        <p:cNvGrpSpPr/>
+        <p:nvPr/>
+      </p:nvGrpSpPr>
+      <p:grpSpPr>
+        <a:xfrm>
+          <a:off x="0" y="0"/>
+          <a:ext cx="0" cy="0"/>
+          <a:chOff x="0" y="0"/>
+          <a:chExt cx="0" cy="0"/>
+        </a:xfrm>
+      </p:grpSpPr>
+      <p:sp>
+        <p:nvSpPr>
+          <p:cNvPr id="2" name="Slide Image Placeholder 1"/>
+          <p:cNvSpPr>
+            <a:spLocks noGrp="1" noRot="1" noChangeAspect="1"/>
+          </p:cNvSpPr>
+          <p:nvPr>
+            <p:ph type="sldImg"/>
+          </p:nvPr>
+        </p:nvSpPr>
+        <p:spPr>
+          <a:xfrm>
+            <a:off x="-457200" y="3048000"/>
+            <a:ext cx="14630400" cy="8229600"/>
+          </a:xfrm>
+          <a:prstGeom prst="rect">
+            <a:avLst/>
+          </a:prstGeom>
+          <a:noFill/>
+          <a:ln w="12700">
+            <a:solidFill>
+              <a:prstClr val="black"/>
+            </a:solidFill>
+          </a:ln>
+        </p:spPr>
+      </p:sp>
+      <p:sp>
+        <p:nvSpPr>
+          <p:cNvPr id="3" name="Notes Placeholder 2"/>
+          <p:cNvSpPr>
+            <a:spLocks noGrp="1"/>
+          </p:cNvSpPr>
+          <p:nvPr>
+            <p:ph type="body" idx="1"/>
+          </p:nvPr>
+        </p:nvSpPr>
+        <p:spPr>
+          <a:xfrm>
+            <a:off x="1371600" y="11734800"/>
+            <a:ext cx="10972800" cy="9601200"/>
+          </a:xfrm>
+          <a:prstGeom prst="rect">
+            <a:avLst/>
+          </a:prstGeom>
+        </p:spPr>
+        <p:txBody>
+          <a:bodyPr/>
+          <a:lstStyle/>
+          <a:p>
+            <a:r>
+              <a:rPr lang="en-US" dirty="0"/>
+              <a:t>Here how you can contact me or get more information about this dataset or my project.</a:t>
+            </a:r>
+          </a:p>
+          <a:p>
+            <a:r>
+              <a:rPr lang="en-US" dirty="0"/>
+              <a:t>Are there any questions?</a:t>
+            </a:r>
+          </a:p>
+          <a:p>
+            <a:endParaRPr lang="en-US" dirty="0"/>
+          </a:p>
+        </p:txBody>
+      </p:sp>
+    </p:spTree>
+    <p:extLst>
+      <p:ext uri="{BB962C8B-B14F-4D97-AF65-F5344CB8AC3E}">
+        <p14:creationId xmlns:p14="http://schemas.microsoft.com/office/powerpoint/2010/main" val="3279141555"/>
+      </p:ext>
+    </p:extLst>
+  </p:cSld>
+  <p:clrMapOvr>
+    <a:masterClrMapping/>
+  </p:clrMapOvr>
+</p:notes>
+</file>
+
+<file path=ppt/notesSlides/notesSlide13.xml><?xml version="1.0" encoding="utf-8"?>
+<p:notes xmlns:a="http://schemas.openxmlformats.org/drawingml/2006/main" xmlns:r="http://schemas.openxmlformats.org/officeDocument/2006/relationships" xmlns:p="http://schemas.openxmlformats.org/presentationml/2006/main">
+  <p:cSld>
+    <p:spTree>
+      <p:nvGrpSpPr>
+        <p:cNvPr id="1" name=""/>
+        <p:cNvGrpSpPr/>
+        <p:nvPr/>
+      </p:nvGrpSpPr>
+      <p:grpSpPr>
+        <a:xfrm>
+          <a:off x="0" y="0"/>
+          <a:ext cx="0" cy="0"/>
+          <a:chOff x="0" y="0"/>
+          <a:chExt cx="0" cy="0"/>
+        </a:xfrm>
+      </p:grpSpPr>
+      <p:sp>
+        <p:nvSpPr>
+          <p:cNvPr id="2" name="Slide Image Placeholder 1"/>
+          <p:cNvSpPr>
+            <a:spLocks noGrp="1" noRot="1" noChangeAspect="1"/>
+          </p:cNvSpPr>
+          <p:nvPr>
+            <p:ph type="sldImg"/>
+          </p:nvPr>
+        </p:nvSpPr>
+        <p:spPr>
+          <a:xfrm>
+            <a:off x="-457200" y="3048000"/>
+            <a:ext cx="14630400" cy="8229600"/>
+          </a:xfrm>
+          <a:prstGeom prst="rect">
+            <a:avLst/>
+          </a:prstGeom>
+          <a:noFill/>
+          <a:ln w="12700">
+            <a:solidFill>
+              <a:prstClr val="black"/>
+            </a:solidFill>
+          </a:ln>
+        </p:spPr>
+      </p:sp>
+      <p:sp>
+        <p:nvSpPr>
+          <p:cNvPr id="3" name="Notes Placeholder 2"/>
+          <p:cNvSpPr>
+            <a:spLocks noGrp="1"/>
+          </p:cNvSpPr>
+          <p:nvPr>
+            <p:ph type="body" idx="1"/>
+          </p:nvPr>
+        </p:nvSpPr>
+        <p:spPr>
+          <a:xfrm>
+            <a:off x="1371600" y="11734800"/>
+            <a:ext cx="10972800" cy="9601200"/>
+          </a:xfrm>
+          <a:prstGeom prst="rect">
+            <a:avLst/>
+          </a:prstGeom>
+        </p:spPr>
+        <p:txBody>
+          <a:bodyPr/>
+          <a:lstStyle/>
+          <a:p>
+            <a:endParaRPr lang="en-US" dirty="0"/>
+          </a:p>
+        </p:txBody>
+      </p:sp>
+    </p:spTree>
+    <p:extLst>
+      <p:ext uri="{BB962C8B-B14F-4D97-AF65-F5344CB8AC3E}">
+        <p14:creationId xmlns:p14="http://schemas.microsoft.com/office/powerpoint/2010/main" val="428056312"/>
       </p:ext>
     </p:extLst>
   </p:cSld>
@@ -564,25 +964,8 @@
                 <a:effectLst/>
                 <a:latin typeface="-apple-system"/>
               </a:rPr>
-              <a:t>Understanding the threshold for fair compensation is super important. It allows employers to know what is a fair wage to offer to people. This information can </a:t>
-            </a:r>
-            <a:r>
-              <a:rPr lang="en-US" b="0" i="0" dirty="0">
-                <a:solidFill>
-                  <a:srgbClr val="BDB7AF"/>
-                </a:solidFill>
-                <a:effectLst/>
-                <a:latin typeface="Söhne"/>
-              </a:rPr>
-              <a:t>ensure they are being fairly compensated for their skills, experience, and contributions. </a:t>
-            </a:r>
-            <a:endParaRPr lang="en-US" b="0" i="0" dirty="0">
-              <a:solidFill>
-                <a:schemeClr val="tx1"/>
-              </a:solidFill>
-              <a:effectLst/>
-              <a:latin typeface="-apple-system"/>
-            </a:endParaRPr>
+              <a:t>Now I’m going to cover the stakeholder interest. </a:t>
+            </a:r>
           </a:p>
           <a:p>
             <a:pPr marL="0" marR="0" lvl="0" indent="0" algn="l" defTabSz="914400" rtl="0" eaLnBrk="1" fontAlgn="auto" latinLnBrk="0" hangingPunct="1">
@@ -610,7 +993,7 @@
                 <a:effectLst/>
                 <a:latin typeface="-apple-system"/>
               </a:rPr>
-              <a:t>Wage information also allows those in search of a job to know what to expect. </a:t>
+              <a:t>Wage information allows for those in search of a job to know what to expect from an employer. </a:t>
             </a:r>
           </a:p>
           <a:p>
@@ -634,12 +1017,22 @@
             <a:r>
               <a:rPr lang="en-US" b="0" i="0" dirty="0">
                 <a:solidFill>
+                  <a:schemeClr val="tx1"/>
+                </a:solidFill>
+                <a:effectLst/>
+                <a:latin typeface="-apple-system"/>
+              </a:rPr>
+              <a:t>Understanding the threshold for fair compensation is super important. It allows employees to know what is a fair wage for certain positions and skill levels. This information can </a:t>
+            </a:r>
+            <a:r>
+              <a:rPr lang="en-US" b="0" i="0" dirty="0">
+                <a:solidFill>
                   <a:srgbClr val="BDB7AF"/>
                 </a:solidFill>
                 <a:effectLst/>
                 <a:latin typeface="Söhne"/>
               </a:rPr>
-              <a:t>This data can help individuals make informed decisions about career paths, job changes, and skill development to maximize their earning potential.</a:t>
+              <a:t>ensure they are being fairly compensated for their skills, experience, and contributions. </a:t>
             </a:r>
             <a:endParaRPr lang="en-US" b="0" i="0" dirty="0">
               <a:solidFill>
@@ -675,7 +1068,46 @@
                 <a:effectLst/>
                 <a:latin typeface="Söhne"/>
               </a:rPr>
-              <a:t>Access to salary information promotes transparency within organizations and across industries. </a:t>
+              <a:t>This data can help individuals make informed decisions about career paths, job changes, and skill development to maximize their earning potential.</a:t>
+            </a:r>
+          </a:p>
+          <a:p>
+            <a:pPr marL="0" marR="0" lvl="0" indent="0" algn="l" defTabSz="914400" rtl="0" eaLnBrk="1" fontAlgn="auto" latinLnBrk="0" hangingPunct="1">
+              <a:lnSpc>
+                <a:spcPct val="100000"/>
+              </a:lnSpc>
+              <a:spcBef>
+                <a:spcPts val="0"/>
+              </a:spcBef>
+              <a:spcAft>
+                <a:spcPts val="0"/>
+              </a:spcAft>
+              <a:buClrTx/>
+              <a:buSzTx/>
+              <a:buFontTx/>
+              <a:buNone/>
+              <a:tabLst/>
+              <a:defRPr/>
+            </a:pPr>
+            <a:r>
+              <a:rPr lang="en-US" b="0" i="0" dirty="0">
+                <a:solidFill>
+                  <a:schemeClr val="tx1"/>
+                </a:solidFill>
+                <a:effectLst/>
+                <a:latin typeface="-apple-system"/>
+              </a:rPr>
+              <a:t>Additionally, a</a:t>
+            </a:r>
+            <a:r>
+              <a:rPr lang="en-US" b="0" i="0" dirty="0">
+                <a:solidFill>
+                  <a:srgbClr val="BDB7AF"/>
+                </a:solidFill>
+                <a:effectLst/>
+                <a:latin typeface="Söhne"/>
+              </a:rPr>
+              <a:t>ccess to salary information promotes transparency within organizations and across industries. </a:t>
             </a:r>
             <a:endParaRPr lang="en-US" dirty="0">
               <a:solidFill>
@@ -767,7 +1199,40 @@
           <a:bodyPr/>
           <a:lstStyle/>
           <a:p>
-            <a:endParaRPr lang="en-US" dirty="0"/>
+            <a:r>
+              <a:rPr lang="en-US" dirty="0"/>
+              <a:t>The questions I will be answering are as follows:</a:t>
+            </a:r>
+          </a:p>
+          <a:p>
+            <a:r>
+              <a:rPr lang="en-US" dirty="0"/>
+              <a:t>What are the highest paid jobs in the data science field?</a:t>
+            </a:r>
+          </a:p>
+          <a:p>
+            <a:r>
+              <a:rPr lang="en-US" dirty="0"/>
+              <a:t>What are the lowest paid jobs?</a:t>
+            </a:r>
+          </a:p>
+          <a:p>
+            <a:r>
+              <a:rPr lang="en-US" dirty="0"/>
+              <a:t>What are the most popular jobs and the average pay for these positions?</a:t>
+            </a:r>
+          </a:p>
+          <a:p>
+            <a:r>
+              <a:rPr lang="en-US" dirty="0"/>
+              <a:t>Does experience level relate to pay?</a:t>
+            </a:r>
+          </a:p>
+          <a:p>
+            <a:r>
+              <a:rPr lang="en-US" dirty="0"/>
+              <a:t>Does company size relate supporting remote positions? </a:t>
+            </a:r>
           </a:p>
         </p:txBody>
       </p:sp>
@@ -861,6 +1326,12 @@
               <a:t>This dataset also contained information about multiple types of employees. I removed all data that was not related to full time employees. </a:t>
             </a:r>
           </a:p>
+          <a:p>
+            <a:r>
+              <a:rPr lang="en-US" dirty="0"/>
+              <a:t>This dataset had over 1,000 duplicate rows. I reviewed the duplicates and decided that it was likely and logical for there to be multiple occurrences of the entries.</a:t>
+            </a:r>
+          </a:p>
         </p:txBody>
       </p:sp>
     </p:spTree>
@@ -942,14 +1413,23 @@
           <a:bodyPr/>
           <a:lstStyle/>
           <a:p>
-            <a:endParaRPr lang="en-US" dirty="0"/>
+            <a:r>
+              <a:rPr lang="en-US" dirty="0"/>
+              <a:t>For the purpose of my analysis, I am focusing on the following columns: job title, salary in USD, employment type, company location, experience level, remote ratio, and company size. </a:t>
+            </a:r>
+          </a:p>
+          <a:p>
+            <a:r>
+              <a:rPr lang="en-US" dirty="0"/>
+              <a:t>The other columns in this dataset included work year, salary, and salary currency. </a:t>
+            </a:r>
           </a:p>
         </p:txBody>
       </p:sp>
     </p:spTree>
     <p:extLst>
       <p:ext uri="{BB962C8B-B14F-4D97-AF65-F5344CB8AC3E}">
-        <p14:creationId xmlns:p14="http://schemas.microsoft.com/office/powerpoint/2010/main" val="2188932178"/>
+        <p14:creationId xmlns:p14="http://schemas.microsoft.com/office/powerpoint/2010/main" val="3968875311"/>
       </p:ext>
     </p:extLst>
   </p:cSld>
@@ -1025,14 +1505,17 @@
           <a:bodyPr/>
           <a:lstStyle/>
           <a:p>
-            <a:endParaRPr lang="en-US" dirty="0"/>
+            <a:r>
+              <a:rPr lang="en-US" dirty="0"/>
+              <a:t>This chart shows the top 10 highest paid data science jobs. The range is from a Research Scientist with the salary of 450,000 dollars to a Director of Data Science with the salary of 353,000 dollars. </a:t>
+            </a:r>
           </a:p>
         </p:txBody>
       </p:sp>
     </p:spTree>
     <p:extLst>
       <p:ext uri="{BB962C8B-B14F-4D97-AF65-F5344CB8AC3E}">
-        <p14:creationId xmlns:p14="http://schemas.microsoft.com/office/powerpoint/2010/main" val="409545456"/>
+        <p14:creationId xmlns:p14="http://schemas.microsoft.com/office/powerpoint/2010/main" val="2188932178"/>
       </p:ext>
     </p:extLst>
   </p:cSld>
@@ -1108,14 +1591,17 @@
           <a:bodyPr/>
           <a:lstStyle/>
           <a:p>
-            <a:endParaRPr lang="en-US" dirty="0"/>
+            <a:r>
+              <a:rPr lang="en-US" dirty="0"/>
+              <a:t>On the other end, the range is from the Business Intelligence Data Engineer with 24,000 through the Data Operations Engineer and Business Intelligence Engineer at 60,000. </a:t>
+            </a:r>
           </a:p>
         </p:txBody>
       </p:sp>
     </p:spTree>
     <p:extLst>
       <p:ext uri="{BB962C8B-B14F-4D97-AF65-F5344CB8AC3E}">
-        <p14:creationId xmlns:p14="http://schemas.microsoft.com/office/powerpoint/2010/main" val="2150124098"/>
+        <p14:creationId xmlns:p14="http://schemas.microsoft.com/office/powerpoint/2010/main" val="409545456"/>
       </p:ext>
     </p:extLst>
   </p:cSld>
@@ -1193,27 +1679,35 @@
           <a:p>
             <a:r>
               <a:rPr lang="en-US" dirty="0"/>
-              <a:t>In terms of company sizes, small company is defined as a company with 500 employees or less</a:t>
+              <a:t>This graph displays the most common jobs and their average pay. The left y axis shows the salary in USD and the right y axis shows the overall job count for the position. </a:t>
             </a:r>
           </a:p>
           <a:p>
             <a:r>
               <a:rPr lang="en-US" dirty="0"/>
-              <a:t>Medium Company is defined as companies with 500-1000 employees.</a:t>
-            </a:r>
-          </a:p>
-          <a:p>
-            <a:r>
-              <a:rPr lang="en-US" dirty="0"/>
-              <a:t>Large companies is defined as companies with 1000+ employees. </a:t>
-            </a:r>
+              <a:t>The most common position in this dataset was a data engineer with an average salary of </a:t>
+            </a:r>
+            <a:r>
+              <a:rPr lang="en-US" b="0" i="0" dirty="0">
+                <a:solidFill>
+                  <a:srgbClr val="D4D4D4"/>
+                </a:solidFill>
+                <a:effectLst/>
+                <a:latin typeface="Segoe WPC"/>
+              </a:rPr>
+              <a:t>just over 153,000 dollars. </a:t>
+            </a:r>
+            <a:endParaRPr lang="en-US" dirty="0"/>
+          </a:p>
+          <a:p>
+            <a:endParaRPr lang="en-US" dirty="0"/>
           </a:p>
         </p:txBody>
       </p:sp>
     </p:spTree>
     <p:extLst>
       <p:ext uri="{BB962C8B-B14F-4D97-AF65-F5344CB8AC3E}">
-        <p14:creationId xmlns:p14="http://schemas.microsoft.com/office/powerpoint/2010/main" val="3408489037"/>
+        <p14:creationId xmlns:p14="http://schemas.microsoft.com/office/powerpoint/2010/main" val="2150124098"/>
       </p:ext>
     </p:extLst>
   </p:cSld>
@@ -1289,6 +1783,60 @@
           <a:bodyPr/>
           <a:lstStyle/>
           <a:p>
+            <a:r>
+              <a:rPr lang="en-US" dirty="0"/>
+              <a:t>To give you all some background on this dataset, </a:t>
+            </a:r>
+          </a:p>
+          <a:p>
+            <a:r>
+              <a:rPr lang="en-US" dirty="0"/>
+              <a:t>In terms of company sizes, small company is defined as a company with 500 employees or less</a:t>
+            </a:r>
+          </a:p>
+          <a:p>
+            <a:r>
+              <a:rPr lang="en-US" dirty="0"/>
+              <a:t>Medium Company is defined as companies with 500-1000 employees.</a:t>
+            </a:r>
+          </a:p>
+          <a:p>
+            <a:r>
+              <a:rPr lang="en-US" dirty="0"/>
+              <a:t>Large companies is defined as companies with 1000+ employees. </a:t>
+            </a:r>
+          </a:p>
+          <a:p>
+            <a:endParaRPr lang="en-US" dirty="0"/>
+          </a:p>
+          <a:p>
+            <a:r>
+              <a:rPr lang="en-US" dirty="0"/>
+              <a:t>Each graph shows the remote ratio by company size and split up into 3 categories: in person only which is 0%, hybrid which is 50%, and fully remote jobs which is 100%.</a:t>
+            </a:r>
+          </a:p>
+          <a:p>
+            <a:endParaRPr lang="en-US" dirty="0"/>
+          </a:p>
+          <a:p>
+            <a:r>
+              <a:rPr lang="en-US" dirty="0"/>
+              <a:t>Small companies had the least amount of in person jobs and mainly offered remote work.</a:t>
+            </a:r>
+          </a:p>
+          <a:p>
+            <a:r>
+              <a:rPr lang="en-US" dirty="0"/>
+              <a:t>Surprisingly, medium companies had the highest amount of in person jobs and very little hybrid work offered. </a:t>
+            </a:r>
+          </a:p>
+          <a:p>
+            <a:r>
+              <a:rPr lang="en-US" dirty="0"/>
+              <a:t>Large companies had the most variance with mainly in person work, a high amount of remote work, and hybrid options. </a:t>
+            </a:r>
+          </a:p>
+          <a:p>
             <a:endParaRPr lang="en-US" dirty="0"/>
           </a:p>
         </p:txBody>
@@ -1296,7 +1844,7 @@
     </p:spTree>
     <p:extLst>
       <p:ext uri="{BB962C8B-B14F-4D97-AF65-F5344CB8AC3E}">
-        <p14:creationId xmlns:p14="http://schemas.microsoft.com/office/powerpoint/2010/main" val="4261528026"/>
+        <p14:creationId xmlns:p14="http://schemas.microsoft.com/office/powerpoint/2010/main" val="3408489037"/>
       </p:ext>
     </p:extLst>
   </p:cSld>
@@ -24182,10 +24730,10 @@
       </p:grpSpPr>
       <p:pic>
         <p:nvPicPr>
-          <p:cNvPr id="11" name="Picture 10">
+          <p:cNvPr id="3" name="Picture 2">
             <a:extLst>
               <a:ext uri="{FF2B5EF4-FFF2-40B4-BE49-F238E27FC236}">
-                <a16:creationId xmlns:a16="http://schemas.microsoft.com/office/drawing/2014/main" id="{9A8657BA-97D5-28F2-73E8-3F561BA5BA12}"/>
+                <a16:creationId xmlns:a16="http://schemas.microsoft.com/office/drawing/2014/main" id="{95CD95F3-E118-4E0E-48D6-B5F770011505}"/>
               </a:ext>
             </a:extLst>
           </p:cNvPr>
@@ -24202,8 +24750,8 @@
         </p:blipFill>
         <p:spPr>
           <a:xfrm>
-            <a:off x="1306284" y="177592"/>
-            <a:ext cx="8539843" cy="6502816"/>
+            <a:off x="1480704" y="0"/>
+            <a:ext cx="9230591" cy="6858000"/>
           </a:xfrm>
           <a:prstGeom prst="rect">
             <a:avLst/>
@@ -24312,8 +24860,8 @@
         </p:nvSpPr>
         <p:spPr>
           <a:xfrm>
-            <a:off x="2031691" y="2801566"/>
-            <a:ext cx="7986409" cy="1908215"/>
+            <a:off x="2439904" y="2868735"/>
+            <a:ext cx="7986409" cy="2328843"/>
           </a:xfrm>
           <a:prstGeom prst="rect">
             <a:avLst/>
@@ -24325,37 +24873,6 @@
             <a:spAutoFit/>
           </a:bodyPr>
           <a:lstStyle/>
-          <a:p>
-            <a:pPr marR="0" lvl="0" algn="l" defTabSz="914400" rtl="0" eaLnBrk="1" fontAlgn="auto" latinLnBrk="0" hangingPunct="1">
-              <a:lnSpc>
-                <a:spcPct val="100000"/>
-              </a:lnSpc>
-              <a:spcBef>
-                <a:spcPts val="360"/>
-              </a:spcBef>
-              <a:spcAft>
-                <a:spcPts val="0"/>
-              </a:spcAft>
-              <a:buClrTx/>
-              <a:buSzTx/>
-              <a:tabLst/>
-              <a:defRPr/>
-            </a:pPr>
-            <a:endParaRPr kumimoji="0" lang="en-US" sz="2400" b="0" i="0" u="none" strike="noStrike" kern="1200" cap="none" spc="0" normalizeH="0" baseline="0" noProof="0" dirty="0">
-              <a:ln>
-                <a:noFill/>
-              </a:ln>
-              <a:solidFill>
-                <a:srgbClr val="1F2C8F"/>
-              </a:solidFill>
-              <a:effectLst/>
-              <a:uLnTx/>
-              <a:uFillTx/>
-              <a:latin typeface="Sabon Next LT"/>
-              <a:ea typeface="+mn-ea"/>
-              <a:cs typeface="+mn-cs"/>
-            </a:endParaRPr>
-          </a:p>
           <a:p>
             <a:pPr marL="342900" marR="0" lvl="0" indent="-342900" algn="l" defTabSz="914400" rtl="0" eaLnBrk="1" fontAlgn="auto" latinLnBrk="0" hangingPunct="1">
               <a:lnSpc>
@@ -24409,7 +24926,63 @@
                 </a:solidFill>
                 <a:latin typeface="Sabon Next LT"/>
               </a:rPr>
+              <a:t>Analysis on employees residing outside of the U.S.</a:t>
+            </a:r>
+          </a:p>
+          <a:p>
+            <a:pPr marL="342900" marR="0" lvl="0" indent="-342900" algn="l" defTabSz="914400" rtl="0" eaLnBrk="1" fontAlgn="auto" latinLnBrk="0" hangingPunct="1">
+              <a:lnSpc>
+                <a:spcPct val="100000"/>
+              </a:lnSpc>
+              <a:spcBef>
+                <a:spcPts val="360"/>
+              </a:spcBef>
+              <a:spcAft>
+                <a:spcPts val="0"/>
+              </a:spcAft>
+              <a:buClrTx/>
+              <a:buSzTx/>
+              <a:buFont typeface="Arial" panose="020B0604020202020204" pitchFamily="34" charset="0"/>
+              <a:buChar char="•"/>
+              <a:tabLst/>
+              <a:defRPr/>
+            </a:pPr>
+            <a:r>
+              <a:rPr lang="en-US" sz="2400" dirty="0">
+                <a:solidFill>
+                  <a:srgbClr val="1F2C8F"/>
+                </a:solidFill>
+                <a:latin typeface="Sabon Next LT"/>
+              </a:rPr>
               <a:t>Analysis on part-time, contract, and freelance salaries</a:t>
+            </a:r>
+          </a:p>
+          <a:p>
+            <a:pPr marL="342900" marR="0" lvl="0" indent="-342900" algn="l" defTabSz="914400" rtl="0" eaLnBrk="1" fontAlgn="auto" latinLnBrk="0" hangingPunct="1">
+              <a:lnSpc>
+                <a:spcPct val="100000"/>
+              </a:lnSpc>
+              <a:spcBef>
+                <a:spcPts val="360"/>
+              </a:spcBef>
+              <a:spcAft>
+                <a:spcPts val="0"/>
+              </a:spcAft>
+              <a:buClrTx/>
+              <a:buSzTx/>
+              <a:buFont typeface="Arial" panose="020B0604020202020204" pitchFamily="34" charset="0"/>
+              <a:buChar char="•"/>
+              <a:tabLst/>
+              <a:defRPr/>
+            </a:pPr>
+            <a:r>
+              <a:rPr lang="en-US" sz="2400" dirty="0">
+                <a:solidFill>
+                  <a:srgbClr val="1F2C8F"/>
+                </a:solidFill>
+                <a:latin typeface="Sabon Next LT"/>
+              </a:rPr>
+              <a:t>Information from other sources besides this dataset</a:t>
             </a:r>
             <a:endParaRPr lang="en-US" dirty="0"/>
           </a:p>
@@ -24539,7 +25112,7 @@
           <a:p>
             <a:r>
               <a:rPr lang="en-US" dirty="0">
-                <a:hlinkClick r:id="rId2"/>
+                <a:hlinkClick r:id="rId3"/>
               </a:rPr>
               <a:t>Joshlyn.Jamerson@spaceforce.mil</a:t>
             </a:r>
@@ -24552,7 +25125,7 @@
             </a:r>
             <a:r>
               <a:rPr lang="en-US" dirty="0">
-                <a:hlinkClick r:id="rId3"/>
+                <a:hlinkClick r:id="rId4"/>
               </a:rPr>
               <a:t>https://www.kaggle.com/datasets/arnabchaki/data-science-salaries-2023</a:t>
             </a:r>
@@ -24587,7 +25160,7 @@
 </file>
 
 <file path=ppt/slides/slide13.xml><?xml version="1.0" encoding="utf-8"?>
-<p:sld xmlns:a="http://schemas.openxmlformats.org/drawingml/2006/main" xmlns:r="http://schemas.openxmlformats.org/officeDocument/2006/relationships" xmlns:p="http://schemas.openxmlformats.org/presentationml/2006/main">
+<p:sld xmlns:a="http://schemas.openxmlformats.org/drawingml/2006/main" xmlns:r="http://schemas.openxmlformats.org/officeDocument/2006/relationships" xmlns:p="http://schemas.openxmlformats.org/presentationml/2006/main" show="0">
   <p:cSld>
     <p:spTree>
       <p:nvGrpSpPr>
@@ -24608,7 +25181,7 @@
           <p:cNvPr id="2" name="Title 1">
             <a:extLst>
               <a:ext uri="{FF2B5EF4-FFF2-40B4-BE49-F238E27FC236}">
-                <a16:creationId xmlns:a16="http://schemas.microsoft.com/office/drawing/2014/main" id="{86B309B0-6209-D3D0-9D5E-308B9F6E7303}"/>
+                <a16:creationId xmlns:a16="http://schemas.microsoft.com/office/drawing/2014/main" id="{8C4C6A79-28E0-BFBE-D06B-F40C4F5E8D53}"/>
               </a:ext>
             </a:extLst>
           </p:cNvPr>
@@ -24616,7 +25189,7 @@
             <a:spLocks noGrp="1"/>
           </p:cNvSpPr>
           <p:nvPr>
-            <p:ph type="title"/>
+            <p:ph type="ctrTitle"/>
           </p:nvPr>
         </p:nvSpPr>
         <p:spPr/>
@@ -24626,21 +25199,17 @@
           <a:p>
             <a:r>
               <a:rPr lang="en-US" dirty="0"/>
-              <a:t>text</a:t>
-            </a:r>
-            <a:br>
-              <a:rPr lang="en-US" dirty="0"/>
-            </a:br>
-            <a:endParaRPr lang="en-US" dirty="0"/>
+              <a:t>Work year breakout</a:t>
+            </a:r>
           </a:p>
         </p:txBody>
       </p:sp>
       <p:sp>
         <p:nvSpPr>
-          <p:cNvPr id="25" name="Slide Number Placeholder 24">
+          <p:cNvPr id="3" name="Subtitle 2">
             <a:extLst>
               <a:ext uri="{FF2B5EF4-FFF2-40B4-BE49-F238E27FC236}">
-                <a16:creationId xmlns:a16="http://schemas.microsoft.com/office/drawing/2014/main" id="{5058AE03-D409-0714-CCED-4548A9C92023}"/>
+                <a16:creationId xmlns:a16="http://schemas.microsoft.com/office/drawing/2014/main" id="{C6884800-1BF5-DA0F-0F9B-707A832C2AFC}"/>
               </a:ext>
             </a:extLst>
           </p:cNvPr>
@@ -24648,7 +25217,7 @@
             <a:spLocks noGrp="1"/>
           </p:cNvSpPr>
           <p:nvPr>
-            <p:ph type="sldNum" sz="quarter" idx="12"/>
+            <p:ph type="subTitle" idx="1"/>
           </p:nvPr>
         </p:nvSpPr>
         <p:spPr/>
@@ -24656,210 +25225,284 @@
           <a:bodyPr/>
           <a:lstStyle/>
           <a:p>
-            <a:fld id="{48F63A3B-78C7-47BE-AE5E-E10140E04643}" type="slidenum">
-              <a:rPr lang="en-US" smtClean="0"/>
-              <a:t>13</a:t>
-            </a:fld>
+            <a:r>
+              <a:rPr lang="en-US" b="0" i="0" dirty="0">
+                <a:effectLst/>
+                <a:latin typeface="Consolas" panose="020B0609020204030204" pitchFamily="49" charset="0"/>
+              </a:rPr>
+              <a:t>2023 1563 </a:t>
+            </a:r>
+          </a:p>
+          <a:p>
+            <a:r>
+              <a:rPr lang="en-US" b="0" i="0" dirty="0">
+                <a:effectLst/>
+                <a:latin typeface="Consolas" panose="020B0609020204030204" pitchFamily="49" charset="0"/>
+              </a:rPr>
+              <a:t>2022 1320 </a:t>
+            </a:r>
+          </a:p>
+          <a:p>
+            <a:r>
+              <a:rPr lang="en-US" b="0" i="0" dirty="0">
+                <a:effectLst/>
+                <a:latin typeface="Consolas" panose="020B0609020204030204" pitchFamily="49" charset="0"/>
+              </a:rPr>
+              <a:t>2021 83 </a:t>
+            </a:r>
+          </a:p>
+          <a:p>
+            <a:r>
+              <a:rPr lang="en-US" b="0" i="0" dirty="0">
+                <a:effectLst/>
+                <a:latin typeface="Consolas" panose="020B0609020204030204" pitchFamily="49" charset="0"/>
+              </a:rPr>
+              <a:t>2020 25 </a:t>
+            </a:r>
             <a:endParaRPr lang="en-US" dirty="0"/>
           </a:p>
         </p:txBody>
       </p:sp>
       <p:sp>
         <p:nvSpPr>
-          <p:cNvPr id="11" name="Text Placeholder 10">
+          <p:cNvPr id="5" name="TextBox 4">
             <a:extLst>
               <a:ext uri="{FF2B5EF4-FFF2-40B4-BE49-F238E27FC236}">
-                <a16:creationId xmlns:a16="http://schemas.microsoft.com/office/drawing/2014/main" id="{A2C39DD0-CD86-2929-7808-58D17FC2C0A6}"/>
+                <a16:creationId xmlns:a16="http://schemas.microsoft.com/office/drawing/2014/main" id="{2FE4E8BB-C85D-141D-8156-2A995B0CB587}"/>
               </a:ext>
             </a:extLst>
           </p:cNvPr>
-          <p:cNvSpPr>
-            <a:spLocks noGrp="1"/>
-          </p:cNvSpPr>
-          <p:nvPr>
-            <p:ph type="body" idx="1"/>
-          </p:nvPr>
+          <p:cNvSpPr txBox="1"/>
+          <p:nvPr/>
         </p:nvSpPr>
-        <p:spPr/>
+        <p:spPr>
+          <a:xfrm>
+            <a:off x="6182406" y="2572245"/>
+            <a:ext cx="6094638" cy="2862322"/>
+          </a:xfrm>
+          <a:prstGeom prst="rect">
+            <a:avLst/>
+          </a:prstGeom>
+          <a:noFill/>
+        </p:spPr>
         <p:txBody>
-          <a:bodyPr/>
+          <a:bodyPr wrap="square">
+            <a:spAutoFit/>
+          </a:bodyPr>
           <a:lstStyle/>
           <a:p>
             <a:r>
-              <a:rPr lang="en-US" dirty="0"/>
-              <a:t>text</a:t>
-            </a:r>
-          </a:p>
-        </p:txBody>
-      </p:sp>
-      <p:sp>
-        <p:nvSpPr>
-          <p:cNvPr id="12" name="Content Placeholder 11">
-            <a:extLst>
-              <a:ext uri="{FF2B5EF4-FFF2-40B4-BE49-F238E27FC236}">
-                <a16:creationId xmlns:a16="http://schemas.microsoft.com/office/drawing/2014/main" id="{CE3C1BFF-2275-1E7D-0604-E6F5CFEC01F6}"/>
-              </a:ext>
-            </a:extLst>
-          </p:cNvPr>
-          <p:cNvSpPr>
-            <a:spLocks noGrp="1"/>
-          </p:cNvSpPr>
-          <p:nvPr>
-            <p:ph sz="half" idx="2"/>
-          </p:nvPr>
-        </p:nvSpPr>
-        <p:spPr/>
-        <p:txBody>
-          <a:bodyPr/>
-          <a:lstStyle/>
-          <a:p>
-            <a:endParaRPr lang="en-US" dirty="0"/>
-          </a:p>
-        </p:txBody>
-      </p:sp>
-      <p:sp>
-        <p:nvSpPr>
-          <p:cNvPr id="13" name="Text Placeholder 12">
-            <a:extLst>
-              <a:ext uri="{FF2B5EF4-FFF2-40B4-BE49-F238E27FC236}">
-                <a16:creationId xmlns:a16="http://schemas.microsoft.com/office/drawing/2014/main" id="{F618F075-837C-1005-19D6-8DC90759CD53}"/>
-              </a:ext>
-            </a:extLst>
-          </p:cNvPr>
-          <p:cNvSpPr>
-            <a:spLocks noGrp="1"/>
-          </p:cNvSpPr>
-          <p:nvPr>
-            <p:ph type="body" sz="quarter" idx="3"/>
-          </p:nvPr>
-        </p:nvSpPr>
-        <p:spPr/>
-        <p:txBody>
-          <a:bodyPr/>
-          <a:lstStyle/>
-          <a:p>
-            <a:r>
-              <a:rPr lang="en-US" dirty="0"/>
-              <a:t>text</a:t>
-            </a:r>
-          </a:p>
-        </p:txBody>
-      </p:sp>
-      <p:sp>
-        <p:nvSpPr>
-          <p:cNvPr id="14" name="Content Placeholder 13">
-            <a:extLst>
-              <a:ext uri="{FF2B5EF4-FFF2-40B4-BE49-F238E27FC236}">
-                <a16:creationId xmlns:a16="http://schemas.microsoft.com/office/drawing/2014/main" id="{DD1D0BF9-FCAA-67DA-79AB-E6E7E6D2B6A1}"/>
-              </a:ext>
-            </a:extLst>
-          </p:cNvPr>
-          <p:cNvSpPr>
-            <a:spLocks noGrp="1"/>
-          </p:cNvSpPr>
-          <p:nvPr>
-            <p:ph sz="quarter" idx="4"/>
-          </p:nvPr>
-        </p:nvSpPr>
-        <p:spPr/>
-        <p:txBody>
-          <a:bodyPr/>
-          <a:lstStyle/>
-          <a:p>
-            <a:endParaRPr lang="en-US" dirty="0"/>
+              <a:rPr lang="en-US" b="0" i="0" dirty="0" err="1">
+                <a:solidFill>
+                  <a:schemeClr val="accent6"/>
+                </a:solidFill>
+                <a:effectLst/>
+                <a:latin typeface="Consolas" panose="020B0609020204030204" pitchFamily="49" charset="0"/>
+              </a:rPr>
+              <a:t>work_year</a:t>
+            </a:r>
+            <a:r>
+              <a:rPr lang="en-US" b="0" i="0" dirty="0">
+                <a:solidFill>
+                  <a:schemeClr val="accent6"/>
+                </a:solidFill>
+                <a:effectLst/>
+                <a:latin typeface="Consolas" panose="020B0609020204030204" pitchFamily="49" charset="0"/>
+              </a:rPr>
+              <a:t> 3022 non-null int64 1 </a:t>
+            </a:r>
+            <a:r>
+              <a:rPr lang="en-US" b="0" i="0" dirty="0" err="1">
+                <a:solidFill>
+                  <a:schemeClr val="accent6"/>
+                </a:solidFill>
+                <a:effectLst/>
+                <a:latin typeface="Consolas" panose="020B0609020204030204" pitchFamily="49" charset="0"/>
+              </a:rPr>
+              <a:t>experience_level</a:t>
+            </a:r>
+            <a:r>
+              <a:rPr lang="en-US" b="0" i="0" dirty="0">
+                <a:solidFill>
+                  <a:schemeClr val="accent6"/>
+                </a:solidFill>
+                <a:effectLst/>
+                <a:latin typeface="Consolas" panose="020B0609020204030204" pitchFamily="49" charset="0"/>
+              </a:rPr>
+              <a:t> 3022 non-null object 2 </a:t>
+            </a:r>
+            <a:r>
+              <a:rPr lang="en-US" b="0" i="0" dirty="0" err="1">
+                <a:solidFill>
+                  <a:schemeClr val="accent6"/>
+                </a:solidFill>
+                <a:effectLst/>
+                <a:latin typeface="Consolas" panose="020B0609020204030204" pitchFamily="49" charset="0"/>
+              </a:rPr>
+              <a:t>employment_type</a:t>
+            </a:r>
+            <a:r>
+              <a:rPr lang="en-US" b="0" i="0" dirty="0">
+                <a:solidFill>
+                  <a:schemeClr val="accent6"/>
+                </a:solidFill>
+                <a:effectLst/>
+                <a:latin typeface="Consolas" panose="020B0609020204030204" pitchFamily="49" charset="0"/>
+              </a:rPr>
+              <a:t> 3022 non-null object 3 </a:t>
+            </a:r>
+            <a:r>
+              <a:rPr lang="en-US" b="0" i="0" dirty="0" err="1">
+                <a:solidFill>
+                  <a:schemeClr val="accent6"/>
+                </a:solidFill>
+                <a:effectLst/>
+                <a:latin typeface="Consolas" panose="020B0609020204030204" pitchFamily="49" charset="0"/>
+              </a:rPr>
+              <a:t>job_title</a:t>
+            </a:r>
+            <a:r>
+              <a:rPr lang="en-US" b="0" i="0" dirty="0">
+                <a:solidFill>
+                  <a:schemeClr val="accent6"/>
+                </a:solidFill>
+                <a:effectLst/>
+                <a:latin typeface="Consolas" panose="020B0609020204030204" pitchFamily="49" charset="0"/>
+              </a:rPr>
+              <a:t> 3022 non-null object 4 salary 3022 non-null int64 5 </a:t>
+            </a:r>
+            <a:r>
+              <a:rPr lang="en-US" b="0" i="0" dirty="0" err="1">
+                <a:solidFill>
+                  <a:schemeClr val="accent6"/>
+                </a:solidFill>
+                <a:effectLst/>
+                <a:latin typeface="Consolas" panose="020B0609020204030204" pitchFamily="49" charset="0"/>
+              </a:rPr>
+              <a:t>salary_currency</a:t>
+            </a:r>
+            <a:r>
+              <a:rPr lang="en-US" b="0" i="0" dirty="0">
+                <a:solidFill>
+                  <a:schemeClr val="accent6"/>
+                </a:solidFill>
+                <a:effectLst/>
+                <a:latin typeface="Consolas" panose="020B0609020204030204" pitchFamily="49" charset="0"/>
+              </a:rPr>
+              <a:t> 3022 non-null object 6 </a:t>
+            </a:r>
+            <a:r>
+              <a:rPr lang="en-US" b="0" i="0" dirty="0" err="1">
+                <a:solidFill>
+                  <a:schemeClr val="accent6"/>
+                </a:solidFill>
+                <a:effectLst/>
+                <a:latin typeface="Consolas" panose="020B0609020204030204" pitchFamily="49" charset="0"/>
+              </a:rPr>
+              <a:t>salary_in_usd</a:t>
+            </a:r>
+            <a:r>
+              <a:rPr lang="en-US" b="0" i="0" dirty="0">
+                <a:solidFill>
+                  <a:schemeClr val="accent6"/>
+                </a:solidFill>
+                <a:effectLst/>
+                <a:latin typeface="Consolas" panose="020B0609020204030204" pitchFamily="49" charset="0"/>
+              </a:rPr>
+              <a:t> 3022 non-null int64 7 </a:t>
+            </a:r>
+            <a:r>
+              <a:rPr lang="en-US" b="0" i="0" dirty="0" err="1">
+                <a:solidFill>
+                  <a:schemeClr val="accent6"/>
+                </a:solidFill>
+                <a:effectLst/>
+                <a:latin typeface="Consolas" panose="020B0609020204030204" pitchFamily="49" charset="0"/>
+              </a:rPr>
+              <a:t>employee_residence</a:t>
+            </a:r>
+            <a:r>
+              <a:rPr lang="en-US" b="0" i="0" dirty="0">
+                <a:solidFill>
+                  <a:schemeClr val="accent6"/>
+                </a:solidFill>
+                <a:effectLst/>
+                <a:latin typeface="Consolas" panose="020B0609020204030204" pitchFamily="49" charset="0"/>
+              </a:rPr>
+              <a:t> 3022 non-null object 8 </a:t>
+            </a:r>
+            <a:r>
+              <a:rPr lang="en-US" b="0" i="0" dirty="0" err="1">
+                <a:solidFill>
+                  <a:schemeClr val="accent6"/>
+                </a:solidFill>
+                <a:effectLst/>
+                <a:latin typeface="Consolas" panose="020B0609020204030204" pitchFamily="49" charset="0"/>
+              </a:rPr>
+              <a:t>remote_ratio</a:t>
+            </a:r>
+            <a:r>
+              <a:rPr lang="en-US" b="0" i="0" dirty="0">
+                <a:solidFill>
+                  <a:schemeClr val="accent6"/>
+                </a:solidFill>
+                <a:effectLst/>
+                <a:latin typeface="Consolas" panose="020B0609020204030204" pitchFamily="49" charset="0"/>
+              </a:rPr>
+              <a:t> 3022 non-null int64 9 </a:t>
+            </a:r>
+            <a:r>
+              <a:rPr lang="en-US" b="0" i="0" dirty="0" err="1">
+                <a:solidFill>
+                  <a:schemeClr val="accent6"/>
+                </a:solidFill>
+                <a:effectLst/>
+                <a:latin typeface="Consolas" panose="020B0609020204030204" pitchFamily="49" charset="0"/>
+              </a:rPr>
+              <a:t>company_location</a:t>
+            </a:r>
+            <a:r>
+              <a:rPr lang="en-US" b="0" i="0" dirty="0">
+                <a:solidFill>
+                  <a:schemeClr val="accent6"/>
+                </a:solidFill>
+                <a:effectLst/>
+                <a:latin typeface="Consolas" panose="020B0609020204030204" pitchFamily="49" charset="0"/>
+              </a:rPr>
+              <a:t> 3022 non-null object 10 </a:t>
+            </a:r>
+            <a:r>
+              <a:rPr lang="en-US" b="0" i="0" dirty="0" err="1">
+                <a:solidFill>
+                  <a:schemeClr val="accent6"/>
+                </a:solidFill>
+                <a:effectLst/>
+                <a:latin typeface="Consolas" panose="020B0609020204030204" pitchFamily="49" charset="0"/>
+              </a:rPr>
+              <a:t>company_size</a:t>
+            </a:r>
+            <a:r>
+              <a:rPr lang="en-US" b="0" i="0" dirty="0">
+                <a:solidFill>
+                  <a:schemeClr val="accent6"/>
+                </a:solidFill>
+                <a:effectLst/>
+                <a:latin typeface="Consolas" panose="020B0609020204030204" pitchFamily="49" charset="0"/>
+              </a:rPr>
+              <a:t> 3022 non-null object</a:t>
+            </a:r>
+            <a:endParaRPr lang="en-US" dirty="0">
+              <a:solidFill>
+                <a:schemeClr val="accent6"/>
+              </a:solidFill>
+            </a:endParaRPr>
           </a:p>
         </p:txBody>
       </p:sp>
     </p:spTree>
     <p:extLst>
       <p:ext uri="{BB962C8B-B14F-4D97-AF65-F5344CB8AC3E}">
-        <p14:creationId xmlns:p14="http://schemas.microsoft.com/office/powerpoint/2010/main" val="3170280394"/>
-      </p:ext>
-    </p:extLst>
-  </p:cSld>
-  <p:clrMapOvr>
-    <a:masterClrMapping/>
-  </p:clrMapOvr>
-</p:sld>
-</file>
-
-<file path=ppt/slides/slide14.xml><?xml version="1.0" encoding="utf-8"?>
-<p:sld xmlns:a="http://schemas.openxmlformats.org/drawingml/2006/main" xmlns:r="http://schemas.openxmlformats.org/officeDocument/2006/relationships" xmlns:p="http://schemas.openxmlformats.org/presentationml/2006/main">
-  <p:cSld>
-    <p:spTree>
-      <p:nvGrpSpPr>
-        <p:cNvPr id="1" name=""/>
-        <p:cNvGrpSpPr/>
-        <p:nvPr/>
-      </p:nvGrpSpPr>
-      <p:grpSpPr>
-        <a:xfrm>
-          <a:off x="0" y="0"/>
-          <a:ext cx="0" cy="0"/>
-          <a:chOff x="0" y="0"/>
-          <a:chExt cx="0" cy="0"/>
-        </a:xfrm>
-      </p:grpSpPr>
-      <p:sp>
-        <p:nvSpPr>
-          <p:cNvPr id="2" name="Title 1">
-            <a:extLst>
-              <a:ext uri="{FF2B5EF4-FFF2-40B4-BE49-F238E27FC236}">
-                <a16:creationId xmlns:a16="http://schemas.microsoft.com/office/drawing/2014/main" id="{B83F7D2E-080D-DBDD-73C4-3C38A2B77908}"/>
-              </a:ext>
-            </a:extLst>
-          </p:cNvPr>
-          <p:cNvSpPr>
-            <a:spLocks noGrp="1"/>
-          </p:cNvSpPr>
-          <p:nvPr>
-            <p:ph type="title"/>
-          </p:nvPr>
-        </p:nvSpPr>
-        <p:spPr/>
-        <p:txBody>
-          <a:bodyPr/>
-          <a:lstStyle/>
-          <a:p>
-            <a:r>
-              <a:rPr lang="en-US" dirty="0"/>
-              <a:t>text</a:t>
-            </a:r>
-          </a:p>
-        </p:txBody>
-      </p:sp>
-      <p:sp>
-        <p:nvSpPr>
-          <p:cNvPr id="3" name="Content Placeholder 2">
-            <a:extLst>
-              <a:ext uri="{FF2B5EF4-FFF2-40B4-BE49-F238E27FC236}">
-                <a16:creationId xmlns:a16="http://schemas.microsoft.com/office/drawing/2014/main" id="{2BE8FDE3-DBA4-6A04-C75D-E56FE92EF368}"/>
-              </a:ext>
-            </a:extLst>
-          </p:cNvPr>
-          <p:cNvSpPr>
-            <a:spLocks noGrp="1"/>
-          </p:cNvSpPr>
-          <p:nvPr>
-            <p:ph idx="1"/>
-          </p:nvPr>
-        </p:nvSpPr>
-        <p:spPr/>
-        <p:txBody>
-          <a:bodyPr/>
-          <a:lstStyle/>
-          <a:p>
-            <a:r>
-              <a:rPr lang="en-US" dirty="0"/>
-              <a:t>text</a:t>
-            </a:r>
-          </a:p>
-        </p:txBody>
-      </p:sp>
-    </p:spTree>
-    <p:extLst>
-      <p:ext uri="{BB962C8B-B14F-4D97-AF65-F5344CB8AC3E}">
-        <p14:creationId xmlns:p14="http://schemas.microsoft.com/office/powerpoint/2010/main" val="94818171"/>
+        <p14:creationId xmlns:p14="http://schemas.microsoft.com/office/powerpoint/2010/main" val="2799253195"/>
       </p:ext>
     </p:extLst>
   </p:cSld>
@@ -25224,7 +25867,7 @@
                 <a:latin typeface="Arial Black" panose="020B0604020202020204" pitchFamily="34" charset="0"/>
                 <a:cs typeface="Arial Black" panose="020B0604020202020204" pitchFamily="34" charset="0"/>
               </a:rPr>
-              <a:t>DATA CLEANING</a:t>
+              <a:t>DATA wrangling</a:t>
             </a:r>
           </a:p>
         </p:txBody>
@@ -25248,7 +25891,7 @@
         <p:spPr>
           <a:xfrm>
             <a:off x="3722913" y="3871504"/>
-            <a:ext cx="5831791" cy="1663881"/>
+            <a:ext cx="5831791" cy="2153739"/>
           </a:xfrm>
         </p:spPr>
         <p:txBody>
@@ -25268,6 +25911,38 @@
             </a:r>
           </a:p>
           <a:p>
+            <a:pPr marL="800100" lvl="1" indent="-342900">
+              <a:buFont typeface="Arial" panose="020B0604020202020204" pitchFamily="34" charset="0"/>
+              <a:buChar char="•"/>
+            </a:pPr>
+            <a:r>
+              <a:rPr lang="en-US" dirty="0">
+                <a:solidFill>
+                  <a:schemeClr val="accent6"/>
+                </a:solidFill>
+                <a:latin typeface="Sabon Next LT" panose="02000500000000000000" pitchFamily="2" charset="0"/>
+                <a:cs typeface="Sabon Next LT" panose="02000500000000000000" pitchFamily="2" charset="0"/>
+              </a:rPr>
+              <a:t>Including Employee Residency</a:t>
+            </a:r>
+          </a:p>
+          <a:p>
+            <a:pPr marL="800100" lvl="1" indent="-342900">
+              <a:buFont typeface="Arial" panose="020B0604020202020204" pitchFamily="34" charset="0"/>
+              <a:buChar char="•"/>
+            </a:pPr>
+            <a:r>
+              <a:rPr lang="en-US" dirty="0">
+                <a:solidFill>
+                  <a:schemeClr val="accent6"/>
+                </a:solidFill>
+                <a:latin typeface="Sabon Next LT" panose="02000500000000000000" pitchFamily="2" charset="0"/>
+                <a:cs typeface="Sabon Next LT" panose="02000500000000000000" pitchFamily="2" charset="0"/>
+              </a:rPr>
+              <a:t>Company Location</a:t>
+            </a:r>
+          </a:p>
+          <a:p>
             <a:pPr marL="342900" indent="-342900" algn="l">
               <a:buFont typeface="Arial" panose="020B0604020202020204" pitchFamily="34" charset="0"/>
               <a:buChar char="•"/>
@@ -25278,6 +25953,19 @@
                 <a:cs typeface="Sabon Next LT" panose="02000500000000000000" pitchFamily="2" charset="0"/>
               </a:rPr>
               <a:t>Full Time Employee Data Only</a:t>
+            </a:r>
+          </a:p>
+          <a:p>
+            <a:pPr marL="342900" indent="-342900" algn="l">
+              <a:buFont typeface="Arial" panose="020B0604020202020204" pitchFamily="34" charset="0"/>
+              <a:buChar char="•"/>
+            </a:pPr>
+            <a:r>
+              <a:rPr lang="en-US" dirty="0">
+                <a:latin typeface="Sabon Next LT" panose="02000500000000000000" pitchFamily="2" charset="0"/>
+                <a:cs typeface="Sabon Next LT" panose="02000500000000000000" pitchFamily="2" charset="0"/>
+              </a:rPr>
+              <a:t>Kept duplicate rows</a:t>
             </a:r>
           </a:p>
         </p:txBody>
@@ -25417,7 +26105,7 @@
             </a:pPr>
             <a:r>
               <a:rPr lang="en-US" dirty="0"/>
-              <a:t>Remote Ratio</a:t>
+              <a:t>Experience Level</a:t>
             </a:r>
           </a:p>
           <a:p>
@@ -25427,7 +26115,27 @@
             </a:pPr>
             <a:r>
               <a:rPr lang="en-US" dirty="0"/>
+              <a:t>Remote Ratio</a:t>
+            </a:r>
+          </a:p>
+          <a:p>
+            <a:pPr marL="342900" indent="-342900">
+              <a:buFont typeface="Arial" panose="020B0604020202020204" pitchFamily="34" charset="0"/>
+              <a:buChar char="•"/>
+            </a:pPr>
+            <a:r>
+              <a:rPr lang="en-US" dirty="0"/>
               <a:t>Company Size</a:t>
+            </a:r>
+          </a:p>
+          <a:p>
+            <a:pPr marL="342900" indent="-342900">
+              <a:buFont typeface="Arial" panose="020B0604020202020204" pitchFamily="34" charset="0"/>
+              <a:buChar char="•"/>
+            </a:pPr>
+            <a:r>
+              <a:rPr lang="en-US" dirty="0"/>
+              <a:t>Employee Residence</a:t>
             </a:r>
           </a:p>
         </p:txBody>
@@ -25493,10 +26201,10 @@
       </p:grpSpPr>
       <p:pic>
         <p:nvPicPr>
-          <p:cNvPr id="4" name="Picture 3">
+          <p:cNvPr id="8" name="Picture 7">
             <a:extLst>
               <a:ext uri="{FF2B5EF4-FFF2-40B4-BE49-F238E27FC236}">
-                <a16:creationId xmlns:a16="http://schemas.microsoft.com/office/drawing/2014/main" id="{B834B600-AEE3-F35A-0205-738717CC1642}"/>
+                <a16:creationId xmlns:a16="http://schemas.microsoft.com/office/drawing/2014/main" id="{4E1DC2BE-ACC9-2D49-503D-D5F7B3DEBAB8}"/>
               </a:ext>
             </a:extLst>
           </p:cNvPr>
@@ -25513,8 +26221,8 @@
         </p:blipFill>
         <p:spPr>
           <a:xfrm>
-            <a:off x="0" y="349679"/>
-            <a:ext cx="12192000" cy="6158641"/>
+            <a:off x="0" y="337600"/>
+            <a:ext cx="12192000" cy="6182800"/>
           </a:xfrm>
           <a:prstGeom prst="rect">
             <a:avLst/>
@@ -25553,10 +26261,10 @@
       </p:grpSpPr>
       <p:pic>
         <p:nvPicPr>
-          <p:cNvPr id="3" name="Picture 2">
+          <p:cNvPr id="4" name="Picture 3">
             <a:extLst>
               <a:ext uri="{FF2B5EF4-FFF2-40B4-BE49-F238E27FC236}">
-                <a16:creationId xmlns:a16="http://schemas.microsoft.com/office/drawing/2014/main" id="{0F67288D-C331-CAB2-5039-46B2090C42C1}"/>
+                <a16:creationId xmlns:a16="http://schemas.microsoft.com/office/drawing/2014/main" id="{BD36AE0B-5E07-ACBC-B831-9ABD7329199D}"/>
               </a:ext>
             </a:extLst>
           </p:cNvPr>
@@ -25573,8 +26281,8 @@
         </p:blipFill>
         <p:spPr>
           <a:xfrm>
-            <a:off x="0" y="206731"/>
-            <a:ext cx="12192000" cy="6444538"/>
+            <a:off x="0" y="163763"/>
+            <a:ext cx="12192000" cy="6530474"/>
           </a:xfrm>
           <a:prstGeom prst="rect">
             <a:avLst/>
@@ -25613,10 +26321,10 @@
       </p:grpSpPr>
       <p:pic>
         <p:nvPicPr>
-          <p:cNvPr id="3" name="Picture 2">
+          <p:cNvPr id="4" name="Picture 3">
             <a:extLst>
               <a:ext uri="{FF2B5EF4-FFF2-40B4-BE49-F238E27FC236}">
-                <a16:creationId xmlns:a16="http://schemas.microsoft.com/office/drawing/2014/main" id="{74C23239-DCC1-102C-B7A2-10FAFF2EC521}"/>
+                <a16:creationId xmlns:a16="http://schemas.microsoft.com/office/drawing/2014/main" id="{683A68E6-D5D4-88E8-A560-3536FA90C4C8}"/>
               </a:ext>
             </a:extLst>
           </p:cNvPr>
@@ -25633,8 +26341,8 @@
         </p:blipFill>
         <p:spPr>
           <a:xfrm>
-            <a:off x="833611" y="0"/>
-            <a:ext cx="10524777" cy="6858000"/>
+            <a:off x="845524" y="0"/>
+            <a:ext cx="10500951" cy="6858000"/>
           </a:xfrm>
           <a:prstGeom prst="rect">
             <a:avLst/>
@@ -25673,10 +26381,10 @@
       </p:grpSpPr>
       <p:pic>
         <p:nvPicPr>
-          <p:cNvPr id="3" name="Picture 2">
+          <p:cNvPr id="4" name="Picture 3">
             <a:extLst>
               <a:ext uri="{FF2B5EF4-FFF2-40B4-BE49-F238E27FC236}">
-                <a16:creationId xmlns:a16="http://schemas.microsoft.com/office/drawing/2014/main" id="{99043E3A-4769-47EE-38F9-F985F58468E9}"/>
+                <a16:creationId xmlns:a16="http://schemas.microsoft.com/office/drawing/2014/main" id="{E754FF4B-EAA5-7505-13C2-F3528ADF9F80}"/>
               </a:ext>
             </a:extLst>
           </p:cNvPr>
@@ -25693,8 +26401,8 @@
         </p:blipFill>
         <p:spPr>
           <a:xfrm>
-            <a:off x="0" y="1180777"/>
-            <a:ext cx="12192000" cy="4496445"/>
+            <a:off x="0" y="1182226"/>
+            <a:ext cx="12192000" cy="4493547"/>
           </a:xfrm>
           <a:prstGeom prst="rect">
             <a:avLst/>

</xml_diff>